<commit_message>
add some gameplay screenshots
</commit_message>
<xml_diff>
--- a/Doc/FinalPresentation/RR.pptx
+++ b/Doc/FinalPresentation/RR.pptx
@@ -136,7 +136,7 @@
 </file>
 
 <file path=ppt/charts/chart1.xml><?xml version="1.0" encoding="utf-8"?>
-<c:chartSpace xmlns:c="http://schemas.openxmlformats.org/drawingml/2006/chart" xmlns:a="http://schemas.openxmlformats.org/drawingml/2006/main" xmlns:r="http://schemas.openxmlformats.org/officeDocument/2006/relationships">
+<c:chartSpace xmlns:c="http://schemas.openxmlformats.org/drawingml/2006/chart" xmlns:a="http://schemas.openxmlformats.org/drawingml/2006/main" xmlns:r="http://schemas.openxmlformats.org/officeDocument/2006/relationships" xmlns:c16r2="http://schemas.microsoft.com/office/drawing/2015/06/chart">
   <c:date1904 val="0"/>
   <c:lang val="en-US"/>
   <c:roundedCorners val="0"/>
@@ -202,6 +202,11 @@
                 </a:contourClr>
               </a:sp3d>
             </c:spPr>
+            <c:extLst>
+              <c:ext xmlns:c16="http://schemas.microsoft.com/office/drawing/2014/chart" uri="{C3380CC4-5D6E-409C-BE32-E72D297353CC}">
+                <c16:uniqueId val="{00000001-E058-451E-85BB-54216B702602}"/>
+              </c:ext>
+            </c:extLst>
           </c:dPt>
           <c:dPt>
             <c:idx val="1"/>
@@ -224,6 +229,11 @@
                 </a:contourClr>
               </a:sp3d>
             </c:spPr>
+            <c:extLst>
+              <c:ext xmlns:c16="http://schemas.microsoft.com/office/drawing/2014/chart" uri="{C3380CC4-5D6E-409C-BE32-E72D297353CC}">
+                <c16:uniqueId val="{00000003-E058-451E-85BB-54216B702602}"/>
+              </c:ext>
+            </c:extLst>
           </c:dPt>
           <c:dPt>
             <c:idx val="2"/>
@@ -246,6 +256,11 @@
                 </a:contourClr>
               </a:sp3d>
             </c:spPr>
+            <c:extLst>
+              <c:ext xmlns:c16="http://schemas.microsoft.com/office/drawing/2014/chart" uri="{C3380CC4-5D6E-409C-BE32-E72D297353CC}">
+                <c16:uniqueId val="{00000005-E058-451E-85BB-54216B702602}"/>
+              </c:ext>
+            </c:extLst>
           </c:dPt>
           <c:dPt>
             <c:idx val="3"/>
@@ -270,6 +285,11 @@
                 </a:contourClr>
               </a:sp3d>
             </c:spPr>
+            <c:extLst>
+              <c:ext xmlns:c16="http://schemas.microsoft.com/office/drawing/2014/chart" uri="{C3380CC4-5D6E-409C-BE32-E72D297353CC}">
+                <c16:uniqueId val="{00000007-E058-451E-85BB-54216B702602}"/>
+              </c:ext>
+            </c:extLst>
           </c:dPt>
           <c:dPt>
             <c:idx val="4"/>
@@ -294,6 +314,11 @@
                 </a:contourClr>
               </a:sp3d>
             </c:spPr>
+            <c:extLst>
+              <c:ext xmlns:c16="http://schemas.microsoft.com/office/drawing/2014/chart" uri="{C3380CC4-5D6E-409C-BE32-E72D297353CC}">
+                <c16:uniqueId val="{00000009-E058-451E-85BB-54216B702602}"/>
+              </c:ext>
+            </c:extLst>
           </c:dPt>
           <c:dPt>
             <c:idx val="5"/>
@@ -318,6 +343,11 @@
                 </a:contourClr>
               </a:sp3d>
             </c:spPr>
+            <c:extLst>
+              <c:ext xmlns:c16="http://schemas.microsoft.com/office/drawing/2014/chart" uri="{C3380CC4-5D6E-409C-BE32-E72D297353CC}">
+                <c16:uniqueId val="{0000000B-E058-451E-85BB-54216B702602}"/>
+              </c:ext>
+            </c:extLst>
           </c:dPt>
           <c:dLbls>
             <c:dLbl>
@@ -355,9 +385,11 @@
               <c:showBubbleSize val="0"/>
               <c:extLst>
                 <c:ext xmlns:c15="http://schemas.microsoft.com/office/drawing/2012/chart" uri="{CE6537A1-D6FC-4f65-9D91-7224C49458BB}">
-                  <c15:layout/>
                   <c15:dlblFieldTable/>
                   <c15:showDataLabelsRange val="0"/>
+                </c:ext>
+                <c:ext xmlns:c16="http://schemas.microsoft.com/office/drawing/2014/chart" uri="{C3380CC4-5D6E-409C-BE32-E72D297353CC}">
+                  <c16:uniqueId val="{00000001-E058-451E-85BB-54216B702602}"/>
                 </c:ext>
               </c:extLst>
             </c:dLbl>
@@ -396,9 +428,11 @@
               <c:showBubbleSize val="0"/>
               <c:extLst>
                 <c:ext xmlns:c15="http://schemas.microsoft.com/office/drawing/2012/chart" uri="{CE6537A1-D6FC-4f65-9D91-7224C49458BB}">
-                  <c15:layout/>
                   <c15:dlblFieldTable/>
                   <c15:showDataLabelsRange val="0"/>
+                </c:ext>
+                <c:ext xmlns:c16="http://schemas.microsoft.com/office/drawing/2014/chart" uri="{C3380CC4-5D6E-409C-BE32-E72D297353CC}">
+                  <c16:uniqueId val="{00000003-E058-451E-85BB-54216B702602}"/>
                 </c:ext>
               </c:extLst>
             </c:dLbl>
@@ -437,9 +471,11 @@
               <c:showBubbleSize val="0"/>
               <c:extLst>
                 <c:ext xmlns:c15="http://schemas.microsoft.com/office/drawing/2012/chart" uri="{CE6537A1-D6FC-4f65-9D91-7224C49458BB}">
-                  <c15:layout/>
                   <c15:dlblFieldTable/>
                   <c15:showDataLabelsRange val="0"/>
+                </c:ext>
+                <c:ext xmlns:c16="http://schemas.microsoft.com/office/drawing/2014/chart" uri="{C3380CC4-5D6E-409C-BE32-E72D297353CC}">
+                  <c16:uniqueId val="{00000005-E058-451E-85BB-54216B702602}"/>
                 </c:ext>
               </c:extLst>
             </c:dLbl>
@@ -447,8 +483,9 @@
               <c:idx val="3"/>
               <c:delete val="1"/>
               <c:extLst>
-                <c:ext xmlns:c15="http://schemas.microsoft.com/office/drawing/2012/chart" uri="{CE6537A1-D6FC-4f65-9D91-7224C49458BB}">
-                  <c15:layout/>
+                <c:ext xmlns:c15="http://schemas.microsoft.com/office/drawing/2012/chart" uri="{CE6537A1-D6FC-4f65-9D91-7224C49458BB}"/>
+                <c:ext xmlns:c16="http://schemas.microsoft.com/office/drawing/2014/chart" uri="{C3380CC4-5D6E-409C-BE32-E72D297353CC}">
+                  <c16:uniqueId val="{00000007-E058-451E-85BB-54216B702602}"/>
                 </c:ext>
               </c:extLst>
             </c:dLbl>
@@ -456,8 +493,9 @@
               <c:idx val="4"/>
               <c:delete val="1"/>
               <c:extLst>
-                <c:ext xmlns:c15="http://schemas.microsoft.com/office/drawing/2012/chart" uri="{CE6537A1-D6FC-4f65-9D91-7224C49458BB}">
-                  <c15:layout/>
+                <c:ext xmlns:c15="http://schemas.microsoft.com/office/drawing/2012/chart" uri="{CE6537A1-D6FC-4f65-9D91-7224C49458BB}"/>
+                <c:ext xmlns:c16="http://schemas.microsoft.com/office/drawing/2014/chart" uri="{C3380CC4-5D6E-409C-BE32-E72D297353CC}">
+                  <c16:uniqueId val="{00000009-E058-451E-85BB-54216B702602}"/>
                 </c:ext>
               </c:extLst>
             </c:dLbl>
@@ -465,8 +503,9 @@
               <c:idx val="5"/>
               <c:delete val="1"/>
               <c:extLst>
-                <c:ext xmlns:c15="http://schemas.microsoft.com/office/drawing/2012/chart" uri="{CE6537A1-D6FC-4f65-9D91-7224C49458BB}">
-                  <c15:layout/>
+                <c:ext xmlns:c15="http://schemas.microsoft.com/office/drawing/2012/chart" uri="{CE6537A1-D6FC-4f65-9D91-7224C49458BB}"/>
+                <c:ext xmlns:c16="http://schemas.microsoft.com/office/drawing/2014/chart" uri="{C3380CC4-5D6E-409C-BE32-E72D297353CC}">
+                  <c16:uniqueId val="{0000000B-E058-451E-85BB-54216B702602}"/>
                 </c:ext>
               </c:extLst>
             </c:dLbl>
@@ -519,9 +558,7 @@
               </c:spPr>
             </c:leaderLines>
             <c:extLst>
-              <c:ext xmlns:c15="http://schemas.microsoft.com/office/drawing/2012/chart" uri="{CE6537A1-D6FC-4f65-9D91-7224C49458BB}">
-                <c15:layout/>
-              </c:ext>
+              <c:ext xmlns:c15="http://schemas.microsoft.com/office/drawing/2012/chart" uri="{CE6537A1-D6FC-4f65-9D91-7224C49458BB}"/>
             </c:extLst>
           </c:dLbls>
           <c:cat>
@@ -577,6 +614,11 @@
               </c:numCache>
             </c:numRef>
           </c:val>
+          <c:extLst>
+            <c:ext xmlns:c16="http://schemas.microsoft.com/office/drawing/2014/chart" uri="{C3380CC4-5D6E-409C-BE32-E72D297353CC}">
+              <c16:uniqueId val="{0000000C-E058-451E-85BB-54216B702602}"/>
+            </c:ext>
+          </c:extLst>
         </c:ser>
         <c:dLbls>
           <c:dLblPos val="inEnd"/>
@@ -600,7 +642,6 @@
     </c:plotArea>
     <c:legend>
       <c:legendPos val="r"/>
-      <c:layout/>
       <c:overlay val="1"/>
       <c:spPr>
         <a:noFill/>
@@ -1290,7 +1331,7 @@
           <a:p>
             <a:fld id="{E87E700C-F5C1-45DA-8BB8-34A79AF25122}" type="datetimeFigureOut">
               <a:rPr lang="en-CA" smtClean="0"/>
-              <a:t>2016-11-25</a:t>
+              <a:t>2016-11-26</a:t>
             </a:fld>
             <a:endParaRPr lang="en-CA"/>
           </a:p>
@@ -1354,35 +1395,35 @@
           <a:p>
             <a:pPr lvl="0"/>
             <a:r>
-              <a:rPr lang="en-US" smtClean="0"/>
+              <a:rPr lang="en-US"/>
               <a:t>Click to edit Master text styles</a:t>
             </a:r>
           </a:p>
           <a:p>
             <a:pPr lvl="1"/>
             <a:r>
-              <a:rPr lang="en-US" smtClean="0"/>
+              <a:rPr lang="en-US"/>
               <a:t>Second level</a:t>
             </a:r>
           </a:p>
           <a:p>
             <a:pPr lvl="2"/>
             <a:r>
-              <a:rPr lang="en-US" smtClean="0"/>
+              <a:rPr lang="en-US"/>
               <a:t>Third level</a:t>
             </a:r>
           </a:p>
           <a:p>
             <a:pPr lvl="3"/>
             <a:r>
-              <a:rPr lang="en-US" smtClean="0"/>
+              <a:rPr lang="en-US"/>
               <a:t>Fourth level</a:t>
             </a:r>
           </a:p>
           <a:p>
             <a:pPr lvl="4"/>
             <a:r>
-              <a:rPr lang="en-US" smtClean="0"/>
+              <a:rPr lang="en-US"/>
               <a:t>Fifth level</a:t>
             </a:r>
             <a:endParaRPr lang="en-CA"/>
@@ -1764,7 +1805,7 @@
           <a:lstStyle/>
           <a:p>
             <a:r>
-              <a:rPr lang="en-US" smtClean="0"/>
+              <a:rPr lang="en-US"/>
               <a:t>Click to edit Master title style</a:t>
             </a:r>
             <a:endParaRPr lang="en-CA"/>
@@ -1883,7 +1924,7 @@
           </a:lstStyle>
           <a:p>
             <a:r>
-              <a:rPr lang="en-US" smtClean="0"/>
+              <a:rPr lang="en-US"/>
               <a:t>Click to edit Master subtitle style</a:t>
             </a:r>
             <a:endParaRPr lang="en-CA"/>
@@ -1907,7 +1948,7 @@
           <a:p>
             <a:fld id="{DC61108D-6E81-4C43-975C-CB4582A4A1D2}" type="datetimeFigureOut">
               <a:rPr lang="en-CA" smtClean="0"/>
-              <a:t>2016-11-25</a:t>
+              <a:t>2016-11-26</a:t>
             </a:fld>
             <a:endParaRPr lang="en-CA"/>
           </a:p>
@@ -2001,7 +2042,7 @@
           <a:lstStyle/>
           <a:p>
             <a:r>
-              <a:rPr lang="en-US" smtClean="0"/>
+              <a:rPr lang="en-US"/>
               <a:t>Click to edit Master title style</a:t>
             </a:r>
             <a:endParaRPr lang="en-CA"/>
@@ -2025,35 +2066,35 @@
           <a:p>
             <a:pPr lvl="0"/>
             <a:r>
-              <a:rPr lang="en-US" smtClean="0"/>
+              <a:rPr lang="en-US"/>
               <a:t>Click to edit Master text styles</a:t>
             </a:r>
           </a:p>
           <a:p>
             <a:pPr lvl="1"/>
             <a:r>
-              <a:rPr lang="en-US" smtClean="0"/>
+              <a:rPr lang="en-US"/>
               <a:t>Second level</a:t>
             </a:r>
           </a:p>
           <a:p>
             <a:pPr lvl="2"/>
             <a:r>
-              <a:rPr lang="en-US" smtClean="0"/>
+              <a:rPr lang="en-US"/>
               <a:t>Third level</a:t>
             </a:r>
           </a:p>
           <a:p>
             <a:pPr lvl="3"/>
             <a:r>
-              <a:rPr lang="en-US" smtClean="0"/>
+              <a:rPr lang="en-US"/>
               <a:t>Fourth level</a:t>
             </a:r>
           </a:p>
           <a:p>
             <a:pPr lvl="4"/>
             <a:r>
-              <a:rPr lang="en-US" smtClean="0"/>
+              <a:rPr lang="en-US"/>
               <a:t>Fifth level</a:t>
             </a:r>
             <a:endParaRPr lang="en-CA"/>
@@ -2077,7 +2118,7 @@
           <a:p>
             <a:fld id="{DC61108D-6E81-4C43-975C-CB4582A4A1D2}" type="datetimeFigureOut">
               <a:rPr lang="en-CA" smtClean="0"/>
-              <a:t>2016-11-25</a:t>
+              <a:t>2016-11-26</a:t>
             </a:fld>
             <a:endParaRPr lang="en-CA"/>
           </a:p>
@@ -2176,7 +2217,7 @@
           <a:lstStyle/>
           <a:p>
             <a:r>
-              <a:rPr lang="en-US" smtClean="0"/>
+              <a:rPr lang="en-US"/>
               <a:t>Click to edit Master title style</a:t>
             </a:r>
             <a:endParaRPr lang="en-CA"/>
@@ -2205,35 +2246,35 @@
           <a:p>
             <a:pPr lvl="0"/>
             <a:r>
-              <a:rPr lang="en-US" smtClean="0"/>
+              <a:rPr lang="en-US"/>
               <a:t>Click to edit Master text styles</a:t>
             </a:r>
           </a:p>
           <a:p>
             <a:pPr lvl="1"/>
             <a:r>
-              <a:rPr lang="en-US" smtClean="0"/>
+              <a:rPr lang="en-US"/>
               <a:t>Second level</a:t>
             </a:r>
           </a:p>
           <a:p>
             <a:pPr lvl="2"/>
             <a:r>
-              <a:rPr lang="en-US" smtClean="0"/>
+              <a:rPr lang="en-US"/>
               <a:t>Third level</a:t>
             </a:r>
           </a:p>
           <a:p>
             <a:pPr lvl="3"/>
             <a:r>
-              <a:rPr lang="en-US" smtClean="0"/>
+              <a:rPr lang="en-US"/>
               <a:t>Fourth level</a:t>
             </a:r>
           </a:p>
           <a:p>
             <a:pPr lvl="4"/>
             <a:r>
-              <a:rPr lang="en-US" smtClean="0"/>
+              <a:rPr lang="en-US"/>
               <a:t>Fifth level</a:t>
             </a:r>
             <a:endParaRPr lang="en-CA"/>
@@ -2257,7 +2298,7 @@
           <a:p>
             <a:fld id="{DC61108D-6E81-4C43-975C-CB4582A4A1D2}" type="datetimeFigureOut">
               <a:rPr lang="en-CA" smtClean="0"/>
-              <a:t>2016-11-25</a:t>
+              <a:t>2016-11-26</a:t>
             </a:fld>
             <a:endParaRPr lang="en-CA"/>
           </a:p>
@@ -2351,7 +2392,7 @@
           <a:lstStyle/>
           <a:p>
             <a:r>
-              <a:rPr lang="en-US" smtClean="0"/>
+              <a:rPr lang="en-US"/>
               <a:t>Click to edit Master title style</a:t>
             </a:r>
             <a:endParaRPr lang="en-CA"/>
@@ -2375,35 +2416,35 @@
           <a:p>
             <a:pPr lvl="0"/>
             <a:r>
-              <a:rPr lang="en-US" smtClean="0"/>
+              <a:rPr lang="en-US"/>
               <a:t>Click to edit Master text styles</a:t>
             </a:r>
           </a:p>
           <a:p>
             <a:pPr lvl="1"/>
             <a:r>
-              <a:rPr lang="en-US" smtClean="0"/>
+              <a:rPr lang="en-US"/>
               <a:t>Second level</a:t>
             </a:r>
           </a:p>
           <a:p>
             <a:pPr lvl="2"/>
             <a:r>
-              <a:rPr lang="en-US" smtClean="0"/>
+              <a:rPr lang="en-US"/>
               <a:t>Third level</a:t>
             </a:r>
           </a:p>
           <a:p>
             <a:pPr lvl="3"/>
             <a:r>
-              <a:rPr lang="en-US" smtClean="0"/>
+              <a:rPr lang="en-US"/>
               <a:t>Fourth level</a:t>
             </a:r>
           </a:p>
           <a:p>
             <a:pPr lvl="4"/>
             <a:r>
-              <a:rPr lang="en-US" smtClean="0"/>
+              <a:rPr lang="en-US"/>
               <a:t>Fifth level</a:t>
             </a:r>
             <a:endParaRPr lang="en-CA"/>
@@ -2427,7 +2468,7 @@
           <a:p>
             <a:fld id="{DC61108D-6E81-4C43-975C-CB4582A4A1D2}" type="datetimeFigureOut">
               <a:rPr lang="en-CA" smtClean="0"/>
-              <a:t>2016-11-25</a:t>
+              <a:t>2016-11-26</a:t>
             </a:fld>
             <a:endParaRPr lang="en-CA"/>
           </a:p>
@@ -2530,7 +2571,7 @@
           </a:lstStyle>
           <a:p>
             <a:r>
-              <a:rPr lang="en-US" smtClean="0"/>
+              <a:rPr lang="en-US"/>
               <a:t>Click to edit Master title style</a:t>
             </a:r>
             <a:endParaRPr lang="en-CA"/>
@@ -2650,7 +2691,7 @@
           <a:p>
             <a:pPr lvl="0"/>
             <a:r>
-              <a:rPr lang="en-US" smtClean="0"/>
+              <a:rPr lang="en-US"/>
               <a:t>Click to edit Master text styles</a:t>
             </a:r>
           </a:p>
@@ -2673,7 +2714,7 @@
           <a:p>
             <a:fld id="{DC61108D-6E81-4C43-975C-CB4582A4A1D2}" type="datetimeFigureOut">
               <a:rPr lang="en-CA" smtClean="0"/>
-              <a:t>2016-11-25</a:t>
+              <a:t>2016-11-26</a:t>
             </a:fld>
             <a:endParaRPr lang="en-CA"/>
           </a:p>
@@ -2767,7 +2808,7 @@
           <a:lstStyle/>
           <a:p>
             <a:r>
-              <a:rPr lang="en-US" smtClean="0"/>
+              <a:rPr lang="en-US"/>
               <a:t>Click to edit Master title style</a:t>
             </a:r>
             <a:endParaRPr lang="en-CA"/>
@@ -2824,35 +2865,35 @@
           <a:p>
             <a:pPr lvl="0"/>
             <a:r>
-              <a:rPr lang="en-US" smtClean="0"/>
+              <a:rPr lang="en-US"/>
               <a:t>Click to edit Master text styles</a:t>
             </a:r>
           </a:p>
           <a:p>
             <a:pPr lvl="1"/>
             <a:r>
-              <a:rPr lang="en-US" smtClean="0"/>
+              <a:rPr lang="en-US"/>
               <a:t>Second level</a:t>
             </a:r>
           </a:p>
           <a:p>
             <a:pPr lvl="2"/>
             <a:r>
-              <a:rPr lang="en-US" smtClean="0"/>
+              <a:rPr lang="en-US"/>
               <a:t>Third level</a:t>
             </a:r>
           </a:p>
           <a:p>
             <a:pPr lvl="3"/>
             <a:r>
-              <a:rPr lang="en-US" smtClean="0"/>
+              <a:rPr lang="en-US"/>
               <a:t>Fourth level</a:t>
             </a:r>
           </a:p>
           <a:p>
             <a:pPr lvl="4"/>
             <a:r>
-              <a:rPr lang="en-US" smtClean="0"/>
+              <a:rPr lang="en-US"/>
               <a:t>Fifth level</a:t>
             </a:r>
             <a:endParaRPr lang="en-CA"/>
@@ -2909,35 +2950,35 @@
           <a:p>
             <a:pPr lvl="0"/>
             <a:r>
-              <a:rPr lang="en-US" smtClean="0"/>
+              <a:rPr lang="en-US"/>
               <a:t>Click to edit Master text styles</a:t>
             </a:r>
           </a:p>
           <a:p>
             <a:pPr lvl="1"/>
             <a:r>
-              <a:rPr lang="en-US" smtClean="0"/>
+              <a:rPr lang="en-US"/>
               <a:t>Second level</a:t>
             </a:r>
           </a:p>
           <a:p>
             <a:pPr lvl="2"/>
             <a:r>
-              <a:rPr lang="en-US" smtClean="0"/>
+              <a:rPr lang="en-US"/>
               <a:t>Third level</a:t>
             </a:r>
           </a:p>
           <a:p>
             <a:pPr lvl="3"/>
             <a:r>
-              <a:rPr lang="en-US" smtClean="0"/>
+              <a:rPr lang="en-US"/>
               <a:t>Fourth level</a:t>
             </a:r>
           </a:p>
           <a:p>
             <a:pPr lvl="4"/>
             <a:r>
-              <a:rPr lang="en-US" smtClean="0"/>
+              <a:rPr lang="en-US"/>
               <a:t>Fifth level</a:t>
             </a:r>
             <a:endParaRPr lang="en-CA"/>
@@ -2961,7 +3002,7 @@
           <a:p>
             <a:fld id="{DC61108D-6E81-4C43-975C-CB4582A4A1D2}" type="datetimeFigureOut">
               <a:rPr lang="en-CA" smtClean="0"/>
-              <a:t>2016-11-25</a:t>
+              <a:t>2016-11-26</a:t>
             </a:fld>
             <a:endParaRPr lang="en-CA"/>
           </a:p>
@@ -3059,7 +3100,7 @@
           </a:lstStyle>
           <a:p>
             <a:r>
-              <a:rPr lang="en-US" smtClean="0"/>
+              <a:rPr lang="en-US"/>
               <a:t>Click to edit Master title style</a:t>
             </a:r>
             <a:endParaRPr lang="en-CA"/>
@@ -3125,7 +3166,7 @@
           <a:p>
             <a:pPr lvl="0"/>
             <a:r>
-              <a:rPr lang="en-US" smtClean="0"/>
+              <a:rPr lang="en-US"/>
               <a:t>Click to edit Master text styles</a:t>
             </a:r>
           </a:p>
@@ -3181,35 +3222,35 @@
           <a:p>
             <a:pPr lvl="0"/>
             <a:r>
-              <a:rPr lang="en-US" smtClean="0"/>
+              <a:rPr lang="en-US"/>
               <a:t>Click to edit Master text styles</a:t>
             </a:r>
           </a:p>
           <a:p>
             <a:pPr lvl="1"/>
             <a:r>
-              <a:rPr lang="en-US" smtClean="0"/>
+              <a:rPr lang="en-US"/>
               <a:t>Second level</a:t>
             </a:r>
           </a:p>
           <a:p>
             <a:pPr lvl="2"/>
             <a:r>
-              <a:rPr lang="en-US" smtClean="0"/>
+              <a:rPr lang="en-US"/>
               <a:t>Third level</a:t>
             </a:r>
           </a:p>
           <a:p>
             <a:pPr lvl="3"/>
             <a:r>
-              <a:rPr lang="en-US" smtClean="0"/>
+              <a:rPr lang="en-US"/>
               <a:t>Fourth level</a:t>
             </a:r>
           </a:p>
           <a:p>
             <a:pPr lvl="4"/>
             <a:r>
-              <a:rPr lang="en-US" smtClean="0"/>
+              <a:rPr lang="en-US"/>
               <a:t>Fifth level</a:t>
             </a:r>
             <a:endParaRPr lang="en-CA"/>
@@ -3275,7 +3316,7 @@
           <a:p>
             <a:pPr lvl="0"/>
             <a:r>
-              <a:rPr lang="en-US" smtClean="0"/>
+              <a:rPr lang="en-US"/>
               <a:t>Click to edit Master text styles</a:t>
             </a:r>
           </a:p>
@@ -3331,35 +3372,35 @@
           <a:p>
             <a:pPr lvl="0"/>
             <a:r>
-              <a:rPr lang="en-US" smtClean="0"/>
+              <a:rPr lang="en-US"/>
               <a:t>Click to edit Master text styles</a:t>
             </a:r>
           </a:p>
           <a:p>
             <a:pPr lvl="1"/>
             <a:r>
-              <a:rPr lang="en-US" smtClean="0"/>
+              <a:rPr lang="en-US"/>
               <a:t>Second level</a:t>
             </a:r>
           </a:p>
           <a:p>
             <a:pPr lvl="2"/>
             <a:r>
-              <a:rPr lang="en-US" smtClean="0"/>
+              <a:rPr lang="en-US"/>
               <a:t>Third level</a:t>
             </a:r>
           </a:p>
           <a:p>
             <a:pPr lvl="3"/>
             <a:r>
-              <a:rPr lang="en-US" smtClean="0"/>
+              <a:rPr lang="en-US"/>
               <a:t>Fourth level</a:t>
             </a:r>
           </a:p>
           <a:p>
             <a:pPr lvl="4"/>
             <a:r>
-              <a:rPr lang="en-US" smtClean="0"/>
+              <a:rPr lang="en-US"/>
               <a:t>Fifth level</a:t>
             </a:r>
             <a:endParaRPr lang="en-CA"/>
@@ -3383,7 +3424,7 @@
           <a:p>
             <a:fld id="{DC61108D-6E81-4C43-975C-CB4582A4A1D2}" type="datetimeFigureOut">
               <a:rPr lang="en-CA" smtClean="0"/>
-              <a:t>2016-11-25</a:t>
+              <a:t>2016-11-26</a:t>
             </a:fld>
             <a:endParaRPr lang="en-CA"/>
           </a:p>
@@ -3477,7 +3518,7 @@
           <a:lstStyle/>
           <a:p>
             <a:r>
-              <a:rPr lang="en-US" smtClean="0"/>
+              <a:rPr lang="en-US"/>
               <a:t>Click to edit Master title style</a:t>
             </a:r>
             <a:endParaRPr lang="en-CA"/>
@@ -3501,7 +3542,7 @@
           <a:p>
             <a:fld id="{DC61108D-6E81-4C43-975C-CB4582A4A1D2}" type="datetimeFigureOut">
               <a:rPr lang="en-CA" smtClean="0"/>
-              <a:t>2016-11-25</a:t>
+              <a:t>2016-11-26</a:t>
             </a:fld>
             <a:endParaRPr lang="en-CA"/>
           </a:p>
@@ -3596,7 +3637,7 @@
           <a:p>
             <a:fld id="{DC61108D-6E81-4C43-975C-CB4582A4A1D2}" type="datetimeFigureOut">
               <a:rPr lang="en-CA" smtClean="0"/>
-              <a:t>2016-11-25</a:t>
+              <a:t>2016-11-26</a:t>
             </a:fld>
             <a:endParaRPr lang="en-CA"/>
           </a:p>
@@ -3699,7 +3740,7 @@
           </a:lstStyle>
           <a:p>
             <a:r>
-              <a:rPr lang="en-US" smtClean="0"/>
+              <a:rPr lang="en-US"/>
               <a:t>Click to edit Master title style</a:t>
             </a:r>
             <a:endParaRPr lang="en-CA"/>
@@ -3756,35 +3797,35 @@
           <a:p>
             <a:pPr lvl="0"/>
             <a:r>
-              <a:rPr lang="en-US" smtClean="0"/>
+              <a:rPr lang="en-US"/>
               <a:t>Click to edit Master text styles</a:t>
             </a:r>
           </a:p>
           <a:p>
             <a:pPr lvl="1"/>
             <a:r>
-              <a:rPr lang="en-US" smtClean="0"/>
+              <a:rPr lang="en-US"/>
               <a:t>Second level</a:t>
             </a:r>
           </a:p>
           <a:p>
             <a:pPr lvl="2"/>
             <a:r>
-              <a:rPr lang="en-US" smtClean="0"/>
+              <a:rPr lang="en-US"/>
               <a:t>Third level</a:t>
             </a:r>
           </a:p>
           <a:p>
             <a:pPr lvl="3"/>
             <a:r>
-              <a:rPr lang="en-US" smtClean="0"/>
+              <a:rPr lang="en-US"/>
               <a:t>Fourth level</a:t>
             </a:r>
           </a:p>
           <a:p>
             <a:pPr lvl="4"/>
             <a:r>
-              <a:rPr lang="en-US" smtClean="0"/>
+              <a:rPr lang="en-US"/>
               <a:t>Fifth level</a:t>
             </a:r>
             <a:endParaRPr lang="en-CA"/>
@@ -3850,7 +3891,7 @@
           <a:p>
             <a:pPr lvl="0"/>
             <a:r>
-              <a:rPr lang="en-US" smtClean="0"/>
+              <a:rPr lang="en-US"/>
               <a:t>Click to edit Master text styles</a:t>
             </a:r>
           </a:p>
@@ -3873,7 +3914,7 @@
           <a:p>
             <a:fld id="{DC61108D-6E81-4C43-975C-CB4582A4A1D2}" type="datetimeFigureOut">
               <a:rPr lang="en-CA" smtClean="0"/>
-              <a:t>2016-11-25</a:t>
+              <a:t>2016-11-26</a:t>
             </a:fld>
             <a:endParaRPr lang="en-CA"/>
           </a:p>
@@ -3976,7 +4017,7 @@
           </a:lstStyle>
           <a:p>
             <a:r>
-              <a:rPr lang="en-US" smtClean="0"/>
+              <a:rPr lang="en-US"/>
               <a:t>Click to edit Master title style</a:t>
             </a:r>
             <a:endParaRPr lang="en-CA"/>
@@ -4103,7 +4144,7 @@
           <a:p>
             <a:pPr lvl="0"/>
             <a:r>
-              <a:rPr lang="en-US" smtClean="0"/>
+              <a:rPr lang="en-US"/>
               <a:t>Click to edit Master text styles</a:t>
             </a:r>
           </a:p>
@@ -4126,7 +4167,7 @@
           <a:p>
             <a:fld id="{DC61108D-6E81-4C43-975C-CB4582A4A1D2}" type="datetimeFigureOut">
               <a:rPr lang="en-CA" smtClean="0"/>
-              <a:t>2016-11-25</a:t>
+              <a:t>2016-11-26</a:t>
             </a:fld>
             <a:endParaRPr lang="en-CA"/>
           </a:p>
@@ -4235,7 +4276,7 @@
           <a:lstStyle/>
           <a:p>
             <a:r>
-              <a:rPr lang="en-US" smtClean="0"/>
+              <a:rPr lang="en-US"/>
               <a:t>Click to edit Master title style</a:t>
             </a:r>
             <a:endParaRPr lang="en-CA"/>
@@ -4269,35 +4310,35 @@
           <a:p>
             <a:pPr lvl="0"/>
             <a:r>
-              <a:rPr lang="en-US" smtClean="0"/>
+              <a:rPr lang="en-US"/>
               <a:t>Click to edit Master text styles</a:t>
             </a:r>
           </a:p>
           <a:p>
             <a:pPr lvl="1"/>
             <a:r>
-              <a:rPr lang="en-US" smtClean="0"/>
+              <a:rPr lang="en-US"/>
               <a:t>Second level</a:t>
             </a:r>
           </a:p>
           <a:p>
             <a:pPr lvl="2"/>
             <a:r>
-              <a:rPr lang="en-US" smtClean="0"/>
+              <a:rPr lang="en-US"/>
               <a:t>Third level</a:t>
             </a:r>
           </a:p>
           <a:p>
             <a:pPr lvl="3"/>
             <a:r>
-              <a:rPr lang="en-US" smtClean="0"/>
+              <a:rPr lang="en-US"/>
               <a:t>Fourth level</a:t>
             </a:r>
           </a:p>
           <a:p>
             <a:pPr lvl="4"/>
             <a:r>
-              <a:rPr lang="en-US" smtClean="0"/>
+              <a:rPr lang="en-US"/>
               <a:t>Fifth level</a:t>
             </a:r>
             <a:endParaRPr lang="en-CA"/>
@@ -4339,7 +4380,7 @@
           <a:p>
             <a:fld id="{DC61108D-6E81-4C43-975C-CB4582A4A1D2}" type="datetimeFigureOut">
               <a:rPr lang="en-CA" smtClean="0"/>
-              <a:t>2016-11-25</a:t>
+              <a:t>2016-11-26</a:t>
             </a:fld>
             <a:endParaRPr lang="en-CA"/>
           </a:p>
@@ -4878,8 +4919,8 @@
           </p:sp>
         </mc:Fallback>
       </mc:AlternateContent>
-      <mc:AlternateContent xmlns:mc="http://schemas.openxmlformats.org/markup-compatibility/2006">
-        <mc:Choice xmlns:a14="http://schemas.microsoft.com/office/drawing/2010/main" Requires="a14">
+      <mc:AlternateContent xmlns:mc="http://schemas.openxmlformats.org/markup-compatibility/2006" xmlns:a14="http://schemas.microsoft.com/office/drawing/2010/main">
+        <mc:Choice Requires="a14">
           <p:sp>
             <p:nvSpPr>
               <p:cNvPr id="3" name="Subtitle 2"/>
@@ -4903,7 +4944,7 @@
               <a:lstStyle/>
               <a:p>
                 <a:r>
-                  <a:rPr lang="en-US" sz="2600" dirty="0" smtClean="0">
+                  <a:rPr lang="en-US" sz="2600" dirty="0">
                     <a:solidFill>
                       <a:schemeClr val="bg1">
                         <a:lumMod val="95000"/>
@@ -4916,7 +4957,7 @@
                   <a:t>Team </a:t>
                 </a:r>
                 <a:r>
-                  <a:rPr lang="en-US" sz="2600" dirty="0" smtClean="0">
+                  <a:rPr lang="en-US" sz="2600" dirty="0">
                     <a:solidFill>
                       <a:srgbClr val="28C22F"/>
                     </a:solidFill>
@@ -5223,7 +5264,7 @@
             </p:txBody>
           </p:sp>
         </mc:Choice>
-        <mc:Fallback>
+        <mc:Fallback xmlns="">
           <p:sp>
             <p:nvSpPr>
               <p:cNvPr id="3" name="Subtitle 2"/>
@@ -5284,7 +5325,7 @@
           <a:lstStyle/>
           <a:p>
             <a:r>
-              <a:rPr lang="en-US" dirty="0" smtClean="0">
+              <a:rPr lang="en-US" dirty="0">
                 <a:solidFill>
                   <a:schemeClr val="tx1">
                     <a:lumMod val="75000"/>
@@ -5327,7 +5368,7 @@
           <a:lstStyle/>
           <a:p>
             <a:r>
-              <a:rPr lang="en-US" dirty="0" smtClean="0">
+              <a:rPr lang="en-US" dirty="0">
                 <a:solidFill>
                   <a:schemeClr val="tx1">
                     <a:lumMod val="75000"/>
@@ -5363,7 +5404,7 @@
           <a:lstStyle/>
           <a:p>
             <a:r>
-              <a:rPr lang="en-US" dirty="0" smtClean="0">
+              <a:rPr lang="en-US" dirty="0">
                 <a:solidFill>
                   <a:schemeClr val="tx1">
                     <a:lumMod val="75000"/>
@@ -5399,7 +5440,7 @@
           <a:lstStyle/>
           <a:p>
             <a:r>
-              <a:rPr lang="en-US" dirty="0" smtClean="0">
+              <a:rPr lang="en-US" dirty="0">
                 <a:solidFill>
                   <a:schemeClr val="tx1">
                     <a:lumMod val="75000"/>
@@ -5436,7 +5477,7 @@
           <a:lstStyle/>
           <a:p>
             <a:r>
-              <a:rPr lang="en-US" sz="2000" dirty="0" smtClean="0">
+              <a:rPr lang="en-US" sz="2000" dirty="0">
                 <a:solidFill>
                   <a:schemeClr val="bg1"/>
                 </a:solidFill>
@@ -5447,7 +5488,7 @@
               <a:t>Lab 03 </a:t>
             </a:r>
             <a:r>
-              <a:rPr lang="en-US" sz="2000" dirty="0" smtClean="0">
+              <a:rPr lang="en-US" sz="2000" dirty="0">
                 <a:solidFill>
                   <a:schemeClr val="bg1">
                     <a:lumMod val="95000"/>
@@ -5460,7 +5501,7 @@
               <a:t>| </a:t>
             </a:r>
             <a:r>
-              <a:rPr lang="en-US" sz="2000" dirty="0" smtClean="0">
+              <a:rPr lang="en-US" sz="2000" dirty="0">
                 <a:solidFill>
                   <a:srgbClr val="28C22F"/>
                 </a:solidFill>
@@ -5561,13 +5602,6 @@
   <p:clrMapOvr>
     <a:masterClrMapping/>
   </p:clrMapOvr>
-  <p:timing>
-    <p:tnLst>
-      <p:par>
-        <p:cTn id="1" dur="indefinite" restart="never" nodeType="tmRoot"/>
-      </p:par>
-    </p:tnLst>
-  </p:timing>
 </p:sld>
 </file>
 
@@ -5723,7 +5757,7 @@
           <a:lstStyle/>
           <a:p>
             <a:r>
-              <a:rPr lang="en-US" dirty="0" smtClean="0">
+              <a:rPr lang="en-US" dirty="0">
                 <a:solidFill>
                   <a:schemeClr val="tx1">
                     <a:lumMod val="75000"/>
@@ -5766,7 +5800,7 @@
           <a:lstStyle/>
           <a:p>
             <a:r>
-              <a:rPr lang="en-US" dirty="0" smtClean="0">
+              <a:rPr lang="en-US" dirty="0">
                 <a:solidFill>
                   <a:schemeClr val="accent3">
                     <a:lumMod val="50000"/>
@@ -5807,7 +5841,7 @@
           <a:lstStyle/>
           <a:p>
             <a:r>
-              <a:rPr lang="en-US" dirty="0" smtClean="0">
+              <a:rPr lang="en-US" dirty="0">
                 <a:solidFill>
                   <a:schemeClr val="tx1">
                     <a:lumMod val="75000"/>
@@ -5843,7 +5877,7 @@
           <a:lstStyle/>
           <a:p>
             <a:r>
-              <a:rPr lang="en-US" dirty="0" smtClean="0">
+              <a:rPr lang="en-US" dirty="0">
                 <a:solidFill>
                   <a:schemeClr val="tx1">
                     <a:lumMod val="75000"/>
@@ -5932,7 +5966,7 @@
           <a:p>
             <a:pPr algn="l"/>
             <a:r>
-              <a:rPr lang="en-CA" sz="3200" dirty="0" smtClean="0">
+              <a:rPr lang="en-CA" sz="3200" dirty="0">
                 <a:solidFill>
                   <a:schemeClr val="bg1"/>
                 </a:solidFill>
@@ -5941,13 +5975,6 @@
               </a:rPr>
               <a:t>Questions</a:t>
             </a:r>
-            <a:endParaRPr lang="en-CA" sz="3200" dirty="0">
-              <a:solidFill>
-                <a:schemeClr val="bg1"/>
-              </a:solidFill>
-              <a:latin typeface="Calibri Light" panose="020F0302020204030204" pitchFamily="34" charset="0"/>
-              <a:cs typeface="Calibri Light" panose="020F0302020204030204" pitchFamily="34" charset="0"/>
-            </a:endParaRPr>
           </a:p>
         </p:txBody>
       </p:sp>
@@ -5974,7 +6001,7 @@
           <a:lstStyle/>
           <a:p>
             <a:r>
-              <a:rPr lang="en-US" sz="28700" dirty="0" smtClean="0">
+              <a:rPr lang="en-US" sz="28700" dirty="0">
                 <a:solidFill>
                   <a:schemeClr val="tx1">
                     <a:lumMod val="95000"/>
@@ -6005,13 +6032,6 @@
   <p:clrMapOvr>
     <a:masterClrMapping/>
   </p:clrMapOvr>
-  <p:timing>
-    <p:tnLst>
-      <p:par>
-        <p:cTn id="1" dur="indefinite" restart="never" nodeType="tmRoot"/>
-      </p:par>
-    </p:tnLst>
-  </p:timing>
 </p:sld>
 </file>
 
@@ -6167,7 +6187,7 @@
           <a:lstStyle/>
           <a:p>
             <a:r>
-              <a:rPr lang="en-US" dirty="0" smtClean="0">
+              <a:rPr lang="en-US" dirty="0">
                 <a:solidFill>
                   <a:schemeClr val="tx1">
                     <a:lumMod val="75000"/>
@@ -6210,7 +6230,7 @@
           <a:lstStyle/>
           <a:p>
             <a:r>
-              <a:rPr lang="en-US" dirty="0" smtClean="0">
+              <a:rPr lang="en-US" dirty="0">
                 <a:solidFill>
                   <a:schemeClr val="accent3">
                     <a:lumMod val="50000"/>
@@ -6220,7 +6240,7 @@
               <a:t>##</a:t>
             </a:r>
             <a:r>
-              <a:rPr lang="en-US" dirty="0" smtClean="0">
+              <a:rPr lang="en-US" dirty="0">
                 <a:solidFill>
                   <a:schemeClr val="tx1">
                     <a:lumMod val="75000"/>
@@ -6256,7 +6276,7 @@
           <a:lstStyle/>
           <a:p>
             <a:r>
-              <a:rPr lang="en-US" dirty="0" smtClean="0">
+              <a:rPr lang="en-US" dirty="0">
                 <a:solidFill>
                   <a:schemeClr val="tx1">
                     <a:lumMod val="75000"/>
@@ -6292,7 +6312,7 @@
           <a:lstStyle/>
           <a:p>
             <a:r>
-              <a:rPr lang="en-US" dirty="0" smtClean="0">
+              <a:rPr lang="en-US" dirty="0">
                 <a:solidFill>
                   <a:schemeClr val="tx1">
                     <a:lumMod val="75000"/>
@@ -6381,7 +6401,7 @@
           <a:p>
             <a:pPr algn="l"/>
             <a:r>
-              <a:rPr lang="en-CA" sz="3200" dirty="0" smtClean="0">
+              <a:rPr lang="en-CA" sz="3200" dirty="0">
                 <a:solidFill>
                   <a:schemeClr val="bg1"/>
                 </a:solidFill>
@@ -6390,13 +6410,6 @@
               </a:rPr>
               <a:t>Motivation</a:t>
             </a:r>
-            <a:endParaRPr lang="en-CA" sz="3200" dirty="0">
-              <a:solidFill>
-                <a:schemeClr val="bg1"/>
-              </a:solidFill>
-              <a:latin typeface="Calibri Light" panose="020F0302020204030204" pitchFamily="34" charset="0"/>
-              <a:cs typeface="Calibri Light" panose="020F0302020204030204" pitchFamily="34" charset="0"/>
-            </a:endParaRPr>
           </a:p>
         </p:txBody>
       </p:sp>
@@ -6463,13 +6476,6 @@
   <p:clrMapOvr>
     <a:masterClrMapping/>
   </p:clrMapOvr>
-  <p:timing>
-    <p:tnLst>
-      <p:par>
-        <p:cTn id="1" dur="indefinite" restart="never" nodeType="tmRoot"/>
-      </p:par>
-    </p:tnLst>
-  </p:timing>
 </p:sld>
 </file>
 
@@ -6625,7 +6631,7 @@
           <a:lstStyle/>
           <a:p>
             <a:r>
-              <a:rPr lang="en-US" dirty="0" smtClean="0">
+              <a:rPr lang="en-US" dirty="0">
                 <a:solidFill>
                   <a:schemeClr val="tx1">
                     <a:lumMod val="75000"/>
@@ -6668,7 +6674,7 @@
           <a:lstStyle/>
           <a:p>
             <a:r>
-              <a:rPr lang="en-US" dirty="0" smtClean="0">
+              <a:rPr lang="en-US" dirty="0">
                 <a:solidFill>
                   <a:schemeClr val="accent3">
                     <a:lumMod val="50000"/>
@@ -6678,7 +6684,7 @@
               <a:t>########</a:t>
             </a:r>
             <a:r>
-              <a:rPr lang="en-US" dirty="0" smtClean="0">
+              <a:rPr lang="en-US" dirty="0">
                 <a:solidFill>
                   <a:schemeClr val="tx1">
                     <a:lumMod val="75000"/>
@@ -6714,7 +6720,7 @@
           <a:lstStyle/>
           <a:p>
             <a:r>
-              <a:rPr lang="en-US" dirty="0" smtClean="0">
+              <a:rPr lang="en-US" dirty="0">
                 <a:solidFill>
                   <a:schemeClr val="tx1">
                     <a:lumMod val="75000"/>
@@ -6750,7 +6756,7 @@
           <a:lstStyle/>
           <a:p>
             <a:r>
-              <a:rPr lang="en-US" dirty="0" smtClean="0">
+              <a:rPr lang="en-US" dirty="0">
                 <a:solidFill>
                   <a:schemeClr val="tx1">
                     <a:lumMod val="75000"/>
@@ -6804,7 +6810,7 @@
           <a:p>
             <a:pPr algn="l"/>
             <a:r>
-              <a:rPr lang="en-CA" sz="3200" dirty="0" smtClean="0">
+              <a:rPr lang="en-CA" sz="3200" dirty="0">
                 <a:solidFill>
                   <a:schemeClr val="bg1"/>
                 </a:solidFill>
@@ -6813,13 +6819,6 @@
               </a:rPr>
               <a:t>Purpose and Scope</a:t>
             </a:r>
-            <a:endParaRPr lang="en-CA" sz="3200" dirty="0">
-              <a:solidFill>
-                <a:schemeClr val="bg1"/>
-              </a:solidFill>
-              <a:latin typeface="Calibri Light" panose="020F0302020204030204" pitchFamily="34" charset="0"/>
-              <a:cs typeface="Calibri Light" panose="020F0302020204030204" pitchFamily="34" charset="0"/>
-            </a:endParaRPr>
           </a:p>
         </p:txBody>
       </p:sp>
@@ -6847,21 +6846,13 @@
           <a:p>
             <a:pPr algn="r"/>
             <a:r>
-              <a:rPr lang="en-US" dirty="0" smtClean="0">
+              <a:rPr lang="en-US" dirty="0">
                 <a:solidFill>
                   <a:srgbClr val="28C22F"/>
                 </a:solidFill>
               </a:rPr>
               <a:t>Purpose</a:t>
             </a:r>
-          </a:p>
-          <a:p>
-            <a:pPr algn="r"/>
-            <a:endParaRPr lang="en-US" dirty="0" smtClean="0">
-              <a:solidFill>
-                <a:srgbClr val="28C22F"/>
-              </a:solidFill>
-            </a:endParaRPr>
           </a:p>
           <a:p>
             <a:pPr algn="r"/>
@@ -6873,22 +6864,7 @@
           </a:p>
           <a:p>
             <a:pPr algn="r"/>
-            <a:r>
-              <a:rPr lang="en-US" dirty="0" smtClean="0">
-                <a:solidFill>
-                  <a:srgbClr val="28C22F"/>
-                </a:solidFill>
-              </a:rPr>
-              <a:t/>
-            </a:r>
-            <a:br>
-              <a:rPr lang="en-US" dirty="0" smtClean="0">
-                <a:solidFill>
-                  <a:srgbClr val="28C22F"/>
-                </a:solidFill>
-              </a:rPr>
-            </a:br>
-            <a:endParaRPr lang="en-US" dirty="0" smtClean="0">
+            <a:endParaRPr lang="en-US" dirty="0">
               <a:solidFill>
                 <a:srgbClr val="28C22F"/>
               </a:solidFill>
@@ -6896,7 +6872,14 @@
           </a:p>
           <a:p>
             <a:pPr algn="r"/>
-            <a:endParaRPr lang="en-US" sz="1200" dirty="0" smtClean="0">
+            <a:br>
+              <a:rPr lang="en-US" dirty="0">
+                <a:solidFill>
+                  <a:srgbClr val="28C22F"/>
+                </a:solidFill>
+              </a:rPr>
+            </a:br>
+            <a:endParaRPr lang="en-US" dirty="0">
               <a:solidFill>
                 <a:srgbClr val="28C22F"/>
               </a:solidFill>
@@ -6904,8 +6887,16 @@
           </a:p>
           <a:p>
             <a:pPr algn="r"/>
-            <a:r>
-              <a:rPr lang="en-US" dirty="0" smtClean="0">
+            <a:endParaRPr lang="en-US" sz="1200" dirty="0">
+              <a:solidFill>
+                <a:srgbClr val="28C22F"/>
+              </a:solidFill>
+            </a:endParaRPr>
+          </a:p>
+          <a:p>
+            <a:pPr algn="r"/>
+            <a:r>
+              <a:rPr lang="en-US" dirty="0">
                 <a:solidFill>
                   <a:srgbClr val="28C22F"/>
                 </a:solidFill>
@@ -6954,26 +6945,13 @@
               <a:buChar char="&gt;"/>
             </a:pPr>
             <a:r>
-              <a:rPr lang="en-US" dirty="0" smtClean="0">
+              <a:rPr lang="en-US" dirty="0">
                 <a:solidFill>
                   <a:schemeClr val="bg1"/>
                 </a:solidFill>
               </a:rPr>
-              <a:t>Develop an enhanced version of the original </a:t>
-            </a:r>
-            <a:r>
-              <a:rPr lang="en-US" dirty="0" smtClean="0">
-                <a:solidFill>
-                  <a:schemeClr val="bg1"/>
-                </a:solidFill>
-              </a:rPr>
-              <a:t>Rogue (1980)</a:t>
-            </a:r>
-            <a:endParaRPr lang="en-US" dirty="0" smtClean="0">
-              <a:solidFill>
-                <a:schemeClr val="bg1"/>
-              </a:solidFill>
-            </a:endParaRPr>
+              <a:t>Develop an enhanced version of the original Rogue (1980)</a:t>
+            </a:r>
           </a:p>
           <a:p>
             <a:pPr marL="742950" lvl="1" indent="-285750">
@@ -6988,7 +6966,7 @@
               <a:buChar char="&gt;"/>
             </a:pPr>
             <a:r>
-              <a:rPr lang="en-US" dirty="0" smtClean="0">
+              <a:rPr lang="en-US" dirty="0">
                 <a:solidFill>
                   <a:srgbClr val="00B0F0"/>
                 </a:solidFill>
@@ -6996,42 +6974,13 @@
               <a:t>Client:</a:t>
             </a:r>
             <a:r>
-              <a:rPr lang="en-US" dirty="0" smtClean="0">
+              <a:rPr lang="en-US" dirty="0">
                 <a:solidFill>
                   <a:schemeClr val="bg1"/>
                 </a:solidFill>
               </a:rPr>
-              <a:t> </a:t>
-            </a:r>
-            <a:r>
-              <a:rPr lang="en-US" dirty="0" smtClean="0">
-                <a:solidFill>
-                  <a:schemeClr val="bg1"/>
-                </a:solidFill>
-              </a:rPr>
-              <a:t>UI, Gameplay</a:t>
-            </a:r>
-            <a:r>
-              <a:rPr lang="en-US" dirty="0" smtClean="0">
-                <a:solidFill>
-                  <a:schemeClr val="bg1"/>
-                </a:solidFill>
-              </a:rPr>
-              <a:t>, </a:t>
-            </a:r>
-            <a:r>
-              <a:rPr lang="en-US" dirty="0" smtClean="0">
-                <a:solidFill>
-                  <a:schemeClr val="bg1"/>
-                </a:solidFill>
-              </a:rPr>
-              <a:t>and Performance</a:t>
-            </a:r>
-            <a:endParaRPr lang="en-US" dirty="0" smtClean="0">
-              <a:solidFill>
-                <a:schemeClr val="bg1"/>
-              </a:solidFill>
-            </a:endParaRPr>
+              <a:t> UI, Gameplay, and Performance</a:t>
+            </a:r>
           </a:p>
           <a:p>
             <a:pPr marL="742950" lvl="1" indent="-285750">
@@ -7046,7 +6995,7 @@
               <a:buChar char="&gt;"/>
             </a:pPr>
             <a:r>
-              <a:rPr lang="en-US" dirty="0" smtClean="0">
+              <a:rPr lang="en-US" dirty="0">
                 <a:solidFill>
                   <a:srgbClr val="00B0F0"/>
                 </a:solidFill>
@@ -7054,26 +7003,13 @@
               <a:t>Development: </a:t>
             </a:r>
             <a:r>
-              <a:rPr lang="en-US" dirty="0" smtClean="0">
+              <a:rPr lang="en-US" dirty="0">
                 <a:solidFill>
                   <a:schemeClr val="bg1"/>
                 </a:solidFill>
               </a:rPr>
-              <a:t>Design, Documentation, </a:t>
-            </a:r>
-            <a:r>
-              <a:rPr lang="en-US" dirty="0" smtClean="0">
-                <a:solidFill>
-                  <a:schemeClr val="bg1"/>
-                </a:solidFill>
-              </a:rPr>
-              <a:t>and Testing</a:t>
-            </a:r>
-            <a:endParaRPr lang="en-US" dirty="0" smtClean="0">
-              <a:solidFill>
-                <a:schemeClr val="bg1"/>
-              </a:solidFill>
-            </a:endParaRPr>
+              <a:t>Design, Documentation, and Testing</a:t>
+            </a:r>
           </a:p>
           <a:p>
             <a:pPr lvl="1">
@@ -7085,7 +7021,7 @@
               </a:buClr>
               <a:buSzPct val="80000"/>
             </a:pPr>
-            <a:endParaRPr lang="en-US" sz="1600" dirty="0" smtClean="0">
+            <a:endParaRPr lang="en-US" sz="1600" dirty="0">
               <a:solidFill>
                 <a:schemeClr val="bg1"/>
               </a:solidFill>
@@ -7104,42 +7040,13 @@
               <a:buChar char="&gt;"/>
             </a:pPr>
             <a:r>
-              <a:rPr lang="en-US" dirty="0" smtClean="0">
+              <a:rPr lang="en-US" dirty="0">
                 <a:solidFill>
                   <a:schemeClr val="bg1"/>
                 </a:solidFill>
               </a:rPr>
-              <a:t>Implement virtually </a:t>
-            </a:r>
-            <a:r>
-              <a:rPr lang="en-US" dirty="0" smtClean="0">
-                <a:solidFill>
-                  <a:schemeClr val="bg1"/>
-                </a:solidFill>
-              </a:rPr>
-              <a:t>all </a:t>
-            </a:r>
-            <a:r>
-              <a:rPr lang="en-US" dirty="0" smtClean="0">
-                <a:solidFill>
-                  <a:schemeClr val="bg1"/>
-                </a:solidFill>
-              </a:rPr>
-              <a:t>functionality </a:t>
-            </a:r>
-            <a:r>
-              <a:rPr lang="en-US" dirty="0" smtClean="0">
-                <a:solidFill>
-                  <a:schemeClr val="bg1"/>
-                </a:solidFill>
-              </a:rPr>
-              <a:t>present in the original version</a:t>
-            </a:r>
-            <a:endParaRPr lang="en-US" dirty="0" smtClean="0">
-              <a:solidFill>
-                <a:schemeClr val="bg1"/>
-              </a:solidFill>
-            </a:endParaRPr>
+              <a:t>Implement virtually all functionality present in the original version</a:t>
+            </a:r>
           </a:p>
           <a:p>
             <a:pPr marL="285750" indent="-285750">
@@ -7154,34 +7061,13 @@
               <a:buChar char="&gt;"/>
             </a:pPr>
             <a:r>
-              <a:rPr lang="en-US" dirty="0" smtClean="0">
+              <a:rPr lang="en-US" dirty="0">
                 <a:solidFill>
                   <a:schemeClr val="bg1"/>
                 </a:solidFill>
               </a:rPr>
-              <a:t>Faithful improvements over non-functional </a:t>
-            </a:r>
-            <a:r>
-              <a:rPr lang="en-US" dirty="0" smtClean="0">
-                <a:solidFill>
-                  <a:schemeClr val="bg1"/>
-                </a:solidFill>
-              </a:rPr>
-              <a:t>qualities such as learnability and </a:t>
-            </a:r>
-            <a:r>
-              <a:rPr lang="en-US" dirty="0" smtClean="0">
-                <a:solidFill>
-                  <a:schemeClr val="bg1"/>
-                </a:solidFill>
-              </a:rPr>
-              <a:t>aesthetics</a:t>
-            </a:r>
-            <a:endParaRPr lang="en-US" dirty="0" smtClean="0">
-              <a:solidFill>
-                <a:schemeClr val="bg1"/>
-              </a:solidFill>
-            </a:endParaRPr>
+              <a:t>Faithful improvements over non-functional qualities such as learnability and aesthetics</a:t>
+            </a:r>
           </a:p>
         </p:txBody>
       </p:sp>
@@ -7230,13 +7116,6 @@
   <p:clrMapOvr>
     <a:masterClrMapping/>
   </p:clrMapOvr>
-  <p:timing>
-    <p:tnLst>
-      <p:par>
-        <p:cTn id="1" dur="indefinite" restart="never" nodeType="tmRoot"/>
-      </p:par>
-    </p:tnLst>
-  </p:timing>
 </p:sld>
 </file>
 
@@ -7392,7 +7271,7 @@
           <a:lstStyle/>
           <a:p>
             <a:r>
-              <a:rPr lang="en-US" dirty="0" smtClean="0">
+              <a:rPr lang="en-US" dirty="0">
                 <a:solidFill>
                   <a:schemeClr val="tx1">
                     <a:lumMod val="75000"/>
@@ -7435,7 +7314,7 @@
           <a:lstStyle/>
           <a:p>
             <a:r>
-              <a:rPr lang="en-US" dirty="0" smtClean="0">
+              <a:rPr lang="en-US" dirty="0">
                 <a:solidFill>
                   <a:schemeClr val="accent3">
                     <a:lumMod val="50000"/>
@@ -7445,7 +7324,7 @@
               <a:t>###################################</a:t>
             </a:r>
             <a:r>
-              <a:rPr lang="en-US" dirty="0" smtClean="0">
+              <a:rPr lang="en-US" dirty="0">
                 <a:solidFill>
                   <a:schemeClr val="tx1">
                     <a:lumMod val="75000"/>
@@ -7481,7 +7360,7 @@
           <a:lstStyle/>
           <a:p>
             <a:r>
-              <a:rPr lang="en-US" dirty="0" smtClean="0">
+              <a:rPr lang="en-US" dirty="0">
                 <a:solidFill>
                   <a:schemeClr val="tx1">
                     <a:lumMod val="75000"/>
@@ -7517,7 +7396,7 @@
           <a:lstStyle/>
           <a:p>
             <a:r>
-              <a:rPr lang="en-US" dirty="0" smtClean="0">
+              <a:rPr lang="en-US" dirty="0">
                 <a:solidFill>
                   <a:schemeClr val="tx1">
                     <a:lumMod val="75000"/>
@@ -7606,7 +7485,7 @@
           <a:p>
             <a:pPr algn="l"/>
             <a:r>
-              <a:rPr lang="en-CA" sz="3200" dirty="0" smtClean="0">
+              <a:rPr lang="en-CA" sz="3200" dirty="0">
                 <a:solidFill>
                   <a:schemeClr val="bg1"/>
                 </a:solidFill>
@@ -7615,13 +7494,6 @@
               </a:rPr>
               <a:t>Development</a:t>
             </a:r>
-            <a:endParaRPr lang="en-CA" sz="3200" dirty="0">
-              <a:solidFill>
-                <a:schemeClr val="bg1"/>
-              </a:solidFill>
-              <a:latin typeface="Calibri Light" panose="020F0302020204030204" pitchFamily="34" charset="0"/>
-              <a:cs typeface="Calibri Light" panose="020F0302020204030204" pitchFamily="34" charset="0"/>
-            </a:endParaRPr>
           </a:p>
         </p:txBody>
       </p:sp>
@@ -7649,18 +7521,13 @@
           <a:p>
             <a:pPr algn="r"/>
             <a:r>
-              <a:rPr lang="en-US" dirty="0" smtClean="0">
+              <a:rPr lang="en-US" dirty="0">
                 <a:solidFill>
                   <a:srgbClr val="28C22F"/>
                 </a:solidFill>
               </a:rPr>
               <a:t>Strategy</a:t>
             </a:r>
-            <a:endParaRPr lang="en-US" dirty="0" smtClean="0">
-              <a:solidFill>
-                <a:srgbClr val="28C22F"/>
-              </a:solidFill>
-            </a:endParaRPr>
           </a:p>
         </p:txBody>
       </p:sp>
@@ -7698,7 +7565,7 @@
               <a:buChar char="&gt;"/>
             </a:pPr>
             <a:r>
-              <a:rPr lang="en-US" dirty="0" smtClean="0">
+              <a:rPr lang="en-US" dirty="0">
                 <a:solidFill>
                   <a:srgbClr val="00B0F0"/>
                 </a:solidFill>
@@ -7706,7 +7573,7 @@
               <a:t>Communication: </a:t>
             </a:r>
             <a:r>
-              <a:rPr lang="en-US" dirty="0" smtClean="0">
+              <a:rPr lang="en-US" dirty="0">
                 <a:solidFill>
                   <a:schemeClr val="bg1"/>
                 </a:solidFill>
@@ -7727,7 +7594,7 @@
               <a:buChar char="&gt;"/>
             </a:pPr>
             <a:r>
-              <a:rPr lang="en-US" dirty="0" smtClean="0">
+              <a:rPr lang="en-US" dirty="0">
                 <a:solidFill>
                   <a:srgbClr val="00B0F0"/>
                 </a:solidFill>
@@ -7740,21 +7607,8 @@
                   <a:schemeClr val="bg1"/>
                 </a:solidFill>
               </a:rPr>
-              <a:t>Avoid </a:t>
-            </a:r>
-            <a:r>
-              <a:rPr lang="en-US" dirty="0" smtClean="0">
-                <a:solidFill>
-                  <a:schemeClr val="bg1"/>
-                </a:solidFill>
-              </a:rPr>
-              <a:t>unnecessary constraints</a:t>
-            </a:r>
-            <a:endParaRPr lang="en-US" dirty="0" smtClean="0">
-              <a:solidFill>
-                <a:schemeClr val="bg1"/>
-              </a:solidFill>
-            </a:endParaRPr>
+              <a:t>Avoid unnecessary constraints</a:t>
+            </a:r>
           </a:p>
           <a:p>
             <a:pPr marL="285750" indent="-285750">
@@ -7769,7 +7623,7 @@
               <a:buChar char="&gt;"/>
             </a:pPr>
             <a:r>
-              <a:rPr lang="en-US" dirty="0" smtClean="0">
+              <a:rPr lang="en-US" dirty="0">
                 <a:solidFill>
                   <a:srgbClr val="00B0F0"/>
                 </a:solidFill>
@@ -7777,26 +7631,13 @@
               <a:t>Authenticity: </a:t>
             </a:r>
             <a:r>
-              <a:rPr lang="en-US" dirty="0" smtClean="0">
+              <a:rPr lang="en-US" dirty="0">
                 <a:solidFill>
                   <a:schemeClr val="bg1"/>
                 </a:solidFill>
               </a:rPr>
-              <a:t>Reference </a:t>
-            </a:r>
-            <a:r>
-              <a:rPr lang="en-US" dirty="0">
-                <a:solidFill>
-                  <a:schemeClr val="bg1"/>
-                </a:solidFill>
-              </a:rPr>
-              <a:t>the original source code when possible</a:t>
-            </a:r>
-            <a:endParaRPr lang="en-US" dirty="0" smtClean="0">
-              <a:solidFill>
-                <a:schemeClr val="bg1"/>
-              </a:solidFill>
-            </a:endParaRPr>
+              <a:t>Reference the original source code when possible</a:t>
+            </a:r>
           </a:p>
         </p:txBody>
       </p:sp>
@@ -7873,13 +7714,6 @@
   <p:clrMapOvr>
     <a:masterClrMapping/>
   </p:clrMapOvr>
-  <p:timing>
-    <p:tnLst>
-      <p:par>
-        <p:cTn id="1" dur="indefinite" restart="never" nodeType="tmRoot"/>
-      </p:par>
-    </p:tnLst>
-  </p:timing>
 </p:sld>
 </file>
 
@@ -8035,7 +7869,7 @@
           <a:lstStyle/>
           <a:p>
             <a:r>
-              <a:rPr lang="en-US" dirty="0" smtClean="0">
+              <a:rPr lang="en-US" dirty="0">
                 <a:solidFill>
                   <a:schemeClr val="tx1">
                     <a:lumMod val="75000"/>
@@ -8124,7 +7958,7 @@
           <a:lstStyle/>
           <a:p>
             <a:r>
-              <a:rPr lang="en-US" dirty="0" smtClean="0">
+              <a:rPr lang="en-US" dirty="0">
                 <a:solidFill>
                   <a:schemeClr val="tx1">
                     <a:lumMod val="75000"/>
@@ -8160,7 +7994,7 @@
           <a:lstStyle/>
           <a:p>
             <a:r>
-              <a:rPr lang="en-US" dirty="0" smtClean="0">
+              <a:rPr lang="en-US" dirty="0">
                 <a:solidFill>
                   <a:schemeClr val="tx1">
                     <a:lumMod val="75000"/>
@@ -8249,7 +8083,7 @@
           <a:p>
             <a:pPr algn="l"/>
             <a:r>
-              <a:rPr lang="en-CA" sz="3200" dirty="0" smtClean="0">
+              <a:rPr lang="en-CA" sz="3200" dirty="0">
                 <a:solidFill>
                   <a:schemeClr val="bg1"/>
                 </a:solidFill>
@@ -8258,13 +8092,6 @@
               </a:rPr>
               <a:t>Coding Technologies</a:t>
             </a:r>
-            <a:endParaRPr lang="en-CA" sz="3200" dirty="0">
-              <a:solidFill>
-                <a:schemeClr val="bg1"/>
-              </a:solidFill>
-              <a:latin typeface="Calibri Light" panose="020F0302020204030204" pitchFamily="34" charset="0"/>
-              <a:cs typeface="Calibri Light" panose="020F0302020204030204" pitchFamily="34" charset="0"/>
-            </a:endParaRPr>
           </a:p>
         </p:txBody>
       </p:sp>
@@ -8292,18 +8119,13 @@
           <a:p>
             <a:pPr algn="r"/>
             <a:r>
-              <a:rPr lang="en-US" dirty="0" smtClean="0">
+              <a:rPr lang="en-US" dirty="0">
                 <a:solidFill>
                   <a:srgbClr val="28C22F"/>
                 </a:solidFill>
               </a:rPr>
               <a:t>C++</a:t>
             </a:r>
-            <a:endParaRPr lang="en-US" dirty="0" smtClean="0">
-              <a:solidFill>
-                <a:srgbClr val="28C22F"/>
-              </a:solidFill>
-            </a:endParaRPr>
           </a:p>
         </p:txBody>
       </p:sp>
@@ -8346,18 +8168,10 @@
                   <a:schemeClr val="bg1"/>
                 </a:solidFill>
               </a:rPr>
-              <a:t>E</a:t>
-            </a:r>
-            <a:r>
-              <a:rPr lang="en-US" dirty="0" smtClean="0">
-                <a:solidFill>
-                  <a:schemeClr val="bg1"/>
-                </a:solidFill>
-              </a:rPr>
-              <a:t>fficient, object-oriented, and industry standard (</a:t>
-            </a:r>
-            <a:r>
-              <a:rPr lang="en-US" dirty="0" smtClean="0">
+              <a:t>Efficient, object-oriented, and industry standard (</a:t>
+            </a:r>
+            <a:r>
+              <a:rPr lang="en-US" dirty="0">
                 <a:solidFill>
                   <a:srgbClr val="00B0F0"/>
                 </a:solidFill>
@@ -8365,7 +8179,7 @@
               <a:t>8000+</a:t>
             </a:r>
             <a:r>
-              <a:rPr lang="en-US" dirty="0" smtClean="0">
+              <a:rPr lang="en-US" dirty="0">
                 <a:solidFill>
                   <a:schemeClr val="bg1"/>
                 </a:solidFill>
@@ -8404,7 +8218,7 @@
               <a:buChar char="&gt;"/>
             </a:pPr>
             <a:r>
-              <a:rPr lang="en-US" dirty="0" smtClean="0">
+              <a:rPr lang="en-US" dirty="0">
                 <a:solidFill>
                   <a:schemeClr val="bg1"/>
                 </a:solidFill>
@@ -8422,7 +8236,7 @@
               </a:buClr>
               <a:buSzPct val="80000"/>
             </a:pPr>
-            <a:endParaRPr lang="en-US" sz="1600" dirty="0" smtClean="0">
+            <a:endParaRPr lang="en-US" sz="1600" dirty="0">
               <a:solidFill>
                 <a:schemeClr val="bg1"/>
               </a:solidFill>
@@ -8438,18 +8252,13 @@
               <a:buChar char="&gt;"/>
             </a:pPr>
             <a:r>
-              <a:rPr lang="en-US" dirty="0" smtClean="0">
+              <a:rPr lang="en-US" dirty="0">
                 <a:solidFill>
                   <a:schemeClr val="bg1"/>
                 </a:solidFill>
               </a:rPr>
               <a:t>CI (Continuous Integration)</a:t>
             </a:r>
-            <a:endParaRPr lang="en-US" dirty="0">
-              <a:solidFill>
-                <a:schemeClr val="bg1"/>
-              </a:solidFill>
-            </a:endParaRPr>
           </a:p>
           <a:p>
             <a:pPr>
@@ -8459,7 +8268,7 @@
               <a:buSzPct val="80000"/>
             </a:pPr>
             <a:r>
-              <a:rPr lang="en-US" dirty="0" smtClean="0">
+              <a:rPr lang="en-US" dirty="0">
                 <a:solidFill>
                   <a:schemeClr val="bg1"/>
                 </a:solidFill>
@@ -8467,14 +8276,14 @@
               <a:t>     </a:t>
             </a:r>
             <a:r>
-              <a:rPr lang="en-US" dirty="0" err="1" smtClean="0">
+              <a:rPr lang="en-US" dirty="0" err="1">
                 <a:solidFill>
                   <a:schemeClr val="bg1"/>
                 </a:solidFill>
               </a:rPr>
               <a:t>Git</a:t>
             </a:r>
-            <a:endParaRPr lang="en-US" dirty="0" smtClean="0">
+            <a:endParaRPr lang="en-US" dirty="0">
               <a:solidFill>
                 <a:schemeClr val="bg1"/>
               </a:solidFill>
@@ -8493,21 +8302,8 @@
                   <a:schemeClr val="bg1"/>
                 </a:solidFill>
               </a:rPr>
-              <a:t> </a:t>
-            </a:r>
-            <a:r>
-              <a:rPr lang="en-US" dirty="0" smtClean="0">
-                <a:solidFill>
-                  <a:schemeClr val="bg1"/>
-                </a:solidFill>
-              </a:rPr>
-              <a:t>    GDB (GNU Debugger)</a:t>
-            </a:r>
-            <a:endParaRPr lang="en-US" dirty="0" smtClean="0">
-              <a:solidFill>
-                <a:schemeClr val="bg1"/>
-              </a:solidFill>
-            </a:endParaRPr>
+              <a:t>     GDB (GNU Debugger)</a:t>
+            </a:r>
           </a:p>
           <a:p>
             <a:pPr>
@@ -8517,7 +8313,7 @@
               <a:buSzPct val="80000"/>
             </a:pPr>
             <a:r>
-              <a:rPr lang="en-US" dirty="0" smtClean="0">
+              <a:rPr lang="en-US" dirty="0">
                 <a:solidFill>
                   <a:schemeClr val="bg1"/>
                 </a:solidFill>
@@ -8538,18 +8334,10 @@
                   <a:schemeClr val="bg1"/>
                 </a:solidFill>
               </a:rPr>
-              <a:t> </a:t>
-            </a:r>
-            <a:r>
-              <a:rPr lang="en-US" dirty="0" smtClean="0">
-                <a:solidFill>
-                  <a:schemeClr val="bg1"/>
-                </a:solidFill>
-              </a:rPr>
-              <a:t>    </a:t>
-            </a:r>
-            <a:r>
-              <a:rPr lang="en-US" dirty="0" err="1" smtClean="0">
+              <a:t>     </a:t>
+            </a:r>
+            <a:r>
+              <a:rPr lang="en-US" dirty="0" err="1">
                 <a:solidFill>
                   <a:schemeClr val="bg1"/>
                 </a:solidFill>
@@ -8557,7 +8345,7 @@
               <a:t>Valgrind</a:t>
             </a:r>
             <a:r>
-              <a:rPr lang="en-US" dirty="0" smtClean="0">
+              <a:rPr lang="en-US" dirty="0">
                 <a:solidFill>
                   <a:schemeClr val="bg1"/>
                 </a:solidFill>
@@ -8591,14 +8379,14 @@
           <a:p>
             <a:pPr algn="r"/>
             <a:r>
-              <a:rPr lang="en-US" dirty="0" err="1" smtClean="0">
+              <a:rPr lang="en-US" dirty="0" err="1">
                 <a:solidFill>
                   <a:srgbClr val="28C22F"/>
                 </a:solidFill>
               </a:rPr>
               <a:t>Libtcod</a:t>
             </a:r>
-            <a:endParaRPr lang="en-US" dirty="0" smtClean="0">
+            <a:endParaRPr lang="en-US" dirty="0">
               <a:solidFill>
                 <a:srgbClr val="28C22F"/>
               </a:solidFill>
@@ -8630,18 +8418,13 @@
           <a:p>
             <a:pPr algn="r"/>
             <a:r>
-              <a:rPr lang="en-US" dirty="0" smtClean="0">
+              <a:rPr lang="en-US" dirty="0">
                 <a:solidFill>
                   <a:srgbClr val="28C22F"/>
                 </a:solidFill>
               </a:rPr>
               <a:t>Other</a:t>
             </a:r>
-            <a:endParaRPr lang="en-US" dirty="0" smtClean="0">
-              <a:solidFill>
-                <a:srgbClr val="28C22F"/>
-              </a:solidFill>
-            </a:endParaRPr>
           </a:p>
         </p:txBody>
       </p:sp>
@@ -8677,13 +8460,6 @@
   <p:clrMapOvr>
     <a:masterClrMapping/>
   </p:clrMapOvr>
-  <p:timing>
-    <p:tnLst>
-      <p:par>
-        <p:cTn id="1" dur="indefinite" restart="never" nodeType="tmRoot"/>
-      </p:par>
-    </p:tnLst>
-  </p:timing>
 </p:sld>
 </file>
 
@@ -8839,7 +8615,7 @@
           <a:lstStyle/>
           <a:p>
             <a:r>
-              <a:rPr lang="en-US" dirty="0" smtClean="0">
+              <a:rPr lang="en-US" dirty="0">
                 <a:solidFill>
                   <a:schemeClr val="tx1">
                     <a:lumMod val="75000"/>
@@ -8882,7 +8658,7 @@
           <a:lstStyle/>
           <a:p>
             <a:r>
-              <a:rPr lang="en-US" dirty="0" smtClean="0">
+              <a:rPr lang="en-US" dirty="0">
                 <a:solidFill>
                   <a:schemeClr val="accent3">
                     <a:lumMod val="50000"/>
@@ -8892,7 +8668,7 @@
               <a:t>##########################################################################</a:t>
             </a:r>
             <a:r>
-              <a:rPr lang="en-US" dirty="0" smtClean="0">
+              <a:rPr lang="en-US" dirty="0">
                 <a:solidFill>
                   <a:schemeClr val="tx1">
                     <a:lumMod val="75000"/>
@@ -8928,7 +8704,7 @@
           <a:lstStyle/>
           <a:p>
             <a:r>
-              <a:rPr lang="en-US" dirty="0" smtClean="0">
+              <a:rPr lang="en-US" dirty="0">
                 <a:solidFill>
                   <a:schemeClr val="tx1">
                     <a:lumMod val="75000"/>
@@ -8964,7 +8740,7 @@
           <a:lstStyle/>
           <a:p>
             <a:r>
-              <a:rPr lang="en-US" dirty="0" smtClean="0">
+              <a:rPr lang="en-US" dirty="0">
                 <a:solidFill>
                   <a:schemeClr val="tx1">
                     <a:lumMod val="75000"/>
@@ -9053,7 +8829,7 @@
           <a:p>
             <a:pPr algn="l"/>
             <a:r>
-              <a:rPr lang="en-CA" sz="3200" dirty="0" smtClean="0">
+              <a:rPr lang="en-CA" sz="3200" dirty="0">
                 <a:solidFill>
                   <a:schemeClr val="bg1"/>
                 </a:solidFill>
@@ -9062,71 +8838,200 @@
               </a:rPr>
               <a:t>Demonstration</a:t>
             </a:r>
-            <a:endParaRPr lang="en-CA" sz="3200" dirty="0">
-              <a:solidFill>
-                <a:schemeClr val="bg1"/>
-              </a:solidFill>
-              <a:latin typeface="Calibri Light" panose="020F0302020204030204" pitchFamily="34" charset="0"/>
-              <a:cs typeface="Calibri Light" panose="020F0302020204030204" pitchFamily="34" charset="0"/>
-            </a:endParaRPr>
-          </a:p>
-        </p:txBody>
-      </p:sp>
-      <p:sp>
-        <p:nvSpPr>
-          <p:cNvPr id="2" name="Rectangle 1"/>
-          <p:cNvSpPr/>
-          <p:nvPr/>
-        </p:nvSpPr>
-        <p:spPr>
-          <a:xfrm>
-            <a:off x="1447800" y="1504950"/>
-            <a:ext cx="6477000" cy="2819400"/>
+          </a:p>
+        </p:txBody>
+      </p:sp>
+      <p:pic>
+        <p:nvPicPr>
+          <p:cNvPr id="3" name="Picture 2"/>
+          <p:cNvPicPr>
+            <a:picLocks noChangeAspect="1"/>
+          </p:cNvPicPr>
+          <p:nvPr/>
+        </p:nvPicPr>
+        <p:blipFill>
+          <a:blip r:embed="rId3">
+            <a:extLst>
+              <a:ext uri="{28A0092B-C50C-407E-A947-70E740481C1C}">
+                <a14:useLocalDpi xmlns:a14="http://schemas.microsoft.com/office/drawing/2010/main" val="0"/>
+              </a:ext>
+            </a:extLst>
+          </a:blip>
+          <a:stretch>
+            <a:fillRect/>
+          </a:stretch>
+        </p:blipFill>
+        <p:spPr>
+          <a:xfrm>
+            <a:off x="507020" y="1256358"/>
+            <a:ext cx="3825307" cy="3059276"/>
           </a:xfrm>
           <a:prstGeom prst="rect">
             <a:avLst/>
           </a:prstGeom>
-          <a:solidFill>
-            <a:schemeClr val="tx1">
-              <a:lumMod val="85000"/>
-              <a:lumOff val="15000"/>
-            </a:schemeClr>
-          </a:solidFill>
+        </p:spPr>
+      </p:pic>
+      <p:pic>
+        <p:nvPicPr>
+          <p:cNvPr id="5" name="Picture 4"/>
+          <p:cNvPicPr>
+            <a:picLocks noChangeAspect="1"/>
+          </p:cNvPicPr>
+          <p:nvPr/>
+        </p:nvPicPr>
+        <p:blipFill>
+          <a:blip r:embed="rId4" cstate="print">
+            <a:extLst>
+              <a:ext uri="{28A0092B-C50C-407E-A947-70E740481C1C}">
+                <a14:useLocalDpi xmlns:a14="http://schemas.microsoft.com/office/drawing/2010/main" val="0"/>
+              </a:ext>
+            </a:extLst>
+          </a:blip>
+          <a:stretch>
+            <a:fillRect/>
+          </a:stretch>
+        </p:blipFill>
+        <p:spPr>
+          <a:xfrm>
+            <a:off x="4780188" y="645760"/>
+            <a:ext cx="3539117" cy="2186045"/>
+          </a:xfrm>
+          <a:prstGeom prst="rect">
+            <a:avLst/>
+          </a:prstGeom>
+        </p:spPr>
+      </p:pic>
+      <p:pic>
+        <p:nvPicPr>
+          <p:cNvPr id="7" name="Picture 6"/>
+          <p:cNvPicPr>
+            <a:picLocks noChangeAspect="1"/>
+          </p:cNvPicPr>
+          <p:nvPr/>
+        </p:nvPicPr>
+        <p:blipFill>
+          <a:blip r:embed="rId5">
+            <a:extLst>
+              <a:ext uri="{28A0092B-C50C-407E-A947-70E740481C1C}">
+                <a14:useLocalDpi xmlns:a14="http://schemas.microsoft.com/office/drawing/2010/main" val="0"/>
+              </a:ext>
+            </a:extLst>
+          </a:blip>
+          <a:stretch>
+            <a:fillRect/>
+          </a:stretch>
+        </p:blipFill>
+        <p:spPr>
+          <a:xfrm>
+            <a:off x="4534548" y="3028859"/>
+            <a:ext cx="4327040" cy="233894"/>
+          </a:xfrm>
+          <a:prstGeom prst="rect">
+            <a:avLst/>
+          </a:prstGeom>
+        </p:spPr>
+      </p:pic>
+      <p:pic>
+        <p:nvPicPr>
+          <p:cNvPr id="8" name="Picture 7"/>
+          <p:cNvPicPr>
+            <a:picLocks noChangeAspect="1"/>
+          </p:cNvPicPr>
+          <p:nvPr/>
+        </p:nvPicPr>
+        <p:blipFill>
+          <a:blip r:embed="rId6">
+            <a:extLst>
+              <a:ext uri="{28A0092B-C50C-407E-A947-70E740481C1C}">
+                <a14:useLocalDpi xmlns:a14="http://schemas.microsoft.com/office/drawing/2010/main" val="0"/>
+              </a:ext>
+            </a:extLst>
+          </a:blip>
+          <a:stretch>
+            <a:fillRect/>
+          </a:stretch>
+        </p:blipFill>
+        <p:spPr>
+          <a:xfrm>
+            <a:off x="4552758" y="3459807"/>
+            <a:ext cx="4304652" cy="231735"/>
+          </a:xfrm>
+          <a:prstGeom prst="rect">
+            <a:avLst/>
+          </a:prstGeom>
+        </p:spPr>
+      </p:pic>
+      <p:pic>
+        <p:nvPicPr>
+          <p:cNvPr id="9" name="Picture 8"/>
+          <p:cNvPicPr>
+            <a:picLocks noChangeAspect="1"/>
+          </p:cNvPicPr>
+          <p:nvPr/>
+        </p:nvPicPr>
+        <p:blipFill>
+          <a:blip r:embed="rId7">
+            <a:extLst>
+              <a:ext uri="{28A0092B-C50C-407E-A947-70E740481C1C}">
+                <a14:useLocalDpi xmlns:a14="http://schemas.microsoft.com/office/drawing/2010/main" val="0"/>
+              </a:ext>
+            </a:extLst>
+          </a:blip>
+          <a:stretch>
+            <a:fillRect/>
+          </a:stretch>
+        </p:blipFill>
+        <p:spPr>
+          <a:xfrm>
+            <a:off x="2194526" y="4556937"/>
+            <a:ext cx="6662884" cy="136141"/>
+          </a:xfrm>
+          <a:prstGeom prst="rect">
+            <a:avLst/>
+          </a:prstGeom>
+        </p:spPr>
+      </p:pic>
+      <p:pic>
+        <p:nvPicPr>
+          <p:cNvPr id="10" name="Picture 9"/>
+          <p:cNvPicPr>
+            <a:picLocks noChangeAspect="1"/>
+          </p:cNvPicPr>
+          <p:nvPr/>
+        </p:nvPicPr>
+        <p:blipFill>
+          <a:blip r:embed="rId8">
+            <a:extLst>
+              <a:ext uri="{28A0092B-C50C-407E-A947-70E740481C1C}">
+                <a14:useLocalDpi xmlns:a14="http://schemas.microsoft.com/office/drawing/2010/main" val="0"/>
+              </a:ext>
+            </a:extLst>
+          </a:blip>
+          <a:stretch>
+            <a:fillRect/>
+          </a:stretch>
+        </p:blipFill>
+        <p:spPr>
+          <a:xfrm>
+            <a:off x="5005343" y="3892594"/>
+            <a:ext cx="3858163" cy="466790"/>
+          </a:xfrm>
+          <a:prstGeom prst="rect">
+            <a:avLst/>
+          </a:prstGeom>
           <a:ln>
-            <a:solidFill>
-              <a:schemeClr val="tx1"/>
-            </a:solidFill>
+            <a:noFill/>
           </a:ln>
-        </p:spPr>
-        <p:style>
-          <a:lnRef idx="2">
-            <a:schemeClr val="accent1">
-              <a:shade val="50000"/>
-            </a:schemeClr>
-          </a:lnRef>
-          <a:fillRef idx="1">
-            <a:schemeClr val="accent1"/>
-          </a:fillRef>
-          <a:effectRef idx="0">
-            <a:schemeClr val="accent1"/>
-          </a:effectRef>
-          <a:fontRef idx="minor">
-            <a:schemeClr val="lt1"/>
-          </a:fontRef>
-        </p:style>
-        <p:txBody>
-          <a:bodyPr rtlCol="0" anchor="ctr"/>
-          <a:lstStyle/>
-          <a:p>
-            <a:pPr algn="ctr"/>
-            <a:r>
-              <a:rPr lang="en-US" dirty="0" smtClean="0"/>
-              <a:t>Please Put Cool Screenshots Here</a:t>
-            </a:r>
-            <a:endParaRPr lang="en-CA" dirty="0"/>
-          </a:p>
-        </p:txBody>
-      </p:sp>
+          <a:effectLst>
+            <a:outerShdw blurRad="292100" dist="139700" dir="2700000" algn="tl" rotWithShape="0">
+              <a:srgbClr val="333333">
+                <a:alpha val="65000"/>
+              </a:srgbClr>
+            </a:outerShdw>
+            <a:softEdge rad="12700"/>
+          </a:effectLst>
+        </p:spPr>
+      </p:pic>
     </p:spTree>
     <p:extLst>
       <p:ext uri="{BB962C8B-B14F-4D97-AF65-F5344CB8AC3E}">
@@ -9137,13 +9042,6 @@
   <p:clrMapOvr>
     <a:masterClrMapping/>
   </p:clrMapOvr>
-  <p:timing>
-    <p:tnLst>
-      <p:par>
-        <p:cTn id="1" dur="indefinite" restart="never" nodeType="tmRoot"/>
-      </p:par>
-    </p:tnLst>
-  </p:timing>
 </p:sld>
 </file>
 
@@ -9299,7 +9197,7 @@
           <a:lstStyle/>
           <a:p>
             <a:r>
-              <a:rPr lang="en-US" dirty="0" smtClean="0">
+              <a:rPr lang="en-US" dirty="0">
                 <a:solidFill>
                   <a:schemeClr val="tx1">
                     <a:lumMod val="75000"/>
@@ -9342,7 +9240,7 @@
           <a:lstStyle/>
           <a:p>
             <a:r>
-              <a:rPr lang="en-US" dirty="0" smtClean="0">
+              <a:rPr lang="en-US" dirty="0">
                 <a:solidFill>
                   <a:schemeClr val="accent3">
                     <a:lumMod val="50000"/>
@@ -9352,7 +9250,7 @@
               <a:t>#############################################################################</a:t>
             </a:r>
             <a:r>
-              <a:rPr lang="en-US" dirty="0" smtClean="0">
+              <a:rPr lang="en-US" dirty="0">
                 <a:solidFill>
                   <a:schemeClr val="tx1">
                     <a:lumMod val="75000"/>
@@ -9388,7 +9286,7 @@
           <a:lstStyle/>
           <a:p>
             <a:r>
-              <a:rPr lang="en-US" dirty="0" smtClean="0">
+              <a:rPr lang="en-US" dirty="0">
                 <a:solidFill>
                   <a:schemeClr val="tx1">
                     <a:lumMod val="75000"/>
@@ -9424,7 +9322,7 @@
           <a:lstStyle/>
           <a:p>
             <a:r>
-              <a:rPr lang="en-US" dirty="0" smtClean="0">
+              <a:rPr lang="en-US" dirty="0">
                 <a:solidFill>
                   <a:schemeClr val="tx1">
                     <a:lumMod val="75000"/>
@@ -9513,7 +9411,7 @@
           <a:p>
             <a:pPr algn="l"/>
             <a:r>
-              <a:rPr lang="en-CA" sz="3200" dirty="0" smtClean="0">
+              <a:rPr lang="en-CA" sz="3200" dirty="0">
                 <a:solidFill>
                   <a:schemeClr val="bg1"/>
                 </a:solidFill>
@@ -9523,7 +9421,7 @@
               <a:t>The R</a:t>
             </a:r>
             <a:r>
-              <a:rPr lang="en-CA" sz="3200" baseline="30000" dirty="0" smtClean="0">
+              <a:rPr lang="en-CA" sz="3200" baseline="30000" dirty="0">
                 <a:solidFill>
                   <a:schemeClr val="bg1"/>
                 </a:solidFill>
@@ -9533,7 +9431,7 @@
               <a:t>2</a:t>
             </a:r>
             <a:r>
-              <a:rPr lang="en-CA" sz="3200" dirty="0" smtClean="0">
+              <a:rPr lang="en-CA" sz="3200" dirty="0">
                 <a:solidFill>
                   <a:schemeClr val="bg1"/>
                 </a:solidFill>
@@ -9542,13 +9440,6 @@
               </a:rPr>
               <a:t> Touch</a:t>
             </a:r>
-            <a:endParaRPr lang="en-CA" sz="3200" dirty="0">
-              <a:solidFill>
-                <a:schemeClr val="bg1"/>
-              </a:solidFill>
-              <a:latin typeface="Calibri Light" panose="020F0302020204030204" pitchFamily="34" charset="0"/>
-              <a:cs typeface="Calibri Light" panose="020F0302020204030204" pitchFamily="34" charset="0"/>
-            </a:endParaRPr>
           </a:p>
         </p:txBody>
       </p:sp>
@@ -9576,18 +9467,13 @@
           <a:p>
             <a:pPr algn="r"/>
             <a:r>
-              <a:rPr lang="en-US" dirty="0" smtClean="0">
+              <a:rPr lang="en-US" dirty="0">
                 <a:solidFill>
                   <a:srgbClr val="28C22F"/>
                 </a:solidFill>
               </a:rPr>
               <a:t>Robustness</a:t>
             </a:r>
-            <a:endParaRPr lang="en-US" dirty="0" smtClean="0">
-              <a:solidFill>
-                <a:srgbClr val="28C22F"/>
-              </a:solidFill>
-            </a:endParaRPr>
           </a:p>
         </p:txBody>
       </p:sp>
@@ -9625,18 +9511,13 @@
               <a:buChar char="&gt;"/>
             </a:pPr>
             <a:r>
-              <a:rPr lang="en-US" dirty="0" smtClean="0">
+              <a:rPr lang="en-US" dirty="0">
                 <a:solidFill>
                   <a:schemeClr val="bg1"/>
                 </a:solidFill>
               </a:rPr>
               <a:t>Enabled CI to ensure dysfunctional code changes are flagged</a:t>
             </a:r>
-            <a:endParaRPr lang="en-US" dirty="0">
-              <a:solidFill>
-                <a:schemeClr val="bg1"/>
-              </a:solidFill>
-            </a:endParaRPr>
           </a:p>
           <a:p>
             <a:pPr marL="285750" indent="-285750">
@@ -9651,7 +9532,7 @@
               <a:buChar char="&gt;"/>
             </a:pPr>
             <a:r>
-              <a:rPr lang="en-US" dirty="0" smtClean="0">
+              <a:rPr lang="en-US" dirty="0">
                 <a:solidFill>
                   <a:schemeClr val="bg1"/>
                 </a:solidFill>
@@ -9672,18 +9553,13 @@
               <a:buChar char="&gt;"/>
             </a:pPr>
             <a:r>
-              <a:rPr lang="en-US" dirty="0" smtClean="0">
+              <a:rPr lang="en-US" dirty="0">
                 <a:solidFill>
                   <a:schemeClr val="bg1"/>
                 </a:solidFill>
               </a:rPr>
               <a:t>Used profiler tools to analyze memory leak performance</a:t>
             </a:r>
-            <a:endParaRPr lang="en-US" dirty="0" smtClean="0">
-              <a:solidFill>
-                <a:schemeClr val="bg1"/>
-              </a:solidFill>
-            </a:endParaRPr>
           </a:p>
           <a:p>
             <a:pPr marL="285750" indent="-285750">
@@ -9697,7 +9573,7 @@
               <a:buFont typeface="Calibri" panose="020F0502020204030204" pitchFamily="34" charset="0"/>
               <a:buChar char="&gt;"/>
             </a:pPr>
-            <a:endParaRPr lang="en-US" sz="1600" dirty="0" smtClean="0">
+            <a:endParaRPr lang="en-US" sz="1600" dirty="0">
               <a:solidFill>
                 <a:schemeClr val="bg1"/>
               </a:solidFill>
@@ -9802,13 +9678,6 @@
   <p:clrMapOvr>
     <a:masterClrMapping/>
   </p:clrMapOvr>
-  <p:timing>
-    <p:tnLst>
-      <p:par>
-        <p:cTn id="1" dur="indefinite" restart="never" nodeType="tmRoot"/>
-      </p:par>
-    </p:tnLst>
-  </p:timing>
 </p:sld>
 </file>
 
@@ -9972,7 +9841,7 @@
           <a:lstStyle/>
           <a:p>
             <a:r>
-              <a:rPr lang="en-US" dirty="0" smtClean="0">
+              <a:rPr lang="en-US" dirty="0">
                 <a:solidFill>
                   <a:schemeClr val="tx1">
                     <a:lumMod val="75000"/>
@@ -10015,7 +9884,7 @@
           <a:lstStyle/>
           <a:p>
             <a:r>
-              <a:rPr lang="en-US" dirty="0" smtClean="0">
+              <a:rPr lang="en-US" dirty="0">
                 <a:solidFill>
                   <a:schemeClr val="accent3">
                     <a:lumMod val="50000"/>
@@ -10025,7 +9894,7 @@
               <a:t>#############################################################################</a:t>
             </a:r>
             <a:r>
-              <a:rPr lang="en-US" dirty="0" smtClean="0">
+              <a:rPr lang="en-US" dirty="0">
                 <a:solidFill>
                   <a:schemeClr val="tx1">
                     <a:lumMod val="75000"/>
@@ -10061,7 +9930,7 @@
           <a:lstStyle/>
           <a:p>
             <a:r>
-              <a:rPr lang="en-US" dirty="0" smtClean="0">
+              <a:rPr lang="en-US" dirty="0">
                 <a:solidFill>
                   <a:schemeClr val="tx1">
                     <a:lumMod val="75000"/>
@@ -10097,7 +9966,7 @@
           <a:lstStyle/>
           <a:p>
             <a:r>
-              <a:rPr lang="en-US" dirty="0" smtClean="0">
+              <a:rPr lang="en-US" dirty="0">
                 <a:solidFill>
                   <a:schemeClr val="tx1">
                     <a:lumMod val="75000"/>
@@ -10186,7 +10055,7 @@
           <a:p>
             <a:pPr algn="l"/>
             <a:r>
-              <a:rPr lang="en-CA" sz="3200" dirty="0" smtClean="0">
+              <a:rPr lang="en-CA" sz="3200" dirty="0">
                 <a:solidFill>
                   <a:schemeClr val="bg1"/>
                 </a:solidFill>
@@ -10196,7 +10065,7 @@
               <a:t>The R</a:t>
             </a:r>
             <a:r>
-              <a:rPr lang="en-CA" sz="3200" baseline="30000" dirty="0" smtClean="0">
+              <a:rPr lang="en-CA" sz="3200" baseline="30000" dirty="0">
                 <a:solidFill>
                   <a:schemeClr val="bg1"/>
                 </a:solidFill>
@@ -10206,7 +10075,7 @@
               <a:t>2</a:t>
             </a:r>
             <a:r>
-              <a:rPr lang="en-CA" sz="3200" dirty="0" smtClean="0">
+              <a:rPr lang="en-CA" sz="3200" dirty="0">
                 <a:solidFill>
                   <a:schemeClr val="bg1"/>
                 </a:solidFill>
@@ -10215,13 +10084,6 @@
               </a:rPr>
               <a:t> Touch Cont’d</a:t>
             </a:r>
-            <a:endParaRPr lang="en-CA" sz="3200" dirty="0">
-              <a:solidFill>
-                <a:schemeClr val="bg1"/>
-              </a:solidFill>
-              <a:latin typeface="Calibri Light" panose="020F0302020204030204" pitchFamily="34" charset="0"/>
-              <a:cs typeface="Calibri Light" panose="020F0302020204030204" pitchFamily="34" charset="0"/>
-            </a:endParaRPr>
           </a:p>
         </p:txBody>
       </p:sp>
@@ -10259,34 +10121,13 @@
               <a:buChar char="&gt;"/>
             </a:pPr>
             <a:r>
-              <a:rPr lang="en-US" dirty="0" smtClean="0">
+              <a:rPr lang="en-US" dirty="0">
                 <a:solidFill>
                   <a:schemeClr val="bg1"/>
                 </a:solidFill>
               </a:rPr>
-              <a:t>Designed </a:t>
-            </a:r>
-            <a:r>
-              <a:rPr lang="en-US" dirty="0">
-                <a:solidFill>
-                  <a:schemeClr val="bg1"/>
-                </a:solidFill>
-              </a:rPr>
-              <a:t>h</a:t>
-            </a:r>
-            <a:r>
-              <a:rPr lang="en-US" dirty="0" smtClean="0">
-                <a:solidFill>
-                  <a:schemeClr val="bg1"/>
-                </a:solidFill>
-              </a:rPr>
-              <a:t>eader files to hide implementation secrets</a:t>
-            </a:r>
-            <a:endParaRPr lang="en-US" dirty="0">
-              <a:solidFill>
-                <a:schemeClr val="bg1"/>
-              </a:solidFill>
-            </a:endParaRPr>
+              <a:t>Designed header files to hide implementation secrets</a:t>
+            </a:r>
           </a:p>
           <a:p>
             <a:pPr marL="285750" indent="-285750">
@@ -10301,7 +10142,7 @@
               <a:buChar char="&gt;"/>
             </a:pPr>
             <a:r>
-              <a:rPr lang="en-US" dirty="0" smtClean="0">
+              <a:rPr lang="en-US" dirty="0">
                 <a:solidFill>
                   <a:schemeClr val="bg1"/>
                 </a:solidFill>
@@ -10322,18 +10163,13 @@
               <a:buChar char="&gt;"/>
             </a:pPr>
             <a:r>
-              <a:rPr lang="en-US" dirty="0" smtClean="0">
+              <a:rPr lang="en-US" dirty="0">
                 <a:solidFill>
                   <a:schemeClr val="bg1"/>
                 </a:solidFill>
               </a:rPr>
               <a:t>Used GitLab issue tracking to document bugs and known issues</a:t>
             </a:r>
-            <a:endParaRPr lang="en-US" dirty="0" smtClean="0">
-              <a:solidFill>
-                <a:schemeClr val="bg1"/>
-              </a:solidFill>
-            </a:endParaRPr>
           </a:p>
         </p:txBody>
       </p:sp>
@@ -10361,18 +10197,13 @@
           <a:p>
             <a:pPr algn="r"/>
             <a:r>
-              <a:rPr lang="en-US" dirty="0" smtClean="0">
+              <a:rPr lang="en-US" dirty="0">
                 <a:solidFill>
                   <a:srgbClr val="28C22F"/>
                 </a:solidFill>
               </a:rPr>
               <a:t>Maintainability</a:t>
             </a:r>
-            <a:endParaRPr lang="en-US" dirty="0" smtClean="0">
-              <a:solidFill>
-                <a:srgbClr val="28C22F"/>
-              </a:solidFill>
-            </a:endParaRPr>
           </a:p>
         </p:txBody>
       </p:sp>
@@ -10419,7 +10250,7 @@
           <a:p>
             <a:pPr algn="ctr"/>
             <a:r>
-              <a:rPr lang="en-US" sz="1200" dirty="0" smtClean="0"/>
+              <a:rPr lang="en-US" sz="1200" dirty="0"/>
               <a:t>Amulet</a:t>
             </a:r>
             <a:endParaRPr lang="en-CA" sz="1200" dirty="0"/>
@@ -10949,7 +10780,7 @@
           <a:p>
             <a:pPr algn="ctr"/>
             <a:r>
-              <a:rPr lang="en-US" sz="1200" dirty="0" smtClean="0"/>
+              <a:rPr lang="en-US" sz="1200" dirty="0"/>
               <a:t>Armor</a:t>
             </a:r>
             <a:endParaRPr lang="en-CA" sz="1200" dirty="0"/>
@@ -10999,7 +10830,7 @@
           <a:p>
             <a:pPr algn="ctr"/>
             <a:r>
-              <a:rPr lang="en-US" sz="1200" dirty="0" smtClean="0"/>
+              <a:rPr lang="en-US" sz="1200" dirty="0"/>
               <a:t>Food</a:t>
             </a:r>
             <a:endParaRPr lang="en-CA" sz="1200" dirty="0"/>
@@ -11049,7 +10880,7 @@
           <a:p>
             <a:pPr algn="ctr"/>
             <a:r>
-              <a:rPr lang="en-US" sz="1200" dirty="0" smtClean="0"/>
+              <a:rPr lang="en-US" sz="1200" dirty="0"/>
               <a:t>Potion</a:t>
             </a:r>
             <a:endParaRPr lang="en-CA" sz="1200" dirty="0"/>
@@ -11099,7 +10930,7 @@
           <a:p>
             <a:pPr algn="ctr"/>
             <a:r>
-              <a:rPr lang="en-US" sz="1200" dirty="0" smtClean="0"/>
+              <a:rPr lang="en-US" sz="1200" dirty="0"/>
               <a:t>Ring</a:t>
             </a:r>
             <a:endParaRPr lang="en-CA" sz="1200" dirty="0"/>
@@ -11149,7 +10980,7 @@
           <a:p>
             <a:pPr algn="ctr"/>
             <a:r>
-              <a:rPr lang="en-US" sz="1200" dirty="0" smtClean="0"/>
+              <a:rPr lang="en-US" sz="1200" dirty="0"/>
               <a:t>Scroll</a:t>
             </a:r>
             <a:endParaRPr lang="en-CA" sz="1200" dirty="0"/>
@@ -11199,7 +11030,7 @@
           <a:p>
             <a:pPr algn="ctr"/>
             <a:r>
-              <a:rPr lang="en-US" sz="1200" dirty="0" smtClean="0"/>
+              <a:rPr lang="en-US" sz="1200" dirty="0"/>
               <a:t>Wand</a:t>
             </a:r>
             <a:endParaRPr lang="en-CA" sz="1200" dirty="0"/>
@@ -11249,7 +11080,7 @@
           <a:p>
             <a:pPr algn="ctr"/>
             <a:r>
-              <a:rPr lang="en-US" sz="1200" dirty="0" smtClean="0"/>
+              <a:rPr lang="en-US" sz="1200" dirty="0"/>
               <a:t>Weapon</a:t>
             </a:r>
             <a:endParaRPr lang="en-CA" sz="1200" dirty="0"/>
@@ -11299,7 +11130,7 @@
           <a:p>
             <a:pPr algn="ctr"/>
             <a:r>
-              <a:rPr lang="en-US" sz="1200" dirty="0" err="1" smtClean="0"/>
+              <a:rPr lang="en-US" sz="1200" dirty="0" err="1"/>
               <a:t>GoldPile</a:t>
             </a:r>
             <a:endParaRPr lang="en-CA" sz="1200" dirty="0"/>
@@ -11349,7 +11180,7 @@
           <a:p>
             <a:pPr algn="ctr"/>
             <a:r>
-              <a:rPr lang="en-US" sz="1200" dirty="0" smtClean="0"/>
+              <a:rPr lang="en-US" sz="1200" dirty="0"/>
               <a:t>Item</a:t>
             </a:r>
             <a:endParaRPr lang="en-CA" sz="1200" dirty="0"/>
@@ -11399,7 +11230,7 @@
           <a:p>
             <a:pPr algn="ctr"/>
             <a:r>
-              <a:rPr lang="en-US" sz="1200" dirty="0" smtClean="0"/>
+              <a:rPr lang="en-US" sz="1200" dirty="0"/>
               <a:t>Stairs</a:t>
             </a:r>
             <a:endParaRPr lang="en-CA" sz="1200" dirty="0"/>
@@ -11449,7 +11280,7 @@
           <a:p>
             <a:pPr algn="ctr"/>
             <a:r>
-              <a:rPr lang="en-US" sz="1200" dirty="0" smtClean="0"/>
+              <a:rPr lang="en-US" sz="1200" dirty="0"/>
               <a:t>Trap</a:t>
             </a:r>
             <a:endParaRPr lang="en-CA" sz="1200" dirty="0"/>
@@ -11499,7 +11330,7 @@
           <a:p>
             <a:pPr algn="ctr"/>
             <a:r>
-              <a:rPr lang="en-US" sz="1200" dirty="0" smtClean="0"/>
+              <a:rPr lang="en-US" sz="1200" dirty="0"/>
               <a:t>Feature</a:t>
             </a:r>
             <a:endParaRPr lang="en-CA" sz="1200" dirty="0"/>
@@ -11516,13 +11347,6 @@
   <p:clrMapOvr>
     <a:masterClrMapping/>
   </p:clrMapOvr>
-  <p:timing>
-    <p:tnLst>
-      <p:par>
-        <p:cTn id="1" dur="indefinite" restart="never" nodeType="tmRoot"/>
-      </p:par>
-    </p:tnLst>
-  </p:timing>
 </p:sld>
 </file>
 
@@ -11678,7 +11502,7 @@
           <a:lstStyle/>
           <a:p>
             <a:r>
-              <a:rPr lang="en-US" dirty="0" smtClean="0">
+              <a:rPr lang="en-US" dirty="0">
                 <a:solidFill>
                   <a:schemeClr val="tx1">
                     <a:lumMod val="75000"/>
@@ -11721,7 +11545,7 @@
           <a:lstStyle/>
           <a:p>
             <a:r>
-              <a:rPr lang="en-US" dirty="0" smtClean="0">
+              <a:rPr lang="en-US" dirty="0">
                 <a:solidFill>
                   <a:schemeClr val="accent3">
                     <a:lumMod val="50000"/>
@@ -11762,7 +11586,7 @@
           <a:lstStyle/>
           <a:p>
             <a:r>
-              <a:rPr lang="en-US" dirty="0" smtClean="0">
+              <a:rPr lang="en-US" dirty="0">
                 <a:solidFill>
                   <a:schemeClr val="tx1">
                     <a:lumMod val="75000"/>
@@ -11798,7 +11622,7 @@
           <a:lstStyle/>
           <a:p>
             <a:r>
-              <a:rPr lang="en-US" dirty="0" smtClean="0">
+              <a:rPr lang="en-US" dirty="0">
                 <a:solidFill>
                   <a:schemeClr val="tx1">
                     <a:lumMod val="75000"/>
@@ -11887,7 +11711,7 @@
           <a:p>
             <a:pPr algn="l"/>
             <a:r>
-              <a:rPr lang="en-US" sz="3200" dirty="0" smtClean="0">
+              <a:rPr lang="en-US" sz="3200" dirty="0">
                 <a:solidFill>
                   <a:schemeClr val="bg1"/>
                 </a:solidFill>
@@ -11940,7 +11764,7 @@
               <a:buChar char="&gt;"/>
             </a:pPr>
             <a:r>
-              <a:rPr lang="en-US" dirty="0" smtClean="0">
+              <a:rPr lang="en-US" dirty="0">
                 <a:solidFill>
                   <a:schemeClr val="bg1"/>
                 </a:solidFill>
@@ -11961,7 +11785,7 @@
               <a:buChar char="&gt;"/>
             </a:pPr>
             <a:r>
-              <a:rPr lang="en-US" dirty="0" smtClean="0">
+              <a:rPr lang="en-US" dirty="0">
                 <a:solidFill>
                   <a:schemeClr val="bg1"/>
                 </a:solidFill>
@@ -11969,7 +11793,7 @@
               <a:t>Success was enabled by frequent contributions (</a:t>
             </a:r>
             <a:r>
-              <a:rPr lang="en-US" dirty="0" smtClean="0">
+              <a:rPr lang="en-US" dirty="0">
                 <a:solidFill>
                   <a:srgbClr val="00B0F0"/>
                 </a:solidFill>
@@ -11982,21 +11806,8 @@
                   <a:schemeClr val="bg1"/>
                 </a:solidFill>
               </a:rPr>
-              <a:t>commits), </a:t>
-            </a:r>
-            <a:r>
-              <a:rPr lang="en-US" dirty="0" smtClean="0">
-                <a:solidFill>
-                  <a:schemeClr val="bg1"/>
-                </a:solidFill>
-              </a:rPr>
-              <a:t>regular communication, and honest feedback</a:t>
-            </a:r>
-            <a:endParaRPr lang="en-US" dirty="0" smtClean="0">
-              <a:solidFill>
-                <a:schemeClr val="bg1"/>
-              </a:solidFill>
-            </a:endParaRPr>
+              <a:t>commits), regular communication, and honest feedback</a:t>
+            </a:r>
           </a:p>
           <a:p>
             <a:pPr marL="285750" indent="-285750">
@@ -12011,34 +11822,13 @@
               <a:buChar char="&gt;"/>
             </a:pPr>
             <a:r>
-              <a:rPr lang="en-US" dirty="0" smtClean="0">
+              <a:rPr lang="en-US" dirty="0">
                 <a:solidFill>
                   <a:schemeClr val="bg1"/>
                 </a:solidFill>
               </a:rPr>
-              <a:t>Application of the Rational Design Process and development tools facilitated the </a:t>
-            </a:r>
-            <a:r>
-              <a:rPr lang="en-US" dirty="0">
-                <a:solidFill>
-                  <a:schemeClr val="bg1"/>
-                </a:solidFill>
-              </a:rPr>
-              <a:t>development </a:t>
-            </a:r>
-            <a:r>
-              <a:rPr lang="en-US" dirty="0" smtClean="0">
-                <a:solidFill>
-                  <a:schemeClr val="bg1"/>
-                </a:solidFill>
-              </a:rPr>
-              <a:t> of maintainable and robust software</a:t>
-            </a:r>
-            <a:endParaRPr lang="en-US" dirty="0">
-              <a:solidFill>
-                <a:schemeClr val="bg1"/>
-              </a:solidFill>
-            </a:endParaRPr>
+              <a:t>Application of the Rational Design Process and development tools facilitated the development  of maintainable and robust software</a:t>
+            </a:r>
           </a:p>
           <a:p>
             <a:pPr marL="285750" indent="-285750">
@@ -12071,7 +11861,7 @@
               <a:buChar char="&gt;"/>
             </a:pPr>
             <a:r>
-              <a:rPr lang="en-US" dirty="0" smtClean="0">
+              <a:rPr lang="en-US" dirty="0">
                 <a:solidFill>
                   <a:schemeClr val="bg1"/>
                 </a:solidFill>
@@ -12105,18 +11895,13 @@
           <a:p>
             <a:pPr algn="r"/>
             <a:r>
-              <a:rPr lang="en-US" dirty="0" smtClean="0">
+              <a:rPr lang="en-US" dirty="0">
                 <a:solidFill>
                   <a:srgbClr val="28C22F"/>
                 </a:solidFill>
               </a:rPr>
               <a:t>Project</a:t>
             </a:r>
-            <a:endParaRPr lang="en-US" dirty="0" smtClean="0">
-              <a:solidFill>
-                <a:srgbClr val="28C22F"/>
-              </a:solidFill>
-            </a:endParaRPr>
           </a:p>
         </p:txBody>
       </p:sp>
@@ -12144,18 +11929,13 @@
           <a:p>
             <a:pPr algn="r"/>
             <a:r>
-              <a:rPr lang="en-US" dirty="0" smtClean="0">
+              <a:rPr lang="en-US" dirty="0">
                 <a:solidFill>
                   <a:srgbClr val="28C22F"/>
                 </a:solidFill>
               </a:rPr>
               <a:t>Next Steps</a:t>
             </a:r>
-            <a:endParaRPr lang="en-US" dirty="0" smtClean="0">
-              <a:solidFill>
-                <a:srgbClr val="28C22F"/>
-              </a:solidFill>
-            </a:endParaRPr>
           </a:p>
         </p:txBody>
       </p:sp>
@@ -12169,13 +11949,6 @@
   <p:clrMapOvr>
     <a:masterClrMapping/>
   </p:clrMapOvr>
-  <p:timing>
-    <p:tnLst>
-      <p:par>
-        <p:cTn id="1" dur="indefinite" restart="never" nodeType="tmRoot"/>
-      </p:par>
-    </p:tnLst>
-  </p:timing>
 </p:sld>
 </file>
 

</xml_diff>

<commit_message>
Updated Demo and Motivation Slides
</commit_message>
<xml_diff>
--- a/Doc/FinalPresentation/RR.pptx
+++ b/Doc/FinalPresentation/RR.pptx
@@ -136,7 +136,7 @@
 </file>
 
 <file path=ppt/charts/chart1.xml><?xml version="1.0" encoding="utf-8"?>
-<c:chartSpace xmlns:c="http://schemas.openxmlformats.org/drawingml/2006/chart" xmlns:a="http://schemas.openxmlformats.org/drawingml/2006/main" xmlns:r="http://schemas.openxmlformats.org/officeDocument/2006/relationships" xmlns:c16r2="http://schemas.microsoft.com/office/drawing/2015/06/chart">
+<c:chartSpace xmlns:c="http://schemas.openxmlformats.org/drawingml/2006/chart" xmlns:a="http://schemas.openxmlformats.org/drawingml/2006/main" xmlns:r="http://schemas.openxmlformats.org/officeDocument/2006/relationships">
   <c:date1904 val="0"/>
   <c:lang val="en-US"/>
   <c:roundedCorners val="0"/>
@@ -202,7 +202,7 @@
                 </a:contourClr>
               </a:sp3d>
             </c:spPr>
-            <c:extLst>
+            <c:extLst xmlns:c16r2="http://schemas.microsoft.com/office/drawing/2015/06/chart">
               <c:ext xmlns:c16="http://schemas.microsoft.com/office/drawing/2014/chart" uri="{C3380CC4-5D6E-409C-BE32-E72D297353CC}">
                 <c16:uniqueId val="{00000001-E058-451E-85BB-54216B702602}"/>
               </c:ext>
@@ -229,7 +229,7 @@
                 </a:contourClr>
               </a:sp3d>
             </c:spPr>
-            <c:extLst>
+            <c:extLst xmlns:c16r2="http://schemas.microsoft.com/office/drawing/2015/06/chart">
               <c:ext xmlns:c16="http://schemas.microsoft.com/office/drawing/2014/chart" uri="{C3380CC4-5D6E-409C-BE32-E72D297353CC}">
                 <c16:uniqueId val="{00000003-E058-451E-85BB-54216B702602}"/>
               </c:ext>
@@ -256,7 +256,7 @@
                 </a:contourClr>
               </a:sp3d>
             </c:spPr>
-            <c:extLst>
+            <c:extLst xmlns:c16r2="http://schemas.microsoft.com/office/drawing/2015/06/chart">
               <c:ext xmlns:c16="http://schemas.microsoft.com/office/drawing/2014/chart" uri="{C3380CC4-5D6E-409C-BE32-E72D297353CC}">
                 <c16:uniqueId val="{00000005-E058-451E-85BB-54216B702602}"/>
               </c:ext>
@@ -285,7 +285,7 @@
                 </a:contourClr>
               </a:sp3d>
             </c:spPr>
-            <c:extLst>
+            <c:extLst xmlns:c16r2="http://schemas.microsoft.com/office/drawing/2015/06/chart">
               <c:ext xmlns:c16="http://schemas.microsoft.com/office/drawing/2014/chart" uri="{C3380CC4-5D6E-409C-BE32-E72D297353CC}">
                 <c16:uniqueId val="{00000007-E058-451E-85BB-54216B702602}"/>
               </c:ext>
@@ -314,7 +314,7 @@
                 </a:contourClr>
               </a:sp3d>
             </c:spPr>
-            <c:extLst>
+            <c:extLst xmlns:c16r2="http://schemas.microsoft.com/office/drawing/2015/06/chart">
               <c:ext xmlns:c16="http://schemas.microsoft.com/office/drawing/2014/chart" uri="{C3380CC4-5D6E-409C-BE32-E72D297353CC}">
                 <c16:uniqueId val="{00000009-E058-451E-85BB-54216B702602}"/>
               </c:ext>
@@ -343,7 +343,7 @@
                 </a:contourClr>
               </a:sp3d>
             </c:spPr>
-            <c:extLst>
+            <c:extLst xmlns:c16r2="http://schemas.microsoft.com/office/drawing/2015/06/chart">
               <c:ext xmlns:c16="http://schemas.microsoft.com/office/drawing/2014/chart" uri="{C3380CC4-5D6E-409C-BE32-E72D297353CC}">
                 <c16:uniqueId val="{0000000B-E058-451E-85BB-54216B702602}"/>
               </c:ext>
@@ -383,13 +383,14 @@
               <c:showSerName val="0"/>
               <c:showPercent val="1"/>
               <c:showBubbleSize val="0"/>
-              <c:extLst>
+              <c:extLst xmlns:c16r2="http://schemas.microsoft.com/office/drawing/2015/06/chart">
+                <c:ext xmlns:c16="http://schemas.microsoft.com/office/drawing/2014/chart" uri="{C3380CC4-5D6E-409C-BE32-E72D297353CC}">
+                  <c16:uniqueId val="{00000001-E058-451E-85BB-54216B702602}"/>
+                </c:ext>
                 <c:ext xmlns:c15="http://schemas.microsoft.com/office/drawing/2012/chart" uri="{CE6537A1-D6FC-4f65-9D91-7224C49458BB}">
+                  <c15:layout/>
                   <c15:dlblFieldTable/>
                   <c15:showDataLabelsRange val="0"/>
-                </c:ext>
-                <c:ext xmlns:c16="http://schemas.microsoft.com/office/drawing/2014/chart" uri="{C3380CC4-5D6E-409C-BE32-E72D297353CC}">
-                  <c16:uniqueId val="{00000001-E058-451E-85BB-54216B702602}"/>
                 </c:ext>
               </c:extLst>
             </c:dLbl>
@@ -426,13 +427,14 @@
               <c:showSerName val="0"/>
               <c:showPercent val="1"/>
               <c:showBubbleSize val="0"/>
-              <c:extLst>
+              <c:extLst xmlns:c16r2="http://schemas.microsoft.com/office/drawing/2015/06/chart">
+                <c:ext xmlns:c16="http://schemas.microsoft.com/office/drawing/2014/chart" uri="{C3380CC4-5D6E-409C-BE32-E72D297353CC}">
+                  <c16:uniqueId val="{00000003-E058-451E-85BB-54216B702602}"/>
+                </c:ext>
                 <c:ext xmlns:c15="http://schemas.microsoft.com/office/drawing/2012/chart" uri="{CE6537A1-D6FC-4f65-9D91-7224C49458BB}">
+                  <c15:layout/>
                   <c15:dlblFieldTable/>
                   <c15:showDataLabelsRange val="0"/>
-                </c:ext>
-                <c:ext xmlns:c16="http://schemas.microsoft.com/office/drawing/2014/chart" uri="{C3380CC4-5D6E-409C-BE32-E72D297353CC}">
-                  <c16:uniqueId val="{00000003-E058-451E-85BB-54216B702602}"/>
                 </c:ext>
               </c:extLst>
             </c:dLbl>
@@ -469,44 +471,45 @@
               <c:showSerName val="0"/>
               <c:showPercent val="1"/>
               <c:showBubbleSize val="0"/>
-              <c:extLst>
+              <c:extLst xmlns:c16r2="http://schemas.microsoft.com/office/drawing/2015/06/chart">
+                <c:ext xmlns:c16="http://schemas.microsoft.com/office/drawing/2014/chart" uri="{C3380CC4-5D6E-409C-BE32-E72D297353CC}">
+                  <c16:uniqueId val="{00000005-E058-451E-85BB-54216B702602}"/>
+                </c:ext>
                 <c:ext xmlns:c15="http://schemas.microsoft.com/office/drawing/2012/chart" uri="{CE6537A1-D6FC-4f65-9D91-7224C49458BB}">
+                  <c15:layout/>
                   <c15:dlblFieldTable/>
                   <c15:showDataLabelsRange val="0"/>
-                </c:ext>
-                <c:ext xmlns:c16="http://schemas.microsoft.com/office/drawing/2014/chart" uri="{C3380CC4-5D6E-409C-BE32-E72D297353CC}">
-                  <c16:uniqueId val="{00000005-E058-451E-85BB-54216B702602}"/>
                 </c:ext>
               </c:extLst>
             </c:dLbl>
             <c:dLbl>
               <c:idx val="3"/>
               <c:delete val="1"/>
-              <c:extLst>
-                <c:ext xmlns:c15="http://schemas.microsoft.com/office/drawing/2012/chart" uri="{CE6537A1-D6FC-4f65-9D91-7224C49458BB}"/>
+              <c:extLst xmlns:c16r2="http://schemas.microsoft.com/office/drawing/2015/06/chart">
                 <c:ext xmlns:c16="http://schemas.microsoft.com/office/drawing/2014/chart" uri="{C3380CC4-5D6E-409C-BE32-E72D297353CC}">
                   <c16:uniqueId val="{00000007-E058-451E-85BB-54216B702602}"/>
                 </c:ext>
+                <c:ext xmlns:c15="http://schemas.microsoft.com/office/drawing/2012/chart" uri="{CE6537A1-D6FC-4f65-9D91-7224C49458BB}"/>
               </c:extLst>
             </c:dLbl>
             <c:dLbl>
               <c:idx val="4"/>
               <c:delete val="1"/>
-              <c:extLst>
-                <c:ext xmlns:c15="http://schemas.microsoft.com/office/drawing/2012/chart" uri="{CE6537A1-D6FC-4f65-9D91-7224C49458BB}"/>
+              <c:extLst xmlns:c16r2="http://schemas.microsoft.com/office/drawing/2015/06/chart">
                 <c:ext xmlns:c16="http://schemas.microsoft.com/office/drawing/2014/chart" uri="{C3380CC4-5D6E-409C-BE32-E72D297353CC}">
                   <c16:uniqueId val="{00000009-E058-451E-85BB-54216B702602}"/>
                 </c:ext>
+                <c:ext xmlns:c15="http://schemas.microsoft.com/office/drawing/2012/chart" uri="{CE6537A1-D6FC-4f65-9D91-7224C49458BB}"/>
               </c:extLst>
             </c:dLbl>
             <c:dLbl>
               <c:idx val="5"/>
               <c:delete val="1"/>
-              <c:extLst>
-                <c:ext xmlns:c15="http://schemas.microsoft.com/office/drawing/2012/chart" uri="{CE6537A1-D6FC-4f65-9D91-7224C49458BB}"/>
+              <c:extLst xmlns:c16r2="http://schemas.microsoft.com/office/drawing/2015/06/chart">
                 <c:ext xmlns:c16="http://schemas.microsoft.com/office/drawing/2014/chart" uri="{C3380CC4-5D6E-409C-BE32-E72D297353CC}">
                   <c16:uniqueId val="{0000000B-E058-451E-85BB-54216B702602}"/>
                 </c:ext>
+                <c:ext xmlns:c15="http://schemas.microsoft.com/office/drawing/2012/chart" uri="{CE6537A1-D6FC-4f65-9D91-7224C49458BB}"/>
               </c:extLst>
             </c:dLbl>
             <c:spPr>
@@ -557,7 +560,7 @@
                 <a:effectLst/>
               </c:spPr>
             </c:leaderLines>
-            <c:extLst>
+            <c:extLst xmlns:c16r2="http://schemas.microsoft.com/office/drawing/2015/06/chart">
               <c:ext xmlns:c15="http://schemas.microsoft.com/office/drawing/2012/chart" uri="{CE6537A1-D6FC-4f65-9D91-7224C49458BB}"/>
             </c:extLst>
           </c:dLbls>
@@ -614,7 +617,7 @@
               </c:numCache>
             </c:numRef>
           </c:val>
-          <c:extLst>
+          <c:extLst xmlns:c16r2="http://schemas.microsoft.com/office/drawing/2015/06/chart">
             <c:ext xmlns:c16="http://schemas.microsoft.com/office/drawing/2014/chart" uri="{C3380CC4-5D6E-409C-BE32-E72D297353CC}">
               <c16:uniqueId val="{0000000C-E058-451E-85BB-54216B702602}"/>
             </c:ext>
@@ -642,6 +645,7 @@
     </c:plotArea>
     <c:legend>
       <c:legendPos val="r"/>
+      <c:layout/>
       <c:overlay val="1"/>
       <c:spPr>
         <a:noFill/>
@@ -1331,7 +1335,7 @@
           <a:p>
             <a:fld id="{E87E700C-F5C1-45DA-8BB8-34A79AF25122}" type="datetimeFigureOut">
               <a:rPr lang="en-CA" smtClean="0"/>
-              <a:t>2016-11-26</a:t>
+              <a:t>2016-11-27</a:t>
             </a:fld>
             <a:endParaRPr lang="en-CA"/>
           </a:p>
@@ -1948,7 +1952,7 @@
           <a:p>
             <a:fld id="{DC61108D-6E81-4C43-975C-CB4582A4A1D2}" type="datetimeFigureOut">
               <a:rPr lang="en-CA" smtClean="0"/>
-              <a:t>2016-11-26</a:t>
+              <a:t>2016-11-27</a:t>
             </a:fld>
             <a:endParaRPr lang="en-CA"/>
           </a:p>
@@ -2118,7 +2122,7 @@
           <a:p>
             <a:fld id="{DC61108D-6E81-4C43-975C-CB4582A4A1D2}" type="datetimeFigureOut">
               <a:rPr lang="en-CA" smtClean="0"/>
-              <a:t>2016-11-26</a:t>
+              <a:t>2016-11-27</a:t>
             </a:fld>
             <a:endParaRPr lang="en-CA"/>
           </a:p>
@@ -2298,7 +2302,7 @@
           <a:p>
             <a:fld id="{DC61108D-6E81-4C43-975C-CB4582A4A1D2}" type="datetimeFigureOut">
               <a:rPr lang="en-CA" smtClean="0"/>
-              <a:t>2016-11-26</a:t>
+              <a:t>2016-11-27</a:t>
             </a:fld>
             <a:endParaRPr lang="en-CA"/>
           </a:p>
@@ -2468,7 +2472,7 @@
           <a:p>
             <a:fld id="{DC61108D-6E81-4C43-975C-CB4582A4A1D2}" type="datetimeFigureOut">
               <a:rPr lang="en-CA" smtClean="0"/>
-              <a:t>2016-11-26</a:t>
+              <a:t>2016-11-27</a:t>
             </a:fld>
             <a:endParaRPr lang="en-CA"/>
           </a:p>
@@ -2714,7 +2718,7 @@
           <a:p>
             <a:fld id="{DC61108D-6E81-4C43-975C-CB4582A4A1D2}" type="datetimeFigureOut">
               <a:rPr lang="en-CA" smtClean="0"/>
-              <a:t>2016-11-26</a:t>
+              <a:t>2016-11-27</a:t>
             </a:fld>
             <a:endParaRPr lang="en-CA"/>
           </a:p>
@@ -3002,7 +3006,7 @@
           <a:p>
             <a:fld id="{DC61108D-6E81-4C43-975C-CB4582A4A1D2}" type="datetimeFigureOut">
               <a:rPr lang="en-CA" smtClean="0"/>
-              <a:t>2016-11-26</a:t>
+              <a:t>2016-11-27</a:t>
             </a:fld>
             <a:endParaRPr lang="en-CA"/>
           </a:p>
@@ -3424,7 +3428,7 @@
           <a:p>
             <a:fld id="{DC61108D-6E81-4C43-975C-CB4582A4A1D2}" type="datetimeFigureOut">
               <a:rPr lang="en-CA" smtClean="0"/>
-              <a:t>2016-11-26</a:t>
+              <a:t>2016-11-27</a:t>
             </a:fld>
             <a:endParaRPr lang="en-CA"/>
           </a:p>
@@ -3542,7 +3546,7 @@
           <a:p>
             <a:fld id="{DC61108D-6E81-4C43-975C-CB4582A4A1D2}" type="datetimeFigureOut">
               <a:rPr lang="en-CA" smtClean="0"/>
-              <a:t>2016-11-26</a:t>
+              <a:t>2016-11-27</a:t>
             </a:fld>
             <a:endParaRPr lang="en-CA"/>
           </a:p>
@@ -3637,7 +3641,7 @@
           <a:p>
             <a:fld id="{DC61108D-6E81-4C43-975C-CB4582A4A1D2}" type="datetimeFigureOut">
               <a:rPr lang="en-CA" smtClean="0"/>
-              <a:t>2016-11-26</a:t>
+              <a:t>2016-11-27</a:t>
             </a:fld>
             <a:endParaRPr lang="en-CA"/>
           </a:p>
@@ -3914,7 +3918,7 @@
           <a:p>
             <a:fld id="{DC61108D-6E81-4C43-975C-CB4582A4A1D2}" type="datetimeFigureOut">
               <a:rPr lang="en-CA" smtClean="0"/>
-              <a:t>2016-11-26</a:t>
+              <a:t>2016-11-27</a:t>
             </a:fld>
             <a:endParaRPr lang="en-CA"/>
           </a:p>
@@ -4167,7 +4171,7 @@
           <a:p>
             <a:fld id="{DC61108D-6E81-4C43-975C-CB4582A4A1D2}" type="datetimeFigureOut">
               <a:rPr lang="en-CA" smtClean="0"/>
-              <a:t>2016-11-26</a:t>
+              <a:t>2016-11-27</a:t>
             </a:fld>
             <a:endParaRPr lang="en-CA"/>
           </a:p>
@@ -4380,7 +4384,7 @@
           <a:p>
             <a:fld id="{DC61108D-6E81-4C43-975C-CB4582A4A1D2}" type="datetimeFigureOut">
               <a:rPr lang="en-CA" smtClean="0"/>
-              <a:t>2016-11-26</a:t>
+              <a:t>2016-11-27</a:t>
             </a:fld>
             <a:endParaRPr lang="en-CA"/>
           </a:p>
@@ -5602,6 +5606,13 @@
   <p:clrMapOvr>
     <a:masterClrMapping/>
   </p:clrMapOvr>
+  <p:timing>
+    <p:tnLst>
+      <p:par>
+        <p:cTn id="1" dur="indefinite" restart="never" nodeType="tmRoot"/>
+      </p:par>
+    </p:tnLst>
+  </p:timing>
 </p:sld>
 </file>
 
@@ -6413,59 +6424,6 @@
           </a:p>
         </p:txBody>
       </p:sp>
-      <p:pic>
-        <p:nvPicPr>
-          <p:cNvPr id="1026" name="Picture 2" descr="Image result for original rogue game"/>
-          <p:cNvPicPr>
-            <a:picLocks noChangeAspect="1" noChangeArrowheads="1"/>
-          </p:cNvPicPr>
-          <p:nvPr/>
-        </p:nvPicPr>
-        <p:blipFill>
-          <a:blip r:embed="rId3">
-            <a:extLst>
-              <a:ext uri="{28A0092B-C50C-407E-A947-70E740481C1C}">
-                <a14:useLocalDpi xmlns:a14="http://schemas.microsoft.com/office/drawing/2010/main" val="0"/>
-              </a:ext>
-            </a:extLst>
-          </a:blip>
-          <a:srcRect/>
-          <a:stretch>
-            <a:fillRect/>
-          </a:stretch>
-        </p:blipFill>
-        <p:spPr bwMode="auto">
-          <a:xfrm>
-            <a:off x="1524000" y="1504950"/>
-            <a:ext cx="6096000" cy="2857500"/>
-          </a:xfrm>
-          <a:prstGeom prst="rect">
-            <a:avLst/>
-          </a:prstGeom>
-          <a:noFill/>
-          <a:ln w="57150">
-            <a:solidFill>
-              <a:schemeClr val="tx1"/>
-            </a:solidFill>
-          </a:ln>
-          <a:effectLst>
-            <a:outerShdw blurRad="50800" dist="38100" dir="2700000" algn="tl" rotWithShape="0">
-              <a:prstClr val="black">
-                <a:alpha val="40000"/>
-              </a:prstClr>
-            </a:outerShdw>
-          </a:effectLst>
-          <a:extLst>
-            <a:ext uri="{909E8E84-426E-40DD-AFC4-6F175D3DCCD1}">
-              <a14:hiddenFill xmlns:a14="http://schemas.microsoft.com/office/drawing/2010/main">
-                <a:solidFill>
-                  <a:srgbClr val="FFFFFF"/>
-                </a:solidFill>
-              </a14:hiddenFill>
-            </a:ext>
-          </a:extLst>
-        </p:spPr>
-      </p:pic>
     </p:spTree>
     <p:extLst>
       <p:ext uri="{BB962C8B-B14F-4D97-AF65-F5344CB8AC3E}">
@@ -6476,6 +6434,13 @@
   <p:clrMapOvr>
     <a:masterClrMapping/>
   </p:clrMapOvr>
+  <p:timing>
+    <p:tnLst>
+      <p:par>
+        <p:cTn id="1" dur="indefinite" restart="never" nodeType="tmRoot"/>
+      </p:par>
+    </p:tnLst>
+  </p:timing>
 </p:sld>
 </file>
 
@@ -6872,6 +6837,14 @@
           </a:p>
           <a:p>
             <a:pPr algn="r"/>
+            <a:r>
+              <a:rPr lang="en-US" dirty="0">
+                <a:solidFill>
+                  <a:srgbClr val="28C22F"/>
+                </a:solidFill>
+              </a:rPr>
+              <a:t/>
+            </a:r>
             <a:br>
               <a:rPr lang="en-US" dirty="0">
                 <a:solidFill>
@@ -7116,6 +7089,13 @@
   <p:clrMapOvr>
     <a:masterClrMapping/>
   </p:clrMapOvr>
+  <p:timing>
+    <p:tnLst>
+      <p:par>
+        <p:cTn id="1" dur="indefinite" restart="never" nodeType="tmRoot"/>
+      </p:par>
+    </p:tnLst>
+  </p:timing>
 </p:sld>
 </file>
 
@@ -7714,6 +7694,13 @@
   <p:clrMapOvr>
     <a:masterClrMapping/>
   </p:clrMapOvr>
+  <p:timing>
+    <p:tnLst>
+      <p:par>
+        <p:cTn id="1" dur="indefinite" restart="never" nodeType="tmRoot"/>
+      </p:par>
+    </p:tnLst>
+  </p:timing>
 </p:sld>
 </file>
 
@@ -8460,6 +8447,13 @@
   <p:clrMapOvr>
     <a:masterClrMapping/>
   </p:clrMapOvr>
+  <p:timing>
+    <p:tnLst>
+      <p:par>
+        <p:cTn id="1" dur="indefinite" restart="never" nodeType="tmRoot"/>
+      </p:par>
+    </p:tnLst>
+  </p:timing>
 </p:sld>
 </file>
 
@@ -8843,192 +8837,32 @@
       </p:sp>
       <p:pic>
         <p:nvPicPr>
-          <p:cNvPr id="3" name="Picture 2"/>
+          <p:cNvPr id="4" name="Picture 3"/>
           <p:cNvPicPr>
             <a:picLocks noChangeAspect="1"/>
           </p:cNvPicPr>
           <p:nvPr/>
         </p:nvPicPr>
         <p:blipFill>
-          <a:blip r:embed="rId3">
-            <a:extLst>
-              <a:ext uri="{28A0092B-C50C-407E-A947-70E740481C1C}">
-                <a14:useLocalDpi xmlns:a14="http://schemas.microsoft.com/office/drawing/2010/main" val="0"/>
-              </a:ext>
-            </a:extLst>
-          </a:blip>
+          <a:blip r:embed="rId3"/>
           <a:stretch>
             <a:fillRect/>
           </a:stretch>
         </p:blipFill>
         <p:spPr>
           <a:xfrm>
-            <a:off x="507020" y="1256358"/>
-            <a:ext cx="3825307" cy="3059276"/>
+            <a:off x="1600201" y="1428750"/>
+            <a:ext cx="5715000" cy="2982516"/>
           </a:xfrm>
           <a:prstGeom prst="rect">
             <a:avLst/>
           </a:prstGeom>
-        </p:spPr>
-      </p:pic>
-      <p:pic>
-        <p:nvPicPr>
-          <p:cNvPr id="5" name="Picture 4"/>
-          <p:cNvPicPr>
-            <a:picLocks noChangeAspect="1"/>
-          </p:cNvPicPr>
-          <p:nvPr/>
-        </p:nvPicPr>
-        <p:blipFill>
-          <a:blip r:embed="rId4" cstate="print">
-            <a:extLst>
-              <a:ext uri="{28A0092B-C50C-407E-A947-70E740481C1C}">
-                <a14:useLocalDpi xmlns:a14="http://schemas.microsoft.com/office/drawing/2010/main" val="0"/>
-              </a:ext>
-            </a:extLst>
-          </a:blip>
-          <a:stretch>
-            <a:fillRect/>
-          </a:stretch>
-        </p:blipFill>
-        <p:spPr>
-          <a:xfrm>
-            <a:off x="4780188" y="645760"/>
-            <a:ext cx="3539117" cy="2186045"/>
-          </a:xfrm>
-          <a:prstGeom prst="rect">
-            <a:avLst/>
-          </a:prstGeom>
-        </p:spPr>
-      </p:pic>
-      <p:pic>
-        <p:nvPicPr>
-          <p:cNvPr id="7" name="Picture 6"/>
-          <p:cNvPicPr>
-            <a:picLocks noChangeAspect="1"/>
-          </p:cNvPicPr>
-          <p:nvPr/>
-        </p:nvPicPr>
-        <p:blipFill>
-          <a:blip r:embed="rId5">
-            <a:extLst>
-              <a:ext uri="{28A0092B-C50C-407E-A947-70E740481C1C}">
-                <a14:useLocalDpi xmlns:a14="http://schemas.microsoft.com/office/drawing/2010/main" val="0"/>
-              </a:ext>
-            </a:extLst>
-          </a:blip>
-          <a:stretch>
-            <a:fillRect/>
-          </a:stretch>
-        </p:blipFill>
-        <p:spPr>
-          <a:xfrm>
-            <a:off x="4534548" y="3028859"/>
-            <a:ext cx="4327040" cy="233894"/>
-          </a:xfrm>
-          <a:prstGeom prst="rect">
-            <a:avLst/>
-          </a:prstGeom>
-        </p:spPr>
-      </p:pic>
-      <p:pic>
-        <p:nvPicPr>
-          <p:cNvPr id="8" name="Picture 7"/>
-          <p:cNvPicPr>
-            <a:picLocks noChangeAspect="1"/>
-          </p:cNvPicPr>
-          <p:nvPr/>
-        </p:nvPicPr>
-        <p:blipFill>
-          <a:blip r:embed="rId6">
-            <a:extLst>
-              <a:ext uri="{28A0092B-C50C-407E-A947-70E740481C1C}">
-                <a14:useLocalDpi xmlns:a14="http://schemas.microsoft.com/office/drawing/2010/main" val="0"/>
-              </a:ext>
-            </a:extLst>
-          </a:blip>
-          <a:stretch>
-            <a:fillRect/>
-          </a:stretch>
-        </p:blipFill>
-        <p:spPr>
-          <a:xfrm>
-            <a:off x="4552758" y="3459807"/>
-            <a:ext cx="4304652" cy="231735"/>
-          </a:xfrm>
-          <a:prstGeom prst="rect">
-            <a:avLst/>
-          </a:prstGeom>
-        </p:spPr>
-      </p:pic>
-      <p:pic>
-        <p:nvPicPr>
-          <p:cNvPr id="9" name="Picture 8"/>
-          <p:cNvPicPr>
-            <a:picLocks noChangeAspect="1"/>
-          </p:cNvPicPr>
-          <p:nvPr/>
-        </p:nvPicPr>
-        <p:blipFill>
-          <a:blip r:embed="rId7">
-            <a:extLst>
-              <a:ext uri="{28A0092B-C50C-407E-A947-70E740481C1C}">
-                <a14:useLocalDpi xmlns:a14="http://schemas.microsoft.com/office/drawing/2010/main" val="0"/>
-              </a:ext>
-            </a:extLst>
-          </a:blip>
-          <a:stretch>
-            <a:fillRect/>
-          </a:stretch>
-        </p:blipFill>
-        <p:spPr>
-          <a:xfrm>
-            <a:off x="2194526" y="4556937"/>
-            <a:ext cx="6662884" cy="136141"/>
-          </a:xfrm>
-          <a:prstGeom prst="rect">
-            <a:avLst/>
-          </a:prstGeom>
-        </p:spPr>
-      </p:pic>
-      <p:pic>
-        <p:nvPicPr>
-          <p:cNvPr id="10" name="Picture 9"/>
-          <p:cNvPicPr>
-            <a:picLocks noChangeAspect="1"/>
-          </p:cNvPicPr>
-          <p:nvPr/>
-        </p:nvPicPr>
-        <p:blipFill>
-          <a:blip r:embed="rId8">
-            <a:extLst>
-              <a:ext uri="{28A0092B-C50C-407E-A947-70E740481C1C}">
-                <a14:useLocalDpi xmlns:a14="http://schemas.microsoft.com/office/drawing/2010/main" val="0"/>
-              </a:ext>
-            </a:extLst>
-          </a:blip>
-          <a:stretch>
-            <a:fillRect/>
-          </a:stretch>
-        </p:blipFill>
-        <p:spPr>
-          <a:xfrm>
-            <a:off x="5005343" y="3892594"/>
-            <a:ext cx="3858163" cy="466790"/>
-          </a:xfrm>
-          <a:prstGeom prst="rect">
-            <a:avLst/>
-          </a:prstGeom>
-          <a:ln>
-            <a:noFill/>
-          </a:ln>
           <a:effectLst>
-            <a:outerShdw blurRad="292100" dist="139700" dir="2700000" algn="tl" rotWithShape="0">
-              <a:srgbClr val="333333">
-                <a:alpha val="65000"/>
-              </a:srgbClr>
+            <a:outerShdw blurRad="152400" dir="9600000" sx="102000" sy="102000" algn="tl" rotWithShape="0">
+              <a:prstClr val="black">
+                <a:alpha val="40000"/>
+              </a:prstClr>
             </a:outerShdw>
-            <a:softEdge rad="12700"/>
           </a:effectLst>
         </p:spPr>
       </p:pic>
@@ -9042,6 +8876,13 @@
   <p:clrMapOvr>
     <a:masterClrMapping/>
   </p:clrMapOvr>
+  <p:timing>
+    <p:tnLst>
+      <p:par>
+        <p:cTn id="1" dur="indefinite" restart="never" nodeType="tmRoot"/>
+      </p:par>
+    </p:tnLst>
+  </p:timing>
 </p:sld>
 </file>
 
@@ -9678,6 +9519,13 @@
   <p:clrMapOvr>
     <a:masterClrMapping/>
   </p:clrMapOvr>
+  <p:timing>
+    <p:tnLst>
+      <p:par>
+        <p:cTn id="1" dur="indefinite" restart="never" nodeType="tmRoot"/>
+      </p:par>
+    </p:tnLst>
+  </p:timing>
 </p:sld>
 </file>
 

</xml_diff>

<commit_message>
Forgot to Include Video.  Oops
</commit_message>
<xml_diff>
--- a/Doc/FinalPresentation/RR.pptx
+++ b/Doc/FinalPresentation/RR.pptx
@@ -6043,10 +6043,528 @@
   <p:clrMapOvr>
     <a:masterClrMapping/>
   </p:clrMapOvr>
+  <p:timing>
+    <p:tnLst>
+      <p:par>
+        <p:cTn id="1" dur="indefinite" restart="never" nodeType="tmRoot"/>
+      </p:par>
+    </p:tnLst>
+  </p:timing>
 </p:sld>
 </file>
 
 <file path=ppt/slides/slide2.xml><?xml version="1.0" encoding="utf-8"?>
+<p:sld xmlns:a="http://schemas.openxmlformats.org/drawingml/2006/main" xmlns:r="http://schemas.openxmlformats.org/officeDocument/2006/relationships" xmlns:p="http://schemas.openxmlformats.org/presentationml/2006/main">
+  <p:cSld>
+    <p:spTree>
+      <p:nvGrpSpPr>
+        <p:cNvPr id="1" name=""/>
+        <p:cNvGrpSpPr/>
+        <p:nvPr/>
+      </p:nvGrpSpPr>
+      <p:grpSpPr>
+        <a:xfrm>
+          <a:off x="0" y="0"/>
+          <a:ext cx="0" cy="0"/>
+          <a:chOff x="0" y="0"/>
+          <a:chExt cx="0" cy="0"/>
+        </a:xfrm>
+      </p:grpSpPr>
+      <p:sp>
+        <p:nvSpPr>
+          <p:cNvPr id="14" name="Rectangle 13"/>
+          <p:cNvSpPr/>
+          <p:nvPr/>
+        </p:nvSpPr>
+        <p:spPr>
+          <a:xfrm>
+            <a:off x="0" y="0"/>
+            <a:ext cx="9144000" cy="5143500"/>
+          </a:xfrm>
+          <a:prstGeom prst="rect">
+            <a:avLst/>
+          </a:prstGeom>
+          <a:solidFill>
+            <a:srgbClr val="1F1F1F"/>
+          </a:solidFill>
+          <a:ln>
+            <a:solidFill>
+              <a:schemeClr val="tx1"/>
+            </a:solidFill>
+          </a:ln>
+        </p:spPr>
+        <p:style>
+          <a:lnRef idx="2">
+            <a:schemeClr val="accent1">
+              <a:shade val="50000"/>
+            </a:schemeClr>
+          </a:lnRef>
+          <a:fillRef idx="1">
+            <a:schemeClr val="accent1"/>
+          </a:fillRef>
+          <a:effectRef idx="0">
+            <a:schemeClr val="accent1"/>
+          </a:effectRef>
+          <a:fontRef idx="minor">
+            <a:schemeClr val="lt1"/>
+          </a:fontRef>
+        </p:style>
+        <p:txBody>
+          <a:bodyPr rtlCol="0" anchor="ctr"/>
+          <a:lstStyle/>
+          <a:p>
+            <a:pPr algn="ctr"/>
+            <a:endParaRPr lang="en-CA" dirty="0"/>
+          </a:p>
+        </p:txBody>
+      </p:sp>
+      <p:pic>
+        <p:nvPicPr>
+          <p:cNvPr id="18" name="Picture 16"/>
+          <p:cNvPicPr>
+            <a:picLocks noChangeAspect="1" noChangeArrowheads="1"/>
+          </p:cNvPicPr>
+          <p:nvPr/>
+        </p:nvPicPr>
+        <p:blipFill>
+          <a:blip r:embed="rId4" cstate="print">
+            <a:clrChange>
+              <a:clrFrom>
+                <a:srgbClr val="000000"/>
+              </a:clrFrom>
+              <a:clrTo>
+                <a:srgbClr val="000000">
+                  <a:alpha val="0"/>
+                </a:srgbClr>
+              </a:clrTo>
+            </a:clrChange>
+            <a:extLst>
+              <a:ext uri="{28A0092B-C50C-407E-A947-70E740481C1C}">
+                <a14:useLocalDpi xmlns:a14="http://schemas.microsoft.com/office/drawing/2010/main" val="0"/>
+              </a:ext>
+            </a:extLst>
+          </a:blip>
+          <a:srcRect/>
+          <a:stretch>
+            <a:fillRect/>
+          </a:stretch>
+        </p:blipFill>
+        <p:spPr bwMode="auto">
+          <a:xfrm>
+            <a:off x="8286750" y="252442"/>
+            <a:ext cx="685800" cy="685800"/>
+          </a:xfrm>
+          <a:prstGeom prst="rect">
+            <a:avLst/>
+          </a:prstGeom>
+          <a:noFill/>
+          <a:ln>
+            <a:noFill/>
+          </a:ln>
+          <a:extLst>
+            <a:ext uri="{909E8E84-426E-40DD-AFC4-6F175D3DCCD1}">
+              <a14:hiddenFill xmlns:a14="http://schemas.microsoft.com/office/drawing/2010/main">
+                <a:solidFill>
+                  <a:schemeClr val="accent1"/>
+                </a:solidFill>
+              </a14:hiddenFill>
+            </a:ext>
+            <a:ext uri="{91240B29-F687-4F45-9708-019B960494DF}">
+              <a14:hiddenLine xmlns:a14="http://schemas.microsoft.com/office/drawing/2010/main" w="9525">
+                <a:solidFill>
+                  <a:schemeClr val="tx1"/>
+                </a:solidFill>
+                <a:miter lim="800000"/>
+                <a:headEnd/>
+                <a:tailEnd/>
+              </a14:hiddenLine>
+            </a:ext>
+          </a:extLst>
+        </p:spPr>
+      </p:pic>
+      <p:sp>
+        <p:nvSpPr>
+          <p:cNvPr id="19" name="TextBox 18"/>
+          <p:cNvSpPr txBox="1"/>
+          <p:nvPr/>
+        </p:nvSpPr>
+        <p:spPr>
+          <a:xfrm>
+            <a:off x="28574" y="0"/>
+            <a:ext cx="9115425" cy="369332"/>
+          </a:xfrm>
+          <a:prstGeom prst="rect">
+            <a:avLst/>
+          </a:prstGeom>
+          <a:noFill/>
+        </p:spPr>
+        <p:txBody>
+          <a:bodyPr wrap="square" rtlCol="0">
+            <a:spAutoFit/>
+          </a:bodyPr>
+          <a:lstStyle/>
+          <a:p>
+            <a:r>
+              <a:rPr lang="en-US" dirty="0">
+                <a:solidFill>
+                  <a:schemeClr val="tx1">
+                    <a:lumMod val="75000"/>
+                    <a:lumOff val="25000"/>
+                  </a:schemeClr>
+                </a:solidFill>
+              </a:rPr>
+              <a:t>##############################################################################</a:t>
+            </a:r>
+            <a:endParaRPr lang="en-CA" dirty="0">
+              <a:solidFill>
+                <a:schemeClr val="tx1">
+                  <a:lumMod val="75000"/>
+                  <a:lumOff val="25000"/>
+                </a:schemeClr>
+              </a:solidFill>
+            </a:endParaRPr>
+          </a:p>
+        </p:txBody>
+      </p:sp>
+      <p:sp>
+        <p:nvSpPr>
+          <p:cNvPr id="20" name="Rectangle 19"/>
+          <p:cNvSpPr/>
+          <p:nvPr/>
+        </p:nvSpPr>
+        <p:spPr>
+          <a:xfrm>
+            <a:off x="28574" y="4724400"/>
+            <a:ext cx="9115426" cy="369332"/>
+          </a:xfrm>
+          <a:prstGeom prst="rect">
+            <a:avLst/>
+          </a:prstGeom>
+        </p:spPr>
+        <p:txBody>
+          <a:bodyPr wrap="square">
+            <a:spAutoFit/>
+          </a:bodyPr>
+          <a:lstStyle/>
+          <a:p>
+            <a:r>
+              <a:rPr lang="en-US" dirty="0">
+                <a:solidFill>
+                  <a:schemeClr val="accent3">
+                    <a:lumMod val="50000"/>
+                  </a:schemeClr>
+                </a:solidFill>
+              </a:rPr>
+              <a:t>##</a:t>
+            </a:r>
+            <a:r>
+              <a:rPr lang="en-US" dirty="0">
+                <a:solidFill>
+                  <a:schemeClr val="tx1">
+                    <a:lumMod val="75000"/>
+                    <a:lumOff val="25000"/>
+                  </a:schemeClr>
+                </a:solidFill>
+              </a:rPr>
+              <a:t>############################################################################</a:t>
+            </a:r>
+            <a:endParaRPr lang="en-CA" dirty="0"/>
+          </a:p>
+        </p:txBody>
+      </p:sp>
+      <p:sp>
+        <p:nvSpPr>
+          <p:cNvPr id="21" name="Rectangle 20"/>
+          <p:cNvSpPr/>
+          <p:nvPr/>
+        </p:nvSpPr>
+        <p:spPr>
+          <a:xfrm>
+            <a:off x="38100" y="285750"/>
+            <a:ext cx="266700" cy="4524315"/>
+          </a:xfrm>
+          <a:prstGeom prst="rect">
+            <a:avLst/>
+          </a:prstGeom>
+        </p:spPr>
+        <p:txBody>
+          <a:bodyPr wrap="square">
+            <a:spAutoFit/>
+          </a:bodyPr>
+          <a:lstStyle/>
+          <a:p>
+            <a:r>
+              <a:rPr lang="en-US" dirty="0">
+                <a:solidFill>
+                  <a:schemeClr val="tx1">
+                    <a:lumMod val="75000"/>
+                    <a:lumOff val="25000"/>
+                  </a:schemeClr>
+                </a:solidFill>
+              </a:rPr>
+              <a:t>################</a:t>
+            </a:r>
+            <a:endParaRPr lang="en-CA" dirty="0"/>
+          </a:p>
+        </p:txBody>
+      </p:sp>
+      <p:sp>
+        <p:nvSpPr>
+          <p:cNvPr id="22" name="Rectangle 21"/>
+          <p:cNvSpPr/>
+          <p:nvPr/>
+        </p:nvSpPr>
+        <p:spPr>
+          <a:xfrm>
+            <a:off x="8839200" y="309592"/>
+            <a:ext cx="266700" cy="4524315"/>
+          </a:xfrm>
+          <a:prstGeom prst="rect">
+            <a:avLst/>
+          </a:prstGeom>
+        </p:spPr>
+        <p:txBody>
+          <a:bodyPr wrap="square">
+            <a:spAutoFit/>
+          </a:bodyPr>
+          <a:lstStyle/>
+          <a:p>
+            <a:r>
+              <a:rPr lang="en-US" dirty="0">
+                <a:solidFill>
+                  <a:schemeClr val="tx1">
+                    <a:lumMod val="75000"/>
+                    <a:lumOff val="25000"/>
+                  </a:schemeClr>
+                </a:solidFill>
+              </a:rPr>
+              <a:t>################</a:t>
+            </a:r>
+            <a:endParaRPr lang="en-CA" dirty="0"/>
+          </a:p>
+        </p:txBody>
+      </p:sp>
+      <p:cxnSp>
+        <p:nvCxnSpPr>
+          <p:cNvPr id="7" name="Straight Connector 6"/>
+          <p:cNvCxnSpPr/>
+          <p:nvPr/>
+        </p:nvCxnSpPr>
+        <p:spPr>
+          <a:xfrm>
+            <a:off x="609600" y="1047750"/>
+            <a:ext cx="3276600" cy="0"/>
+          </a:xfrm>
+          <a:prstGeom prst="line">
+            <a:avLst/>
+          </a:prstGeom>
+          <a:ln>
+            <a:solidFill>
+              <a:srgbClr val="28C22F"/>
+            </a:solidFill>
+          </a:ln>
+        </p:spPr>
+        <p:style>
+          <a:lnRef idx="1">
+            <a:schemeClr val="accent1"/>
+          </a:lnRef>
+          <a:fillRef idx="0">
+            <a:schemeClr val="accent1"/>
+          </a:fillRef>
+          <a:effectRef idx="0">
+            <a:schemeClr val="accent1"/>
+          </a:effectRef>
+          <a:fontRef idx="minor">
+            <a:schemeClr val="tx1"/>
+          </a:fontRef>
+        </p:style>
+      </p:cxnSp>
+      <p:sp>
+        <p:nvSpPr>
+          <p:cNvPr id="12" name="Title 1"/>
+          <p:cNvSpPr txBox="1">
+            <a:spLocks/>
+          </p:cNvSpPr>
+          <p:nvPr/>
+        </p:nvSpPr>
+        <p:spPr>
+          <a:xfrm>
+            <a:off x="513117" y="346657"/>
+            <a:ext cx="3886200" cy="890558"/>
+          </a:xfrm>
+          <a:prstGeom prst="rect">
+            <a:avLst/>
+          </a:prstGeom>
+        </p:spPr>
+        <p:txBody>
+          <a:bodyPr anchor="ctr" anchorCtr="0">
+            <a:normAutofit/>
+          </a:bodyPr>
+          <a:lstStyle>
+            <a:lvl1pPr algn="ctr" defTabSz="914400" rtl="0" eaLnBrk="1" latinLnBrk="0" hangingPunct="1">
+              <a:spcBef>
+                <a:spcPct val="0"/>
+              </a:spcBef>
+              <a:buNone/>
+              <a:defRPr sz="4400" kern="1200">
+                <a:solidFill>
+                  <a:schemeClr val="tx1"/>
+                </a:solidFill>
+                <a:latin typeface="+mj-lt"/>
+                <a:ea typeface="+mj-ea"/>
+                <a:cs typeface="+mj-cs"/>
+              </a:defRPr>
+            </a:lvl1pPr>
+          </a:lstStyle>
+          <a:p>
+            <a:pPr algn="l"/>
+            <a:r>
+              <a:rPr lang="en-CA" sz="3200" dirty="0">
+                <a:solidFill>
+                  <a:schemeClr val="bg1"/>
+                </a:solidFill>
+                <a:latin typeface="Calibri Light" panose="020F0302020204030204" pitchFamily="34" charset="0"/>
+                <a:cs typeface="Calibri Light" panose="020F0302020204030204" pitchFamily="34" charset="0"/>
+              </a:rPr>
+              <a:t>Motivation</a:t>
+            </a:r>
+          </a:p>
+        </p:txBody>
+      </p:sp>
+      <p:pic>
+        <p:nvPicPr>
+          <p:cNvPr id="2" name="OG_Rogue">
+            <a:hlinkClick r:id="" action="ppaction://media"/>
+          </p:cNvPr>
+          <p:cNvPicPr>
+            <a:picLocks noChangeAspect="1"/>
+          </p:cNvPicPr>
+          <p:nvPr>
+            <a:videoFile r:link="rId2"/>
+            <p:extLst>
+              <p:ext uri="{DAA4B4D4-6D71-4841-9C94-3DE7FCFB9230}">
+                <p14:media xmlns:p14="http://schemas.microsoft.com/office/powerpoint/2010/main" r:embed="rId1"/>
+              </p:ext>
+            </p:extLst>
+          </p:nvPr>
+        </p:nvPicPr>
+        <p:blipFill>
+          <a:blip r:embed="rId5"/>
+          <a:stretch>
+            <a:fillRect/>
+          </a:stretch>
+        </p:blipFill>
+        <p:spPr>
+          <a:xfrm>
+            <a:off x="2547321" y="1482615"/>
+            <a:ext cx="4071938" cy="2996384"/>
+          </a:xfrm>
+          <a:prstGeom prst="rect">
+            <a:avLst/>
+          </a:prstGeom>
+          <a:effectLst>
+            <a:outerShdw blurRad="152400" dir="9600000" sx="102000" sy="102000" algn="tl" rotWithShape="0">
+              <a:prstClr val="black">
+                <a:alpha val="40000"/>
+              </a:prstClr>
+            </a:outerShdw>
+          </a:effectLst>
+        </p:spPr>
+      </p:pic>
+    </p:spTree>
+    <p:extLst>
+      <p:ext uri="{BB962C8B-B14F-4D97-AF65-F5344CB8AC3E}">
+        <p14:creationId xmlns:p14="http://schemas.microsoft.com/office/powerpoint/2010/main" val="3127716271"/>
+      </p:ext>
+    </p:extLst>
+  </p:cSld>
+  <p:clrMapOvr>
+    <a:masterClrMapping/>
+  </p:clrMapOvr>
+  <p:timing>
+    <p:tnLst>
+      <p:par>
+        <p:cTn id="1" dur="indefinite" restart="never" nodeType="tmRoot">
+          <p:childTnLst>
+            <p:seq concurrent="1" nextAc="seek">
+              <p:cTn id="2" restart="whenNotActive" fill="hold" evtFilter="cancelBubble" nodeType="interactiveSeq">
+                <p:stCondLst>
+                  <p:cond evt="onClick" delay="0">
+                    <p:tgtEl>
+                      <p:spTgt spid="2"/>
+                    </p:tgtEl>
+                  </p:cond>
+                </p:stCondLst>
+                <p:endSync evt="end" delay="0">
+                  <p:rtn val="all"/>
+                </p:endSync>
+                <p:childTnLst>
+                  <p:par>
+                    <p:cTn id="3" fill="hold">
+                      <p:stCondLst>
+                        <p:cond delay="0"/>
+                      </p:stCondLst>
+                      <p:childTnLst>
+                        <p:par>
+                          <p:cTn id="4" fill="hold">
+                            <p:stCondLst>
+                              <p:cond delay="0"/>
+                            </p:stCondLst>
+                            <p:childTnLst>
+                              <p:par>
+                                <p:cTn id="5" presetID="2" presetClass="mediacall" presetSubtype="0" fill="hold" nodeType="clickEffect">
+                                  <p:stCondLst>
+                                    <p:cond delay="0"/>
+                                  </p:stCondLst>
+                                  <p:childTnLst>
+                                    <p:cmd type="call" cmd="togglePause">
+                                      <p:cBhvr>
+                                        <p:cTn id="6" dur="1" fill="hold"/>
+                                        <p:tgtEl>
+                                          <p:spTgt spid="2"/>
+                                        </p:tgtEl>
+                                      </p:cBhvr>
+                                    </p:cmd>
+                                  </p:childTnLst>
+                                </p:cTn>
+                              </p:par>
+                            </p:childTnLst>
+                          </p:cTn>
+                        </p:par>
+                      </p:childTnLst>
+                    </p:cTn>
+                  </p:par>
+                </p:childTnLst>
+              </p:cTn>
+              <p:nextCondLst>
+                <p:cond evt="onClick" delay="0">
+                  <p:tgtEl>
+                    <p:spTgt spid="2"/>
+                  </p:tgtEl>
+                </p:cond>
+              </p:nextCondLst>
+            </p:seq>
+            <p:video>
+              <p:cMediaNode vol="80000">
+                <p:cTn id="7" fill="hold" display="0">
+                  <p:stCondLst>
+                    <p:cond delay="indefinite"/>
+                  </p:stCondLst>
+                </p:cTn>
+                <p:tgtEl>
+                  <p:spTgt spid="2"/>
+                </p:tgtEl>
+              </p:cMediaNode>
+            </p:video>
+          </p:childTnLst>
+        </p:cTn>
+      </p:par>
+    </p:tnLst>
+  </p:timing>
+</p:sld>
+</file>
+
+<file path=ppt/slides/slide3.xml><?xml version="1.0" encoding="utf-8"?>
 <p:sld xmlns:a="http://schemas.openxmlformats.org/drawingml/2006/main" xmlns:r="http://schemas.openxmlformats.org/officeDocument/2006/relationships" xmlns:p="http://schemas.openxmlformats.org/presentationml/2006/main">
   <p:cSld>
     <p:spTree>
@@ -6248,7 +6766,7 @@
                   </a:schemeClr>
                 </a:solidFill>
               </a:rPr>
-              <a:t>##</a:t>
+              <a:t>########</a:t>
             </a:r>
             <a:r>
               <a:rPr lang="en-US" dirty="0">
@@ -6259,7 +6777,7 @@
                   </a:schemeClr>
                 </a:solidFill>
               </a:rPr>
-              <a:t>############################################################################</a:t>
+              <a:t>######################################################################</a:t>
             </a:r>
             <a:endParaRPr lang="en-CA" dirty="0"/>
           </a:p>
@@ -6334,6 +6852,257 @@
               <a:t>################</a:t>
             </a:r>
             <a:endParaRPr lang="en-CA" dirty="0"/>
+          </a:p>
+        </p:txBody>
+      </p:sp>
+      <p:sp>
+        <p:nvSpPr>
+          <p:cNvPr id="24" name="Title 1"/>
+          <p:cNvSpPr txBox="1">
+            <a:spLocks/>
+          </p:cNvSpPr>
+          <p:nvPr/>
+        </p:nvSpPr>
+        <p:spPr>
+          <a:xfrm>
+            <a:off x="513117" y="346657"/>
+            <a:ext cx="3886200" cy="890558"/>
+          </a:xfrm>
+          <a:prstGeom prst="rect">
+            <a:avLst/>
+          </a:prstGeom>
+        </p:spPr>
+        <p:txBody>
+          <a:bodyPr anchor="ctr" anchorCtr="0">
+            <a:normAutofit/>
+          </a:bodyPr>
+          <a:lstStyle>
+            <a:lvl1pPr algn="ctr" defTabSz="914400" rtl="0" eaLnBrk="1" latinLnBrk="0" hangingPunct="1">
+              <a:spcBef>
+                <a:spcPct val="0"/>
+              </a:spcBef>
+              <a:buNone/>
+              <a:defRPr sz="4400" kern="1200">
+                <a:solidFill>
+                  <a:schemeClr val="tx1"/>
+                </a:solidFill>
+                <a:latin typeface="+mj-lt"/>
+                <a:ea typeface="+mj-ea"/>
+                <a:cs typeface="+mj-cs"/>
+              </a:defRPr>
+            </a:lvl1pPr>
+          </a:lstStyle>
+          <a:p>
+            <a:pPr algn="l"/>
+            <a:r>
+              <a:rPr lang="en-CA" sz="3200" dirty="0">
+                <a:solidFill>
+                  <a:schemeClr val="bg1"/>
+                </a:solidFill>
+                <a:latin typeface="Calibri Light" panose="020F0302020204030204" pitchFamily="34" charset="0"/>
+                <a:cs typeface="Calibri Light" panose="020F0302020204030204" pitchFamily="34" charset="0"/>
+              </a:rPr>
+              <a:t>Purpose and Scope</a:t>
+            </a:r>
+          </a:p>
+        </p:txBody>
+      </p:sp>
+      <p:sp>
+        <p:nvSpPr>
+          <p:cNvPr id="2" name="TextBox 1"/>
+          <p:cNvSpPr txBox="1"/>
+          <p:nvPr/>
+        </p:nvSpPr>
+        <p:spPr>
+          <a:xfrm>
+            <a:off x="457200" y="1301842"/>
+            <a:ext cx="1524000" cy="369332"/>
+          </a:xfrm>
+          <a:prstGeom prst="rect">
+            <a:avLst/>
+          </a:prstGeom>
+          <a:noFill/>
+        </p:spPr>
+        <p:txBody>
+          <a:bodyPr wrap="square" rtlCol="0">
+            <a:spAutoFit/>
+          </a:bodyPr>
+          <a:lstStyle/>
+          <a:p>
+            <a:pPr algn="r"/>
+            <a:r>
+              <a:rPr lang="en-US" dirty="0" smtClean="0">
+                <a:solidFill>
+                  <a:srgbClr val="28C22F"/>
+                </a:solidFill>
+              </a:rPr>
+              <a:t>Purpose</a:t>
+            </a:r>
+            <a:endParaRPr lang="en-US" dirty="0">
+              <a:solidFill>
+                <a:srgbClr val="28C22F"/>
+              </a:solidFill>
+            </a:endParaRPr>
+          </a:p>
+        </p:txBody>
+      </p:sp>
+      <p:sp>
+        <p:nvSpPr>
+          <p:cNvPr id="5" name="TextBox 4"/>
+          <p:cNvSpPr txBox="1"/>
+          <p:nvPr/>
+        </p:nvSpPr>
+        <p:spPr>
+          <a:xfrm>
+            <a:off x="2232550" y="1214540"/>
+            <a:ext cx="6606650" cy="2954655"/>
+          </a:xfrm>
+          <a:prstGeom prst="rect">
+            <a:avLst/>
+          </a:prstGeom>
+          <a:noFill/>
+        </p:spPr>
+        <p:txBody>
+          <a:bodyPr wrap="square" rtlCol="0">
+            <a:spAutoFit/>
+          </a:bodyPr>
+          <a:lstStyle/>
+          <a:p>
+            <a:pPr marL="285750" indent="-285750">
+              <a:lnSpc>
+                <a:spcPct val="150000"/>
+              </a:lnSpc>
+              <a:buClr>
+                <a:schemeClr val="bg1"/>
+              </a:buClr>
+              <a:buSzPct val="80000"/>
+              <a:buFont typeface="Calibri" panose="020F0502020204030204" pitchFamily="34" charset="0"/>
+              <a:buChar char="&gt;"/>
+            </a:pPr>
+            <a:r>
+              <a:rPr lang="en-US" dirty="0">
+                <a:solidFill>
+                  <a:schemeClr val="bg1"/>
+                </a:solidFill>
+              </a:rPr>
+              <a:t>Develop an enhanced version of the original Rogue (1980)</a:t>
+            </a:r>
+          </a:p>
+          <a:p>
+            <a:pPr marL="742950" lvl="1" indent="-285750">
+              <a:lnSpc>
+                <a:spcPct val="150000"/>
+              </a:lnSpc>
+              <a:buClr>
+                <a:schemeClr val="bg1"/>
+              </a:buClr>
+              <a:buSzPct val="80000"/>
+              <a:buFont typeface="Calibri" panose="020F0502020204030204" pitchFamily="34" charset="0"/>
+              <a:buChar char="&gt;"/>
+            </a:pPr>
+            <a:r>
+              <a:rPr lang="en-US" dirty="0">
+                <a:solidFill>
+                  <a:srgbClr val="00B0F0"/>
+                </a:solidFill>
+              </a:rPr>
+              <a:t>Client:</a:t>
+            </a:r>
+            <a:r>
+              <a:rPr lang="en-US" dirty="0">
+                <a:solidFill>
+                  <a:schemeClr val="bg1"/>
+                </a:solidFill>
+              </a:rPr>
+              <a:t> UI, Gameplay, and Performance</a:t>
+            </a:r>
+          </a:p>
+          <a:p>
+            <a:pPr marL="742950" lvl="1" indent="-285750">
+              <a:lnSpc>
+                <a:spcPct val="150000"/>
+              </a:lnSpc>
+              <a:buClr>
+                <a:schemeClr val="bg1"/>
+              </a:buClr>
+              <a:buSzPct val="80000"/>
+              <a:buFont typeface="Calibri" panose="020F0502020204030204" pitchFamily="34" charset="0"/>
+              <a:buChar char="&gt;"/>
+            </a:pPr>
+            <a:r>
+              <a:rPr lang="en-US" dirty="0">
+                <a:solidFill>
+                  <a:srgbClr val="00B0F0"/>
+                </a:solidFill>
+              </a:rPr>
+              <a:t>Development: </a:t>
+            </a:r>
+            <a:r>
+              <a:rPr lang="en-US" dirty="0">
+                <a:solidFill>
+                  <a:schemeClr val="bg1"/>
+                </a:solidFill>
+              </a:rPr>
+              <a:t>Design, Documentation, and Testing</a:t>
+            </a:r>
+          </a:p>
+          <a:p>
+            <a:pPr lvl="1">
+              <a:lnSpc>
+                <a:spcPct val="150000"/>
+              </a:lnSpc>
+              <a:buClr>
+                <a:schemeClr val="bg1"/>
+              </a:buClr>
+              <a:buSzPct val="80000"/>
+            </a:pPr>
+            <a:endParaRPr lang="en-US" sz="1600" dirty="0">
+              <a:solidFill>
+                <a:schemeClr val="bg1"/>
+              </a:solidFill>
+            </a:endParaRPr>
+          </a:p>
+          <a:p>
+            <a:pPr marL="285750" indent="-285750">
+              <a:lnSpc>
+                <a:spcPct val="150000"/>
+              </a:lnSpc>
+              <a:buClr>
+                <a:schemeClr val="bg1"/>
+              </a:buClr>
+              <a:buSzPct val="80000"/>
+              <a:buFont typeface="Calibri" panose="020F0502020204030204" pitchFamily="34" charset="0"/>
+              <a:buChar char="&gt;"/>
+            </a:pPr>
+            <a:r>
+              <a:rPr lang="en-US" dirty="0">
+                <a:solidFill>
+                  <a:schemeClr val="bg1"/>
+                </a:solidFill>
+              </a:rPr>
+              <a:t>Implement virtually all functionality present in the original version</a:t>
+            </a:r>
+          </a:p>
+          <a:p>
+            <a:pPr marL="285750" indent="-285750">
+              <a:lnSpc>
+                <a:spcPct val="150000"/>
+              </a:lnSpc>
+              <a:buClr>
+                <a:schemeClr val="bg1"/>
+              </a:buClr>
+              <a:buSzPct val="80000"/>
+              <a:buFont typeface="Calibri" panose="020F0502020204030204" pitchFamily="34" charset="0"/>
+              <a:buChar char="&gt;"/>
+            </a:pPr>
+            <a:r>
+              <a:rPr lang="en-US" dirty="0">
+                <a:solidFill>
+                  <a:schemeClr val="bg1"/>
+                </a:solidFill>
+              </a:rPr>
+              <a:t>Faithful improvements over non-functional qualities such as learnability and aesthetics</a:t>
+            </a:r>
           </a:p>
         </p:txBody>
       </p:sp>
@@ -6374,215 +7143,14 @@
       </p:cxnSp>
       <p:sp>
         <p:nvSpPr>
-          <p:cNvPr id="12" name="Title 1"/>
-          <p:cNvSpPr txBox="1">
-            <a:spLocks/>
-          </p:cNvSpPr>
-          <p:nvPr/>
-        </p:nvSpPr>
-        <p:spPr>
-          <a:xfrm>
-            <a:off x="513117" y="346657"/>
-            <a:ext cx="3886200" cy="890558"/>
-          </a:xfrm>
-          <a:prstGeom prst="rect">
-            <a:avLst/>
-          </a:prstGeom>
-        </p:spPr>
-        <p:txBody>
-          <a:bodyPr anchor="ctr" anchorCtr="0">
-            <a:normAutofit/>
-          </a:bodyPr>
-          <a:lstStyle>
-            <a:lvl1pPr algn="ctr" defTabSz="914400" rtl="0" eaLnBrk="1" latinLnBrk="0" hangingPunct="1">
-              <a:spcBef>
-                <a:spcPct val="0"/>
-              </a:spcBef>
-              <a:buNone/>
-              <a:defRPr sz="4400" kern="1200">
-                <a:solidFill>
-                  <a:schemeClr val="tx1"/>
-                </a:solidFill>
-                <a:latin typeface="+mj-lt"/>
-                <a:ea typeface="+mj-ea"/>
-                <a:cs typeface="+mj-cs"/>
-              </a:defRPr>
-            </a:lvl1pPr>
-          </a:lstStyle>
-          <a:p>
-            <a:pPr algn="l"/>
-            <a:r>
-              <a:rPr lang="en-CA" sz="3200" dirty="0">
-                <a:solidFill>
-                  <a:schemeClr val="bg1"/>
-                </a:solidFill>
-                <a:latin typeface="Calibri Light" panose="020F0302020204030204" pitchFamily="34" charset="0"/>
-                <a:cs typeface="Calibri Light" panose="020F0302020204030204" pitchFamily="34" charset="0"/>
-              </a:rPr>
-              <a:t>Motivation</a:t>
-            </a:r>
-          </a:p>
-        </p:txBody>
-      </p:sp>
-    </p:spTree>
-    <p:extLst>
-      <p:ext uri="{BB962C8B-B14F-4D97-AF65-F5344CB8AC3E}">
-        <p14:creationId xmlns:p14="http://schemas.microsoft.com/office/powerpoint/2010/main" val="3127716271"/>
-      </p:ext>
-    </p:extLst>
-  </p:cSld>
-  <p:clrMapOvr>
-    <a:masterClrMapping/>
-  </p:clrMapOvr>
-  <p:timing>
-    <p:tnLst>
-      <p:par>
-        <p:cTn id="1" dur="indefinite" restart="never" nodeType="tmRoot"/>
-      </p:par>
-    </p:tnLst>
-  </p:timing>
-</p:sld>
-</file>
-
-<file path=ppt/slides/slide3.xml><?xml version="1.0" encoding="utf-8"?>
-<p:sld xmlns:a="http://schemas.openxmlformats.org/drawingml/2006/main" xmlns:r="http://schemas.openxmlformats.org/officeDocument/2006/relationships" xmlns:p="http://schemas.openxmlformats.org/presentationml/2006/main">
-  <p:cSld>
-    <p:spTree>
-      <p:nvGrpSpPr>
-        <p:cNvPr id="1" name=""/>
-        <p:cNvGrpSpPr/>
-        <p:nvPr/>
-      </p:nvGrpSpPr>
-      <p:grpSpPr>
-        <a:xfrm>
-          <a:off x="0" y="0"/>
-          <a:ext cx="0" cy="0"/>
-          <a:chOff x="0" y="0"/>
-          <a:chExt cx="0" cy="0"/>
-        </a:xfrm>
-      </p:grpSpPr>
-      <p:sp>
-        <p:nvSpPr>
-          <p:cNvPr id="14" name="Rectangle 13"/>
-          <p:cNvSpPr/>
-          <p:nvPr/>
-        </p:nvSpPr>
-        <p:spPr>
-          <a:xfrm>
-            <a:off x="0" y="0"/>
-            <a:ext cx="9144000" cy="5143500"/>
-          </a:xfrm>
-          <a:prstGeom prst="rect">
-            <a:avLst/>
-          </a:prstGeom>
-          <a:solidFill>
-            <a:srgbClr val="1F1F1F"/>
-          </a:solidFill>
-          <a:ln>
-            <a:solidFill>
-              <a:schemeClr val="tx1"/>
-            </a:solidFill>
-          </a:ln>
-        </p:spPr>
-        <p:style>
-          <a:lnRef idx="2">
-            <a:schemeClr val="accent1">
-              <a:shade val="50000"/>
-            </a:schemeClr>
-          </a:lnRef>
-          <a:fillRef idx="1">
-            <a:schemeClr val="accent1"/>
-          </a:fillRef>
-          <a:effectRef idx="0">
-            <a:schemeClr val="accent1"/>
-          </a:effectRef>
-          <a:fontRef idx="minor">
-            <a:schemeClr val="lt1"/>
-          </a:fontRef>
-        </p:style>
-        <p:txBody>
-          <a:bodyPr rtlCol="0" anchor="ctr"/>
-          <a:lstStyle/>
-          <a:p>
-            <a:pPr algn="ctr"/>
-            <a:endParaRPr lang="en-CA" dirty="0"/>
-          </a:p>
-        </p:txBody>
-      </p:sp>
-      <p:pic>
-        <p:nvPicPr>
-          <p:cNvPr id="18" name="Picture 16"/>
-          <p:cNvPicPr>
-            <a:picLocks noChangeAspect="1" noChangeArrowheads="1"/>
-          </p:cNvPicPr>
-          <p:nvPr/>
-        </p:nvPicPr>
-        <p:blipFill>
-          <a:blip r:embed="rId2" cstate="print">
-            <a:clrChange>
-              <a:clrFrom>
-                <a:srgbClr val="000000"/>
-              </a:clrFrom>
-              <a:clrTo>
-                <a:srgbClr val="000000">
-                  <a:alpha val="0"/>
-                </a:srgbClr>
-              </a:clrTo>
-            </a:clrChange>
-            <a:extLst>
-              <a:ext uri="{28A0092B-C50C-407E-A947-70E740481C1C}">
-                <a14:useLocalDpi xmlns:a14="http://schemas.microsoft.com/office/drawing/2010/main" val="0"/>
-              </a:ext>
-            </a:extLst>
-          </a:blip>
-          <a:srcRect/>
-          <a:stretch>
-            <a:fillRect/>
-          </a:stretch>
-        </p:blipFill>
-        <p:spPr bwMode="auto">
-          <a:xfrm>
-            <a:off x="8286750" y="252442"/>
-            <a:ext cx="685800" cy="685800"/>
-          </a:xfrm>
-          <a:prstGeom prst="rect">
-            <a:avLst/>
-          </a:prstGeom>
-          <a:noFill/>
-          <a:ln>
-            <a:noFill/>
-          </a:ln>
-          <a:extLst>
-            <a:ext uri="{909E8E84-426E-40DD-AFC4-6F175D3DCCD1}">
-              <a14:hiddenFill xmlns:a14="http://schemas.microsoft.com/office/drawing/2010/main">
-                <a:solidFill>
-                  <a:schemeClr val="accent1"/>
-                </a:solidFill>
-              </a14:hiddenFill>
-            </a:ext>
-            <a:ext uri="{91240B29-F687-4F45-9708-019B960494DF}">
-              <a14:hiddenLine xmlns:a14="http://schemas.microsoft.com/office/drawing/2010/main" w="9525">
-                <a:solidFill>
-                  <a:schemeClr val="tx1"/>
-                </a:solidFill>
-                <a:miter lim="800000"/>
-                <a:headEnd/>
-                <a:tailEnd/>
-              </a14:hiddenLine>
-            </a:ext>
-          </a:extLst>
-        </p:spPr>
-      </p:pic>
-      <p:sp>
-        <p:nvSpPr>
-          <p:cNvPr id="19" name="TextBox 18"/>
+          <p:cNvPr id="12" name="TextBox 11"/>
           <p:cNvSpPr txBox="1"/>
           <p:nvPr/>
         </p:nvSpPr>
         <p:spPr>
           <a:xfrm>
-            <a:off x="28574" y="0"/>
-            <a:ext cx="9115425" cy="369332"/>
+            <a:off x="457200" y="2888218"/>
+            <a:ext cx="1524000" cy="369332"/>
           </a:xfrm>
           <a:prstGeom prst="rect">
             <a:avLst/>
@@ -6595,281 +7163,9 @@
           </a:bodyPr>
           <a:lstStyle/>
           <a:p>
-            <a:r>
-              <a:rPr lang="en-US" dirty="0">
-                <a:solidFill>
-                  <a:schemeClr val="tx1">
-                    <a:lumMod val="75000"/>
-                    <a:lumOff val="25000"/>
-                  </a:schemeClr>
-                </a:solidFill>
-              </a:rPr>
-              <a:t>##############################################################################</a:t>
-            </a:r>
-            <a:endParaRPr lang="en-CA" dirty="0">
-              <a:solidFill>
-                <a:schemeClr val="tx1">
-                  <a:lumMod val="75000"/>
-                  <a:lumOff val="25000"/>
-                </a:schemeClr>
-              </a:solidFill>
-            </a:endParaRPr>
-          </a:p>
-        </p:txBody>
-      </p:sp>
-      <p:sp>
-        <p:nvSpPr>
-          <p:cNvPr id="20" name="Rectangle 19"/>
-          <p:cNvSpPr/>
-          <p:nvPr/>
-        </p:nvSpPr>
-        <p:spPr>
-          <a:xfrm>
-            <a:off x="28574" y="4724400"/>
-            <a:ext cx="9115426" cy="369332"/>
-          </a:xfrm>
-          <a:prstGeom prst="rect">
-            <a:avLst/>
-          </a:prstGeom>
-        </p:spPr>
-        <p:txBody>
-          <a:bodyPr wrap="square">
-            <a:spAutoFit/>
-          </a:bodyPr>
-          <a:lstStyle/>
-          <a:p>
-            <a:r>
-              <a:rPr lang="en-US" dirty="0">
-                <a:solidFill>
-                  <a:schemeClr val="accent3">
-                    <a:lumMod val="50000"/>
-                  </a:schemeClr>
-                </a:solidFill>
-              </a:rPr>
-              <a:t>########</a:t>
-            </a:r>
-            <a:r>
-              <a:rPr lang="en-US" dirty="0">
-                <a:solidFill>
-                  <a:schemeClr val="tx1">
-                    <a:lumMod val="75000"/>
-                    <a:lumOff val="25000"/>
-                  </a:schemeClr>
-                </a:solidFill>
-              </a:rPr>
-              <a:t>######################################################################</a:t>
-            </a:r>
-            <a:endParaRPr lang="en-CA" dirty="0"/>
-          </a:p>
-        </p:txBody>
-      </p:sp>
-      <p:sp>
-        <p:nvSpPr>
-          <p:cNvPr id="21" name="Rectangle 20"/>
-          <p:cNvSpPr/>
-          <p:nvPr/>
-        </p:nvSpPr>
-        <p:spPr>
-          <a:xfrm>
-            <a:off x="38100" y="285750"/>
-            <a:ext cx="266700" cy="4524315"/>
-          </a:xfrm>
-          <a:prstGeom prst="rect">
-            <a:avLst/>
-          </a:prstGeom>
-        </p:spPr>
-        <p:txBody>
-          <a:bodyPr wrap="square">
-            <a:spAutoFit/>
-          </a:bodyPr>
-          <a:lstStyle/>
-          <a:p>
-            <a:r>
-              <a:rPr lang="en-US" dirty="0">
-                <a:solidFill>
-                  <a:schemeClr val="tx1">
-                    <a:lumMod val="75000"/>
-                    <a:lumOff val="25000"/>
-                  </a:schemeClr>
-                </a:solidFill>
-              </a:rPr>
-              <a:t>################</a:t>
-            </a:r>
-            <a:endParaRPr lang="en-CA" dirty="0"/>
-          </a:p>
-        </p:txBody>
-      </p:sp>
-      <p:sp>
-        <p:nvSpPr>
-          <p:cNvPr id="22" name="Rectangle 21"/>
-          <p:cNvSpPr/>
-          <p:nvPr/>
-        </p:nvSpPr>
-        <p:spPr>
-          <a:xfrm>
-            <a:off x="8839200" y="309592"/>
-            <a:ext cx="266700" cy="4524315"/>
-          </a:xfrm>
-          <a:prstGeom prst="rect">
-            <a:avLst/>
-          </a:prstGeom>
-        </p:spPr>
-        <p:txBody>
-          <a:bodyPr wrap="square">
-            <a:spAutoFit/>
-          </a:bodyPr>
-          <a:lstStyle/>
-          <a:p>
-            <a:r>
-              <a:rPr lang="en-US" dirty="0">
-                <a:solidFill>
-                  <a:schemeClr val="tx1">
-                    <a:lumMod val="75000"/>
-                    <a:lumOff val="25000"/>
-                  </a:schemeClr>
-                </a:solidFill>
-              </a:rPr>
-              <a:t>################</a:t>
-            </a:r>
-            <a:endParaRPr lang="en-CA" dirty="0"/>
-          </a:p>
-        </p:txBody>
-      </p:sp>
-      <p:sp>
-        <p:nvSpPr>
-          <p:cNvPr id="24" name="Title 1"/>
-          <p:cNvSpPr txBox="1">
-            <a:spLocks/>
-          </p:cNvSpPr>
-          <p:nvPr/>
-        </p:nvSpPr>
-        <p:spPr>
-          <a:xfrm>
-            <a:off x="513117" y="346657"/>
-            <a:ext cx="3886200" cy="890558"/>
-          </a:xfrm>
-          <a:prstGeom prst="rect">
-            <a:avLst/>
-          </a:prstGeom>
-        </p:spPr>
-        <p:txBody>
-          <a:bodyPr anchor="ctr" anchorCtr="0">
-            <a:normAutofit/>
-          </a:bodyPr>
-          <a:lstStyle>
-            <a:lvl1pPr algn="ctr" defTabSz="914400" rtl="0" eaLnBrk="1" latinLnBrk="0" hangingPunct="1">
-              <a:spcBef>
-                <a:spcPct val="0"/>
-              </a:spcBef>
-              <a:buNone/>
-              <a:defRPr sz="4400" kern="1200">
-                <a:solidFill>
-                  <a:schemeClr val="tx1"/>
-                </a:solidFill>
-                <a:latin typeface="+mj-lt"/>
-                <a:ea typeface="+mj-ea"/>
-                <a:cs typeface="+mj-cs"/>
-              </a:defRPr>
-            </a:lvl1pPr>
-          </a:lstStyle>
-          <a:p>
-            <a:pPr algn="l"/>
-            <a:r>
-              <a:rPr lang="en-CA" sz="3200" dirty="0">
-                <a:solidFill>
-                  <a:schemeClr val="bg1"/>
-                </a:solidFill>
-                <a:latin typeface="Calibri Light" panose="020F0302020204030204" pitchFamily="34" charset="0"/>
-                <a:cs typeface="Calibri Light" panose="020F0302020204030204" pitchFamily="34" charset="0"/>
-              </a:rPr>
-              <a:t>Purpose and Scope</a:t>
-            </a:r>
-          </a:p>
-        </p:txBody>
-      </p:sp>
-      <p:sp>
-        <p:nvSpPr>
-          <p:cNvPr id="2" name="TextBox 1"/>
-          <p:cNvSpPr txBox="1"/>
-          <p:nvPr/>
-        </p:nvSpPr>
-        <p:spPr>
-          <a:xfrm>
-            <a:off x="457200" y="1301842"/>
-            <a:ext cx="1524000" cy="1938992"/>
-          </a:xfrm>
-          <a:prstGeom prst="rect">
-            <a:avLst/>
-          </a:prstGeom>
-          <a:noFill/>
-        </p:spPr>
-        <p:txBody>
-          <a:bodyPr wrap="square" rtlCol="0">
-            <a:spAutoFit/>
-          </a:bodyPr>
-          <a:lstStyle/>
-          <a:p>
             <a:pPr algn="r"/>
             <a:r>
-              <a:rPr lang="en-US" dirty="0">
-                <a:solidFill>
-                  <a:srgbClr val="28C22F"/>
-                </a:solidFill>
-              </a:rPr>
-              <a:t>Purpose</a:t>
-            </a:r>
-          </a:p>
-          <a:p>
-            <a:pPr algn="r"/>
-            <a:endParaRPr lang="en-US" dirty="0">
-              <a:solidFill>
-                <a:srgbClr val="28C22F"/>
-              </a:solidFill>
-            </a:endParaRPr>
-          </a:p>
-          <a:p>
-            <a:pPr algn="r"/>
-            <a:endParaRPr lang="en-US" dirty="0">
-              <a:solidFill>
-                <a:srgbClr val="28C22F"/>
-              </a:solidFill>
-            </a:endParaRPr>
-          </a:p>
-          <a:p>
-            <a:pPr algn="r"/>
-            <a:r>
-              <a:rPr lang="en-US" dirty="0">
-                <a:solidFill>
-                  <a:srgbClr val="28C22F"/>
-                </a:solidFill>
-              </a:rPr>
-              <a:t/>
-            </a:r>
-            <a:br>
-              <a:rPr lang="en-US" dirty="0">
-                <a:solidFill>
-                  <a:srgbClr val="28C22F"/>
-                </a:solidFill>
-              </a:rPr>
-            </a:br>
-            <a:endParaRPr lang="en-US" dirty="0">
-              <a:solidFill>
-                <a:srgbClr val="28C22F"/>
-              </a:solidFill>
-            </a:endParaRPr>
-          </a:p>
-          <a:p>
-            <a:pPr algn="r"/>
-            <a:endParaRPr lang="en-US" sz="1200" dirty="0">
-              <a:solidFill>
-                <a:srgbClr val="28C22F"/>
-              </a:solidFill>
-            </a:endParaRPr>
-          </a:p>
-          <a:p>
-            <a:pPr algn="r"/>
-            <a:r>
-              <a:rPr lang="en-US" dirty="0">
+              <a:rPr lang="en-US" dirty="0" smtClean="0">
                 <a:solidFill>
                   <a:srgbClr val="28C22F"/>
                 </a:solidFill>
@@ -6884,201 +7180,6 @@
           </a:p>
         </p:txBody>
       </p:sp>
-      <p:sp>
-        <p:nvSpPr>
-          <p:cNvPr id="5" name="TextBox 4"/>
-          <p:cNvSpPr txBox="1"/>
-          <p:nvPr/>
-        </p:nvSpPr>
-        <p:spPr>
-          <a:xfrm>
-            <a:off x="2232550" y="1214540"/>
-            <a:ext cx="6606650" cy="2954655"/>
-          </a:xfrm>
-          <a:prstGeom prst="rect">
-            <a:avLst/>
-          </a:prstGeom>
-          <a:noFill/>
-        </p:spPr>
-        <p:txBody>
-          <a:bodyPr wrap="square" rtlCol="0">
-            <a:spAutoFit/>
-          </a:bodyPr>
-          <a:lstStyle/>
-          <a:p>
-            <a:pPr marL="285750" indent="-285750">
-              <a:lnSpc>
-                <a:spcPct val="150000"/>
-              </a:lnSpc>
-              <a:buClr>
-                <a:schemeClr val="bg1"/>
-              </a:buClr>
-              <a:buSzPct val="80000"/>
-              <a:buFont typeface="Calibri" panose="020F0502020204030204" pitchFamily="34" charset="0"/>
-              <a:buChar char="&gt;"/>
-            </a:pPr>
-            <a:r>
-              <a:rPr lang="en-US" dirty="0">
-                <a:solidFill>
-                  <a:schemeClr val="bg1"/>
-                </a:solidFill>
-              </a:rPr>
-              <a:t>Develop an enhanced version of the original Rogue (1980)</a:t>
-            </a:r>
-          </a:p>
-          <a:p>
-            <a:pPr marL="742950" lvl="1" indent="-285750">
-              <a:lnSpc>
-                <a:spcPct val="150000"/>
-              </a:lnSpc>
-              <a:buClr>
-                <a:schemeClr val="bg1"/>
-              </a:buClr>
-              <a:buSzPct val="80000"/>
-              <a:buFont typeface="Calibri" panose="020F0502020204030204" pitchFamily="34" charset="0"/>
-              <a:buChar char="&gt;"/>
-            </a:pPr>
-            <a:r>
-              <a:rPr lang="en-US" dirty="0">
-                <a:solidFill>
-                  <a:srgbClr val="00B0F0"/>
-                </a:solidFill>
-              </a:rPr>
-              <a:t>Client:</a:t>
-            </a:r>
-            <a:r>
-              <a:rPr lang="en-US" dirty="0">
-                <a:solidFill>
-                  <a:schemeClr val="bg1"/>
-                </a:solidFill>
-              </a:rPr>
-              <a:t> UI, Gameplay, and Performance</a:t>
-            </a:r>
-          </a:p>
-          <a:p>
-            <a:pPr marL="742950" lvl="1" indent="-285750">
-              <a:lnSpc>
-                <a:spcPct val="150000"/>
-              </a:lnSpc>
-              <a:buClr>
-                <a:schemeClr val="bg1"/>
-              </a:buClr>
-              <a:buSzPct val="80000"/>
-              <a:buFont typeface="Calibri" panose="020F0502020204030204" pitchFamily="34" charset="0"/>
-              <a:buChar char="&gt;"/>
-            </a:pPr>
-            <a:r>
-              <a:rPr lang="en-US" dirty="0">
-                <a:solidFill>
-                  <a:srgbClr val="00B0F0"/>
-                </a:solidFill>
-              </a:rPr>
-              <a:t>Development: </a:t>
-            </a:r>
-            <a:r>
-              <a:rPr lang="en-US" dirty="0">
-                <a:solidFill>
-                  <a:schemeClr val="bg1"/>
-                </a:solidFill>
-              </a:rPr>
-              <a:t>Design, Documentation, and Testing</a:t>
-            </a:r>
-          </a:p>
-          <a:p>
-            <a:pPr lvl="1">
-              <a:lnSpc>
-                <a:spcPct val="150000"/>
-              </a:lnSpc>
-              <a:buClr>
-                <a:schemeClr val="bg1"/>
-              </a:buClr>
-              <a:buSzPct val="80000"/>
-            </a:pPr>
-            <a:endParaRPr lang="en-US" sz="1600" dirty="0">
-              <a:solidFill>
-                <a:schemeClr val="bg1"/>
-              </a:solidFill>
-            </a:endParaRPr>
-          </a:p>
-          <a:p>
-            <a:pPr marL="285750" indent="-285750">
-              <a:lnSpc>
-                <a:spcPct val="150000"/>
-              </a:lnSpc>
-              <a:buClr>
-                <a:schemeClr val="bg1"/>
-              </a:buClr>
-              <a:buSzPct val="80000"/>
-              <a:buFont typeface="Calibri" panose="020F0502020204030204" pitchFamily="34" charset="0"/>
-              <a:buChar char="&gt;"/>
-            </a:pPr>
-            <a:r>
-              <a:rPr lang="en-US" dirty="0">
-                <a:solidFill>
-                  <a:schemeClr val="bg1"/>
-                </a:solidFill>
-              </a:rPr>
-              <a:t>Implement virtually all functionality present in the original version</a:t>
-            </a:r>
-          </a:p>
-          <a:p>
-            <a:pPr marL="285750" indent="-285750">
-              <a:lnSpc>
-                <a:spcPct val="150000"/>
-              </a:lnSpc>
-              <a:buClr>
-                <a:schemeClr val="bg1"/>
-              </a:buClr>
-              <a:buSzPct val="80000"/>
-              <a:buFont typeface="Calibri" panose="020F0502020204030204" pitchFamily="34" charset="0"/>
-              <a:buChar char="&gt;"/>
-            </a:pPr>
-            <a:r>
-              <a:rPr lang="en-US" dirty="0">
-                <a:solidFill>
-                  <a:schemeClr val="bg1"/>
-                </a:solidFill>
-              </a:rPr>
-              <a:t>Faithful improvements over non-functional qualities such as learnability and aesthetics</a:t>
-            </a:r>
-          </a:p>
-        </p:txBody>
-      </p:sp>
-      <p:cxnSp>
-        <p:nvCxnSpPr>
-          <p:cNvPr id="7" name="Straight Connector 6"/>
-          <p:cNvCxnSpPr/>
-          <p:nvPr/>
-        </p:nvCxnSpPr>
-        <p:spPr>
-          <a:xfrm>
-            <a:off x="609600" y="1047750"/>
-            <a:ext cx="3276600" cy="0"/>
-          </a:xfrm>
-          <a:prstGeom prst="line">
-            <a:avLst/>
-          </a:prstGeom>
-          <a:ln>
-            <a:solidFill>
-              <a:srgbClr val="28C22F"/>
-            </a:solidFill>
-          </a:ln>
-        </p:spPr>
-        <p:style>
-          <a:lnRef idx="1">
-            <a:schemeClr val="accent1"/>
-          </a:lnRef>
-          <a:fillRef idx="0">
-            <a:schemeClr val="accent1"/>
-          </a:fillRef>
-          <a:effectRef idx="0">
-            <a:schemeClr val="accent1"/>
-          </a:effectRef>
-          <a:fontRef idx="minor">
-            <a:schemeClr val="tx1"/>
-          </a:fontRef>
-        </p:style>
-      </p:cxnSp>
     </p:spTree>
     <p:extLst>
       <p:ext uri="{BB962C8B-B14F-4D97-AF65-F5344CB8AC3E}">
@@ -11195,6 +11296,13 @@
   <p:clrMapOvr>
     <a:masterClrMapping/>
   </p:clrMapOvr>
+  <p:timing>
+    <p:tnLst>
+      <p:par>
+        <p:cTn id="1" dur="indefinite" restart="never" nodeType="tmRoot"/>
+      </p:par>
+    </p:tnLst>
+  </p:timing>
 </p:sld>
 </file>
 
@@ -11797,6 +11905,13 @@
   <p:clrMapOvr>
     <a:masterClrMapping/>
   </p:clrMapOvr>
+  <p:timing>
+    <p:tnLst>
+      <p:par>
+        <p:cTn id="1" dur="indefinite" restart="never" nodeType="tmRoot"/>
+      </p:par>
+    </p:tnLst>
+  </p:timing>
 </p:sld>
 </file>
 

</xml_diff>

<commit_message>
rearrange slides, update commit #, add g++ line
</commit_message>
<xml_diff>
--- a/Doc/FinalPresentation/RR.pptx
+++ b/Doc/FinalPresentation/RR.pptx
@@ -9,8 +9,8 @@
   </p:notesMasterIdLst>
   <p:sldIdLst>
     <p:sldId id="256" r:id="rId2"/>
-    <p:sldId id="264" r:id="rId3"/>
-    <p:sldId id="263" r:id="rId4"/>
+    <p:sldId id="263" r:id="rId3"/>
+    <p:sldId id="264" r:id="rId4"/>
     <p:sldId id="260" r:id="rId5"/>
     <p:sldId id="265" r:id="rId6"/>
     <p:sldId id="266" r:id="rId7"/>
@@ -136,7 +136,7 @@
 </file>
 
 <file path=ppt/charts/chart1.xml><?xml version="1.0" encoding="utf-8"?>
-<c:chartSpace xmlns:c="http://schemas.openxmlformats.org/drawingml/2006/chart" xmlns:a="http://schemas.openxmlformats.org/drawingml/2006/main" xmlns:r="http://schemas.openxmlformats.org/officeDocument/2006/relationships">
+<c:chartSpace xmlns:c="http://schemas.openxmlformats.org/drawingml/2006/chart" xmlns:a="http://schemas.openxmlformats.org/drawingml/2006/main" xmlns:r="http://schemas.openxmlformats.org/officeDocument/2006/relationships" xmlns:c16r2="http://schemas.microsoft.com/office/drawing/2015/06/chart">
   <c:date1904 val="0"/>
   <c:lang val="en-US"/>
   <c:roundedCorners val="0"/>
@@ -202,7 +202,7 @@
                 </a:contourClr>
               </a:sp3d>
             </c:spPr>
-            <c:extLst xmlns:c16r2="http://schemas.microsoft.com/office/drawing/2015/06/chart">
+            <c:extLst>
               <c:ext xmlns:c16="http://schemas.microsoft.com/office/drawing/2014/chart" uri="{C3380CC4-5D6E-409C-BE32-E72D297353CC}">
                 <c16:uniqueId val="{00000001-E058-451E-85BB-54216B702602}"/>
               </c:ext>
@@ -229,7 +229,7 @@
                 </a:contourClr>
               </a:sp3d>
             </c:spPr>
-            <c:extLst xmlns:c16r2="http://schemas.microsoft.com/office/drawing/2015/06/chart">
+            <c:extLst>
               <c:ext xmlns:c16="http://schemas.microsoft.com/office/drawing/2014/chart" uri="{C3380CC4-5D6E-409C-BE32-E72D297353CC}">
                 <c16:uniqueId val="{00000003-E058-451E-85BB-54216B702602}"/>
               </c:ext>
@@ -256,7 +256,7 @@
                 </a:contourClr>
               </a:sp3d>
             </c:spPr>
-            <c:extLst xmlns:c16r2="http://schemas.microsoft.com/office/drawing/2015/06/chart">
+            <c:extLst>
               <c:ext xmlns:c16="http://schemas.microsoft.com/office/drawing/2014/chart" uri="{C3380CC4-5D6E-409C-BE32-E72D297353CC}">
                 <c16:uniqueId val="{00000005-E058-451E-85BB-54216B702602}"/>
               </c:ext>
@@ -285,7 +285,7 @@
                 </a:contourClr>
               </a:sp3d>
             </c:spPr>
-            <c:extLst xmlns:c16r2="http://schemas.microsoft.com/office/drawing/2015/06/chart">
+            <c:extLst>
               <c:ext xmlns:c16="http://schemas.microsoft.com/office/drawing/2014/chart" uri="{C3380CC4-5D6E-409C-BE32-E72D297353CC}">
                 <c16:uniqueId val="{00000007-E058-451E-85BB-54216B702602}"/>
               </c:ext>
@@ -314,7 +314,7 @@
                 </a:contourClr>
               </a:sp3d>
             </c:spPr>
-            <c:extLst xmlns:c16r2="http://schemas.microsoft.com/office/drawing/2015/06/chart">
+            <c:extLst>
               <c:ext xmlns:c16="http://schemas.microsoft.com/office/drawing/2014/chart" uri="{C3380CC4-5D6E-409C-BE32-E72D297353CC}">
                 <c16:uniqueId val="{00000009-E058-451E-85BB-54216B702602}"/>
               </c:ext>
@@ -343,7 +343,7 @@
                 </a:contourClr>
               </a:sp3d>
             </c:spPr>
-            <c:extLst xmlns:c16r2="http://schemas.microsoft.com/office/drawing/2015/06/chart">
+            <c:extLst>
               <c:ext xmlns:c16="http://schemas.microsoft.com/office/drawing/2014/chart" uri="{C3380CC4-5D6E-409C-BE32-E72D297353CC}">
                 <c16:uniqueId val="{0000000B-E058-451E-85BB-54216B702602}"/>
               </c:ext>
@@ -383,14 +383,13 @@
               <c:showSerName val="0"/>
               <c:showPercent val="1"/>
               <c:showBubbleSize val="0"/>
-              <c:extLst xmlns:c16r2="http://schemas.microsoft.com/office/drawing/2015/06/chart">
+              <c:extLst>
+                <c:ext xmlns:c15="http://schemas.microsoft.com/office/drawing/2012/chart" uri="{CE6537A1-D6FC-4f65-9D91-7224C49458BB}">
+                  <c15:dlblFieldTable/>
+                  <c15:showDataLabelsRange val="0"/>
+                </c:ext>
                 <c:ext xmlns:c16="http://schemas.microsoft.com/office/drawing/2014/chart" uri="{C3380CC4-5D6E-409C-BE32-E72D297353CC}">
                   <c16:uniqueId val="{00000001-E058-451E-85BB-54216B702602}"/>
-                </c:ext>
-                <c:ext xmlns:c15="http://schemas.microsoft.com/office/drawing/2012/chart" uri="{CE6537A1-D6FC-4f65-9D91-7224C49458BB}">
-                  <c15:layout/>
-                  <c15:dlblFieldTable/>
-                  <c15:showDataLabelsRange val="0"/>
                 </c:ext>
               </c:extLst>
             </c:dLbl>
@@ -427,14 +426,13 @@
               <c:showSerName val="0"/>
               <c:showPercent val="1"/>
               <c:showBubbleSize val="0"/>
-              <c:extLst xmlns:c16r2="http://schemas.microsoft.com/office/drawing/2015/06/chart">
+              <c:extLst>
+                <c:ext xmlns:c15="http://schemas.microsoft.com/office/drawing/2012/chart" uri="{CE6537A1-D6FC-4f65-9D91-7224C49458BB}">
+                  <c15:dlblFieldTable/>
+                  <c15:showDataLabelsRange val="0"/>
+                </c:ext>
                 <c:ext xmlns:c16="http://schemas.microsoft.com/office/drawing/2014/chart" uri="{C3380CC4-5D6E-409C-BE32-E72D297353CC}">
                   <c16:uniqueId val="{00000003-E058-451E-85BB-54216B702602}"/>
-                </c:ext>
-                <c:ext xmlns:c15="http://schemas.microsoft.com/office/drawing/2012/chart" uri="{CE6537A1-D6FC-4f65-9D91-7224C49458BB}">
-                  <c15:layout/>
-                  <c15:dlblFieldTable/>
-                  <c15:showDataLabelsRange val="0"/>
                 </c:ext>
               </c:extLst>
             </c:dLbl>
@@ -471,45 +469,44 @@
               <c:showSerName val="0"/>
               <c:showPercent val="1"/>
               <c:showBubbleSize val="0"/>
-              <c:extLst xmlns:c16r2="http://schemas.microsoft.com/office/drawing/2015/06/chart">
+              <c:extLst>
+                <c:ext xmlns:c15="http://schemas.microsoft.com/office/drawing/2012/chart" uri="{CE6537A1-D6FC-4f65-9D91-7224C49458BB}">
+                  <c15:dlblFieldTable/>
+                  <c15:showDataLabelsRange val="0"/>
+                </c:ext>
                 <c:ext xmlns:c16="http://schemas.microsoft.com/office/drawing/2014/chart" uri="{C3380CC4-5D6E-409C-BE32-E72D297353CC}">
                   <c16:uniqueId val="{00000005-E058-451E-85BB-54216B702602}"/>
-                </c:ext>
-                <c:ext xmlns:c15="http://schemas.microsoft.com/office/drawing/2012/chart" uri="{CE6537A1-D6FC-4f65-9D91-7224C49458BB}">
-                  <c15:layout/>
-                  <c15:dlblFieldTable/>
-                  <c15:showDataLabelsRange val="0"/>
                 </c:ext>
               </c:extLst>
             </c:dLbl>
             <c:dLbl>
               <c:idx val="3"/>
               <c:delete val="1"/>
-              <c:extLst xmlns:c16r2="http://schemas.microsoft.com/office/drawing/2015/06/chart">
+              <c:extLst>
+                <c:ext xmlns:c15="http://schemas.microsoft.com/office/drawing/2012/chart" uri="{CE6537A1-D6FC-4f65-9D91-7224C49458BB}"/>
                 <c:ext xmlns:c16="http://schemas.microsoft.com/office/drawing/2014/chart" uri="{C3380CC4-5D6E-409C-BE32-E72D297353CC}">
                   <c16:uniqueId val="{00000007-E058-451E-85BB-54216B702602}"/>
                 </c:ext>
-                <c:ext xmlns:c15="http://schemas.microsoft.com/office/drawing/2012/chart" uri="{CE6537A1-D6FC-4f65-9D91-7224C49458BB}"/>
               </c:extLst>
             </c:dLbl>
             <c:dLbl>
               <c:idx val="4"/>
               <c:delete val="1"/>
-              <c:extLst xmlns:c16r2="http://schemas.microsoft.com/office/drawing/2015/06/chart">
+              <c:extLst>
+                <c:ext xmlns:c15="http://schemas.microsoft.com/office/drawing/2012/chart" uri="{CE6537A1-D6FC-4f65-9D91-7224C49458BB}"/>
                 <c:ext xmlns:c16="http://schemas.microsoft.com/office/drawing/2014/chart" uri="{C3380CC4-5D6E-409C-BE32-E72D297353CC}">
                   <c16:uniqueId val="{00000009-E058-451E-85BB-54216B702602}"/>
                 </c:ext>
-                <c:ext xmlns:c15="http://schemas.microsoft.com/office/drawing/2012/chart" uri="{CE6537A1-D6FC-4f65-9D91-7224C49458BB}"/>
               </c:extLst>
             </c:dLbl>
             <c:dLbl>
               <c:idx val="5"/>
               <c:delete val="1"/>
-              <c:extLst xmlns:c16r2="http://schemas.microsoft.com/office/drawing/2015/06/chart">
+              <c:extLst>
+                <c:ext xmlns:c15="http://schemas.microsoft.com/office/drawing/2012/chart" uri="{CE6537A1-D6FC-4f65-9D91-7224C49458BB}"/>
                 <c:ext xmlns:c16="http://schemas.microsoft.com/office/drawing/2014/chart" uri="{C3380CC4-5D6E-409C-BE32-E72D297353CC}">
                   <c16:uniqueId val="{0000000B-E058-451E-85BB-54216B702602}"/>
                 </c:ext>
-                <c:ext xmlns:c15="http://schemas.microsoft.com/office/drawing/2012/chart" uri="{CE6537A1-D6FC-4f65-9D91-7224C49458BB}"/>
               </c:extLst>
             </c:dLbl>
             <c:spPr>
@@ -560,7 +557,7 @@
                 <a:effectLst/>
               </c:spPr>
             </c:leaderLines>
-            <c:extLst xmlns:c16r2="http://schemas.microsoft.com/office/drawing/2015/06/chart">
+            <c:extLst>
               <c:ext xmlns:c15="http://schemas.microsoft.com/office/drawing/2012/chart" uri="{CE6537A1-D6FC-4f65-9D91-7224C49458BB}"/>
             </c:extLst>
           </c:dLbls>
@@ -617,7 +614,7 @@
               </c:numCache>
             </c:numRef>
           </c:val>
-          <c:extLst xmlns:c16r2="http://schemas.microsoft.com/office/drawing/2015/06/chart">
+          <c:extLst>
             <c:ext xmlns:c16="http://schemas.microsoft.com/office/drawing/2014/chart" uri="{C3380CC4-5D6E-409C-BE32-E72D297353CC}">
               <c16:uniqueId val="{0000000C-E058-451E-85BB-54216B702602}"/>
             </c:ext>
@@ -645,7 +642,6 @@
     </c:plotArea>
     <c:legend>
       <c:legendPos val="r"/>
-      <c:layout/>
       <c:overlay val="1"/>
       <c:spPr>
         <a:noFill/>
@@ -1335,7 +1331,7 @@
           <a:p>
             <a:fld id="{E87E700C-F5C1-45DA-8BB8-34A79AF25122}" type="datetimeFigureOut">
               <a:rPr lang="en-CA" smtClean="0"/>
-              <a:t>2016-11-27</a:t>
+              <a:t>2016-11-28</a:t>
             </a:fld>
             <a:endParaRPr lang="en-CA"/>
           </a:p>
@@ -1952,7 +1948,7 @@
           <a:p>
             <a:fld id="{DC61108D-6E81-4C43-975C-CB4582A4A1D2}" type="datetimeFigureOut">
               <a:rPr lang="en-CA" smtClean="0"/>
-              <a:t>2016-11-27</a:t>
+              <a:t>2016-11-28</a:t>
             </a:fld>
             <a:endParaRPr lang="en-CA"/>
           </a:p>
@@ -2122,7 +2118,7 @@
           <a:p>
             <a:fld id="{DC61108D-6E81-4C43-975C-CB4582A4A1D2}" type="datetimeFigureOut">
               <a:rPr lang="en-CA" smtClean="0"/>
-              <a:t>2016-11-27</a:t>
+              <a:t>2016-11-28</a:t>
             </a:fld>
             <a:endParaRPr lang="en-CA"/>
           </a:p>
@@ -2302,7 +2298,7 @@
           <a:p>
             <a:fld id="{DC61108D-6E81-4C43-975C-CB4582A4A1D2}" type="datetimeFigureOut">
               <a:rPr lang="en-CA" smtClean="0"/>
-              <a:t>2016-11-27</a:t>
+              <a:t>2016-11-28</a:t>
             </a:fld>
             <a:endParaRPr lang="en-CA"/>
           </a:p>
@@ -2472,7 +2468,7 @@
           <a:p>
             <a:fld id="{DC61108D-6E81-4C43-975C-CB4582A4A1D2}" type="datetimeFigureOut">
               <a:rPr lang="en-CA" smtClean="0"/>
-              <a:t>2016-11-27</a:t>
+              <a:t>2016-11-28</a:t>
             </a:fld>
             <a:endParaRPr lang="en-CA"/>
           </a:p>
@@ -2718,7 +2714,7 @@
           <a:p>
             <a:fld id="{DC61108D-6E81-4C43-975C-CB4582A4A1D2}" type="datetimeFigureOut">
               <a:rPr lang="en-CA" smtClean="0"/>
-              <a:t>2016-11-27</a:t>
+              <a:t>2016-11-28</a:t>
             </a:fld>
             <a:endParaRPr lang="en-CA"/>
           </a:p>
@@ -3006,7 +3002,7 @@
           <a:p>
             <a:fld id="{DC61108D-6E81-4C43-975C-CB4582A4A1D2}" type="datetimeFigureOut">
               <a:rPr lang="en-CA" smtClean="0"/>
-              <a:t>2016-11-27</a:t>
+              <a:t>2016-11-28</a:t>
             </a:fld>
             <a:endParaRPr lang="en-CA"/>
           </a:p>
@@ -3428,7 +3424,7 @@
           <a:p>
             <a:fld id="{DC61108D-6E81-4C43-975C-CB4582A4A1D2}" type="datetimeFigureOut">
               <a:rPr lang="en-CA" smtClean="0"/>
-              <a:t>2016-11-27</a:t>
+              <a:t>2016-11-28</a:t>
             </a:fld>
             <a:endParaRPr lang="en-CA"/>
           </a:p>
@@ -3546,7 +3542,7 @@
           <a:p>
             <a:fld id="{DC61108D-6E81-4C43-975C-CB4582A4A1D2}" type="datetimeFigureOut">
               <a:rPr lang="en-CA" smtClean="0"/>
-              <a:t>2016-11-27</a:t>
+              <a:t>2016-11-28</a:t>
             </a:fld>
             <a:endParaRPr lang="en-CA"/>
           </a:p>
@@ -3641,7 +3637,7 @@
           <a:p>
             <a:fld id="{DC61108D-6E81-4C43-975C-CB4582A4A1D2}" type="datetimeFigureOut">
               <a:rPr lang="en-CA" smtClean="0"/>
-              <a:t>2016-11-27</a:t>
+              <a:t>2016-11-28</a:t>
             </a:fld>
             <a:endParaRPr lang="en-CA"/>
           </a:p>
@@ -3918,7 +3914,7 @@
           <a:p>
             <a:fld id="{DC61108D-6E81-4C43-975C-CB4582A4A1D2}" type="datetimeFigureOut">
               <a:rPr lang="en-CA" smtClean="0"/>
-              <a:t>2016-11-27</a:t>
+              <a:t>2016-11-28</a:t>
             </a:fld>
             <a:endParaRPr lang="en-CA"/>
           </a:p>
@@ -4171,7 +4167,7 @@
           <a:p>
             <a:fld id="{DC61108D-6E81-4C43-975C-CB4582A4A1D2}" type="datetimeFigureOut">
               <a:rPr lang="en-CA" smtClean="0"/>
-              <a:t>2016-11-27</a:t>
+              <a:t>2016-11-28</a:t>
             </a:fld>
             <a:endParaRPr lang="en-CA"/>
           </a:p>
@@ -4384,7 +4380,7 @@
           <a:p>
             <a:fld id="{DC61108D-6E81-4C43-975C-CB4582A4A1D2}" type="datetimeFigureOut">
               <a:rPr lang="en-CA" smtClean="0"/>
-              <a:t>2016-11-27</a:t>
+              <a:t>2016-11-28</a:t>
             </a:fld>
             <a:endParaRPr lang="en-CA"/>
           </a:p>
@@ -5606,13 +5602,6 @@
   <p:clrMapOvr>
     <a:masterClrMapping/>
   </p:clrMapOvr>
-  <p:timing>
-    <p:tnLst>
-      <p:par>
-        <p:cTn id="1" dur="indefinite" restart="never" nodeType="tmRoot"/>
-      </p:par>
-    </p:tnLst>
-  </p:timing>
 </p:sld>
 </file>
 
@@ -6043,17 +6032,634 @@
   <p:clrMapOvr>
     <a:masterClrMapping/>
   </p:clrMapOvr>
-  <p:timing>
-    <p:tnLst>
-      <p:par>
-        <p:cTn id="1" dur="indefinite" restart="never" nodeType="tmRoot"/>
-      </p:par>
-    </p:tnLst>
-  </p:timing>
 </p:sld>
 </file>
 
 <file path=ppt/slides/slide2.xml><?xml version="1.0" encoding="utf-8"?>
+<p:sld xmlns:a="http://schemas.openxmlformats.org/drawingml/2006/main" xmlns:r="http://schemas.openxmlformats.org/officeDocument/2006/relationships" xmlns:p="http://schemas.openxmlformats.org/presentationml/2006/main">
+  <p:cSld>
+    <p:spTree>
+      <p:nvGrpSpPr>
+        <p:cNvPr id="1" name=""/>
+        <p:cNvGrpSpPr/>
+        <p:nvPr/>
+      </p:nvGrpSpPr>
+      <p:grpSpPr>
+        <a:xfrm>
+          <a:off x="0" y="0"/>
+          <a:ext cx="0" cy="0"/>
+          <a:chOff x="0" y="0"/>
+          <a:chExt cx="0" cy="0"/>
+        </a:xfrm>
+      </p:grpSpPr>
+      <p:sp>
+        <p:nvSpPr>
+          <p:cNvPr id="14" name="Rectangle 13"/>
+          <p:cNvSpPr/>
+          <p:nvPr/>
+        </p:nvSpPr>
+        <p:spPr>
+          <a:xfrm>
+            <a:off x="0" y="0"/>
+            <a:ext cx="9144000" cy="5143500"/>
+          </a:xfrm>
+          <a:prstGeom prst="rect">
+            <a:avLst/>
+          </a:prstGeom>
+          <a:solidFill>
+            <a:srgbClr val="1F1F1F"/>
+          </a:solidFill>
+          <a:ln>
+            <a:solidFill>
+              <a:schemeClr val="tx1"/>
+            </a:solidFill>
+          </a:ln>
+        </p:spPr>
+        <p:style>
+          <a:lnRef idx="2">
+            <a:schemeClr val="accent1">
+              <a:shade val="50000"/>
+            </a:schemeClr>
+          </a:lnRef>
+          <a:fillRef idx="1">
+            <a:schemeClr val="accent1"/>
+          </a:fillRef>
+          <a:effectRef idx="0">
+            <a:schemeClr val="accent1"/>
+          </a:effectRef>
+          <a:fontRef idx="minor">
+            <a:schemeClr val="lt1"/>
+          </a:fontRef>
+        </p:style>
+        <p:txBody>
+          <a:bodyPr rtlCol="0" anchor="ctr"/>
+          <a:lstStyle/>
+          <a:p>
+            <a:pPr algn="ctr"/>
+            <a:endParaRPr lang="en-CA" dirty="0"/>
+          </a:p>
+        </p:txBody>
+      </p:sp>
+      <p:pic>
+        <p:nvPicPr>
+          <p:cNvPr id="18" name="Picture 16"/>
+          <p:cNvPicPr>
+            <a:picLocks noChangeAspect="1" noChangeArrowheads="1"/>
+          </p:cNvPicPr>
+          <p:nvPr/>
+        </p:nvPicPr>
+        <p:blipFill>
+          <a:blip r:embed="rId2" cstate="print">
+            <a:clrChange>
+              <a:clrFrom>
+                <a:srgbClr val="000000"/>
+              </a:clrFrom>
+              <a:clrTo>
+                <a:srgbClr val="000000">
+                  <a:alpha val="0"/>
+                </a:srgbClr>
+              </a:clrTo>
+            </a:clrChange>
+            <a:extLst>
+              <a:ext uri="{28A0092B-C50C-407E-A947-70E740481C1C}">
+                <a14:useLocalDpi xmlns:a14="http://schemas.microsoft.com/office/drawing/2010/main" val="0"/>
+              </a:ext>
+            </a:extLst>
+          </a:blip>
+          <a:srcRect/>
+          <a:stretch>
+            <a:fillRect/>
+          </a:stretch>
+        </p:blipFill>
+        <p:spPr bwMode="auto">
+          <a:xfrm>
+            <a:off x="8286750" y="252442"/>
+            <a:ext cx="685800" cy="685800"/>
+          </a:xfrm>
+          <a:prstGeom prst="rect">
+            <a:avLst/>
+          </a:prstGeom>
+          <a:noFill/>
+          <a:ln>
+            <a:noFill/>
+          </a:ln>
+          <a:extLst>
+            <a:ext uri="{909E8E84-426E-40DD-AFC4-6F175D3DCCD1}">
+              <a14:hiddenFill xmlns:a14="http://schemas.microsoft.com/office/drawing/2010/main">
+                <a:solidFill>
+                  <a:schemeClr val="accent1"/>
+                </a:solidFill>
+              </a14:hiddenFill>
+            </a:ext>
+            <a:ext uri="{91240B29-F687-4F45-9708-019B960494DF}">
+              <a14:hiddenLine xmlns:a14="http://schemas.microsoft.com/office/drawing/2010/main" w="9525">
+                <a:solidFill>
+                  <a:schemeClr val="tx1"/>
+                </a:solidFill>
+                <a:miter lim="800000"/>
+                <a:headEnd/>
+                <a:tailEnd/>
+              </a14:hiddenLine>
+            </a:ext>
+          </a:extLst>
+        </p:spPr>
+      </p:pic>
+      <p:sp>
+        <p:nvSpPr>
+          <p:cNvPr id="19" name="TextBox 18"/>
+          <p:cNvSpPr txBox="1"/>
+          <p:nvPr/>
+        </p:nvSpPr>
+        <p:spPr>
+          <a:xfrm>
+            <a:off x="28574" y="0"/>
+            <a:ext cx="9115425" cy="369332"/>
+          </a:xfrm>
+          <a:prstGeom prst="rect">
+            <a:avLst/>
+          </a:prstGeom>
+          <a:noFill/>
+        </p:spPr>
+        <p:txBody>
+          <a:bodyPr wrap="square" rtlCol="0">
+            <a:spAutoFit/>
+          </a:bodyPr>
+          <a:lstStyle/>
+          <a:p>
+            <a:r>
+              <a:rPr lang="en-US" dirty="0">
+                <a:solidFill>
+                  <a:schemeClr val="tx1">
+                    <a:lumMod val="75000"/>
+                    <a:lumOff val="25000"/>
+                  </a:schemeClr>
+                </a:solidFill>
+              </a:rPr>
+              <a:t>##############################################################################</a:t>
+            </a:r>
+            <a:endParaRPr lang="en-CA" dirty="0">
+              <a:solidFill>
+                <a:schemeClr val="tx1">
+                  <a:lumMod val="75000"/>
+                  <a:lumOff val="25000"/>
+                </a:schemeClr>
+              </a:solidFill>
+            </a:endParaRPr>
+          </a:p>
+        </p:txBody>
+      </p:sp>
+      <p:sp>
+        <p:nvSpPr>
+          <p:cNvPr id="20" name="Rectangle 19"/>
+          <p:cNvSpPr/>
+          <p:nvPr/>
+        </p:nvSpPr>
+        <p:spPr>
+          <a:xfrm>
+            <a:off x="28574" y="4724400"/>
+            <a:ext cx="9115426" cy="369332"/>
+          </a:xfrm>
+          <a:prstGeom prst="rect">
+            <a:avLst/>
+          </a:prstGeom>
+        </p:spPr>
+        <p:txBody>
+          <a:bodyPr wrap="square">
+            <a:spAutoFit/>
+          </a:bodyPr>
+          <a:lstStyle/>
+          <a:p>
+            <a:r>
+              <a:rPr lang="en-US" dirty="0">
+                <a:solidFill>
+                  <a:schemeClr val="accent3">
+                    <a:lumMod val="50000"/>
+                  </a:schemeClr>
+                </a:solidFill>
+              </a:rPr>
+              <a:t>########</a:t>
+            </a:r>
+            <a:r>
+              <a:rPr lang="en-US" dirty="0">
+                <a:solidFill>
+                  <a:schemeClr val="tx1">
+                    <a:lumMod val="75000"/>
+                    <a:lumOff val="25000"/>
+                  </a:schemeClr>
+                </a:solidFill>
+              </a:rPr>
+              <a:t>######################################################################</a:t>
+            </a:r>
+            <a:endParaRPr lang="en-CA" dirty="0"/>
+          </a:p>
+        </p:txBody>
+      </p:sp>
+      <p:sp>
+        <p:nvSpPr>
+          <p:cNvPr id="21" name="Rectangle 20"/>
+          <p:cNvSpPr/>
+          <p:nvPr/>
+        </p:nvSpPr>
+        <p:spPr>
+          <a:xfrm>
+            <a:off x="38100" y="285750"/>
+            <a:ext cx="266700" cy="4524315"/>
+          </a:xfrm>
+          <a:prstGeom prst="rect">
+            <a:avLst/>
+          </a:prstGeom>
+        </p:spPr>
+        <p:txBody>
+          <a:bodyPr wrap="square">
+            <a:spAutoFit/>
+          </a:bodyPr>
+          <a:lstStyle/>
+          <a:p>
+            <a:r>
+              <a:rPr lang="en-US" dirty="0">
+                <a:solidFill>
+                  <a:schemeClr val="tx1">
+                    <a:lumMod val="75000"/>
+                    <a:lumOff val="25000"/>
+                  </a:schemeClr>
+                </a:solidFill>
+              </a:rPr>
+              <a:t>################</a:t>
+            </a:r>
+            <a:endParaRPr lang="en-CA" dirty="0"/>
+          </a:p>
+        </p:txBody>
+      </p:sp>
+      <p:sp>
+        <p:nvSpPr>
+          <p:cNvPr id="22" name="Rectangle 21"/>
+          <p:cNvSpPr/>
+          <p:nvPr/>
+        </p:nvSpPr>
+        <p:spPr>
+          <a:xfrm>
+            <a:off x="8839200" y="309592"/>
+            <a:ext cx="266700" cy="4524315"/>
+          </a:xfrm>
+          <a:prstGeom prst="rect">
+            <a:avLst/>
+          </a:prstGeom>
+        </p:spPr>
+        <p:txBody>
+          <a:bodyPr wrap="square">
+            <a:spAutoFit/>
+          </a:bodyPr>
+          <a:lstStyle/>
+          <a:p>
+            <a:r>
+              <a:rPr lang="en-US" dirty="0">
+                <a:solidFill>
+                  <a:schemeClr val="tx1">
+                    <a:lumMod val="75000"/>
+                    <a:lumOff val="25000"/>
+                  </a:schemeClr>
+                </a:solidFill>
+              </a:rPr>
+              <a:t>################</a:t>
+            </a:r>
+            <a:endParaRPr lang="en-CA" dirty="0"/>
+          </a:p>
+        </p:txBody>
+      </p:sp>
+      <p:sp>
+        <p:nvSpPr>
+          <p:cNvPr id="24" name="Title 1"/>
+          <p:cNvSpPr txBox="1">
+            <a:spLocks/>
+          </p:cNvSpPr>
+          <p:nvPr/>
+        </p:nvSpPr>
+        <p:spPr>
+          <a:xfrm>
+            <a:off x="513117" y="346657"/>
+            <a:ext cx="3886200" cy="890558"/>
+          </a:xfrm>
+          <a:prstGeom prst="rect">
+            <a:avLst/>
+          </a:prstGeom>
+        </p:spPr>
+        <p:txBody>
+          <a:bodyPr anchor="ctr" anchorCtr="0">
+            <a:normAutofit/>
+          </a:bodyPr>
+          <a:lstStyle>
+            <a:lvl1pPr algn="ctr" defTabSz="914400" rtl="0" eaLnBrk="1" latinLnBrk="0" hangingPunct="1">
+              <a:spcBef>
+                <a:spcPct val="0"/>
+              </a:spcBef>
+              <a:buNone/>
+              <a:defRPr sz="4400" kern="1200">
+                <a:solidFill>
+                  <a:schemeClr val="tx1"/>
+                </a:solidFill>
+                <a:latin typeface="+mj-lt"/>
+                <a:ea typeface="+mj-ea"/>
+                <a:cs typeface="+mj-cs"/>
+              </a:defRPr>
+            </a:lvl1pPr>
+          </a:lstStyle>
+          <a:p>
+            <a:pPr algn="l"/>
+            <a:r>
+              <a:rPr lang="en-CA" sz="3200" dirty="0">
+                <a:solidFill>
+                  <a:schemeClr val="bg1"/>
+                </a:solidFill>
+                <a:latin typeface="Calibri Light" panose="020F0302020204030204" pitchFamily="34" charset="0"/>
+                <a:cs typeface="Calibri Light" panose="020F0302020204030204" pitchFamily="34" charset="0"/>
+              </a:rPr>
+              <a:t>Purpose and Scope</a:t>
+            </a:r>
+          </a:p>
+        </p:txBody>
+      </p:sp>
+      <p:sp>
+        <p:nvSpPr>
+          <p:cNvPr id="2" name="TextBox 1"/>
+          <p:cNvSpPr txBox="1"/>
+          <p:nvPr/>
+        </p:nvSpPr>
+        <p:spPr>
+          <a:xfrm>
+            <a:off x="457200" y="1301842"/>
+            <a:ext cx="1524000" cy="369332"/>
+          </a:xfrm>
+          <a:prstGeom prst="rect">
+            <a:avLst/>
+          </a:prstGeom>
+          <a:noFill/>
+        </p:spPr>
+        <p:txBody>
+          <a:bodyPr wrap="square" rtlCol="0">
+            <a:spAutoFit/>
+          </a:bodyPr>
+          <a:lstStyle/>
+          <a:p>
+            <a:pPr algn="r"/>
+            <a:r>
+              <a:rPr lang="en-US" dirty="0">
+                <a:solidFill>
+                  <a:srgbClr val="28C22F"/>
+                </a:solidFill>
+              </a:rPr>
+              <a:t>Purpose</a:t>
+            </a:r>
+          </a:p>
+        </p:txBody>
+      </p:sp>
+      <p:sp>
+        <p:nvSpPr>
+          <p:cNvPr id="5" name="TextBox 4"/>
+          <p:cNvSpPr txBox="1"/>
+          <p:nvPr/>
+        </p:nvSpPr>
+        <p:spPr>
+          <a:xfrm>
+            <a:off x="2232550" y="1214540"/>
+            <a:ext cx="6606650" cy="2954655"/>
+          </a:xfrm>
+          <a:prstGeom prst="rect">
+            <a:avLst/>
+          </a:prstGeom>
+          <a:noFill/>
+        </p:spPr>
+        <p:txBody>
+          <a:bodyPr wrap="square" rtlCol="0">
+            <a:spAutoFit/>
+          </a:bodyPr>
+          <a:lstStyle/>
+          <a:p>
+            <a:pPr marL="285750" indent="-285750">
+              <a:lnSpc>
+                <a:spcPct val="150000"/>
+              </a:lnSpc>
+              <a:buClr>
+                <a:schemeClr val="bg1"/>
+              </a:buClr>
+              <a:buSzPct val="80000"/>
+              <a:buFont typeface="Calibri" panose="020F0502020204030204" pitchFamily="34" charset="0"/>
+              <a:buChar char="&gt;"/>
+            </a:pPr>
+            <a:r>
+              <a:rPr lang="en-US" dirty="0">
+                <a:solidFill>
+                  <a:schemeClr val="bg1"/>
+                </a:solidFill>
+              </a:rPr>
+              <a:t>Develop an enhanced version of the original Rogue (1980)</a:t>
+            </a:r>
+          </a:p>
+          <a:p>
+            <a:pPr marL="742950" lvl="1" indent="-285750">
+              <a:lnSpc>
+                <a:spcPct val="150000"/>
+              </a:lnSpc>
+              <a:buClr>
+                <a:schemeClr val="bg1"/>
+              </a:buClr>
+              <a:buSzPct val="80000"/>
+              <a:buFont typeface="Calibri" panose="020F0502020204030204" pitchFamily="34" charset="0"/>
+              <a:buChar char="&gt;"/>
+            </a:pPr>
+            <a:r>
+              <a:rPr lang="en-US" dirty="0">
+                <a:solidFill>
+                  <a:srgbClr val="00B0F0"/>
+                </a:solidFill>
+              </a:rPr>
+              <a:t>Client:</a:t>
+            </a:r>
+            <a:r>
+              <a:rPr lang="en-US" dirty="0">
+                <a:solidFill>
+                  <a:schemeClr val="bg1"/>
+                </a:solidFill>
+              </a:rPr>
+              <a:t> UI, Gameplay, and Performance</a:t>
+            </a:r>
+          </a:p>
+          <a:p>
+            <a:pPr marL="742950" lvl="1" indent="-285750">
+              <a:lnSpc>
+                <a:spcPct val="150000"/>
+              </a:lnSpc>
+              <a:buClr>
+                <a:schemeClr val="bg1"/>
+              </a:buClr>
+              <a:buSzPct val="80000"/>
+              <a:buFont typeface="Calibri" panose="020F0502020204030204" pitchFamily="34" charset="0"/>
+              <a:buChar char="&gt;"/>
+            </a:pPr>
+            <a:r>
+              <a:rPr lang="en-US" dirty="0">
+                <a:solidFill>
+                  <a:srgbClr val="00B0F0"/>
+                </a:solidFill>
+              </a:rPr>
+              <a:t>Development: </a:t>
+            </a:r>
+            <a:r>
+              <a:rPr lang="en-US" dirty="0">
+                <a:solidFill>
+                  <a:schemeClr val="bg1"/>
+                </a:solidFill>
+              </a:rPr>
+              <a:t>Design, Documentation, and Testing</a:t>
+            </a:r>
+          </a:p>
+          <a:p>
+            <a:pPr lvl="1">
+              <a:lnSpc>
+                <a:spcPct val="150000"/>
+              </a:lnSpc>
+              <a:buClr>
+                <a:schemeClr val="bg1"/>
+              </a:buClr>
+              <a:buSzPct val="80000"/>
+            </a:pPr>
+            <a:endParaRPr lang="en-US" sz="1600" dirty="0">
+              <a:solidFill>
+                <a:schemeClr val="bg1"/>
+              </a:solidFill>
+            </a:endParaRPr>
+          </a:p>
+          <a:p>
+            <a:pPr marL="285750" indent="-285750">
+              <a:lnSpc>
+                <a:spcPct val="150000"/>
+              </a:lnSpc>
+              <a:buClr>
+                <a:schemeClr val="bg1"/>
+              </a:buClr>
+              <a:buSzPct val="80000"/>
+              <a:buFont typeface="Calibri" panose="020F0502020204030204" pitchFamily="34" charset="0"/>
+              <a:buChar char="&gt;"/>
+            </a:pPr>
+            <a:r>
+              <a:rPr lang="en-US" dirty="0">
+                <a:solidFill>
+                  <a:schemeClr val="bg1"/>
+                </a:solidFill>
+              </a:rPr>
+              <a:t>Implement virtually all functionality present in the original version</a:t>
+            </a:r>
+          </a:p>
+          <a:p>
+            <a:pPr marL="285750" indent="-285750">
+              <a:lnSpc>
+                <a:spcPct val="150000"/>
+              </a:lnSpc>
+              <a:buClr>
+                <a:schemeClr val="bg1"/>
+              </a:buClr>
+              <a:buSzPct val="80000"/>
+              <a:buFont typeface="Calibri" panose="020F0502020204030204" pitchFamily="34" charset="0"/>
+              <a:buChar char="&gt;"/>
+            </a:pPr>
+            <a:r>
+              <a:rPr lang="en-US" dirty="0">
+                <a:solidFill>
+                  <a:schemeClr val="bg1"/>
+                </a:solidFill>
+              </a:rPr>
+              <a:t>Faithful improvements over non-functional qualities such as learnability and aesthetics</a:t>
+            </a:r>
+          </a:p>
+        </p:txBody>
+      </p:sp>
+      <p:cxnSp>
+        <p:nvCxnSpPr>
+          <p:cNvPr id="7" name="Straight Connector 6"/>
+          <p:cNvCxnSpPr/>
+          <p:nvPr/>
+        </p:nvCxnSpPr>
+        <p:spPr>
+          <a:xfrm>
+            <a:off x="609600" y="1047750"/>
+            <a:ext cx="3276600" cy="0"/>
+          </a:xfrm>
+          <a:prstGeom prst="line">
+            <a:avLst/>
+          </a:prstGeom>
+          <a:ln>
+            <a:solidFill>
+              <a:srgbClr val="28C22F"/>
+            </a:solidFill>
+          </a:ln>
+        </p:spPr>
+        <p:style>
+          <a:lnRef idx="1">
+            <a:schemeClr val="accent1"/>
+          </a:lnRef>
+          <a:fillRef idx="0">
+            <a:schemeClr val="accent1"/>
+          </a:fillRef>
+          <a:effectRef idx="0">
+            <a:schemeClr val="accent1"/>
+          </a:effectRef>
+          <a:fontRef idx="minor">
+            <a:schemeClr val="tx1"/>
+          </a:fontRef>
+        </p:style>
+      </p:cxnSp>
+      <p:sp>
+        <p:nvSpPr>
+          <p:cNvPr id="12" name="TextBox 11"/>
+          <p:cNvSpPr txBox="1"/>
+          <p:nvPr/>
+        </p:nvSpPr>
+        <p:spPr>
+          <a:xfrm>
+            <a:off x="457200" y="2888218"/>
+            <a:ext cx="1524000" cy="369332"/>
+          </a:xfrm>
+          <a:prstGeom prst="rect">
+            <a:avLst/>
+          </a:prstGeom>
+          <a:noFill/>
+        </p:spPr>
+        <p:txBody>
+          <a:bodyPr wrap="square" rtlCol="0">
+            <a:spAutoFit/>
+          </a:bodyPr>
+          <a:lstStyle/>
+          <a:p>
+            <a:pPr algn="r"/>
+            <a:r>
+              <a:rPr lang="en-US" dirty="0">
+                <a:solidFill>
+                  <a:srgbClr val="28C22F"/>
+                </a:solidFill>
+              </a:rPr>
+              <a:t>Scope</a:t>
+            </a:r>
+            <a:endParaRPr lang="en-CA" dirty="0">
+              <a:solidFill>
+                <a:srgbClr val="28C22F"/>
+              </a:solidFill>
+            </a:endParaRPr>
+          </a:p>
+        </p:txBody>
+      </p:sp>
+    </p:spTree>
+    <p:extLst>
+      <p:ext uri="{BB962C8B-B14F-4D97-AF65-F5344CB8AC3E}">
+        <p14:creationId xmlns:p14="http://schemas.microsoft.com/office/powerpoint/2010/main" val="4012428372"/>
+      </p:ext>
+    </p:extLst>
+  </p:cSld>
+  <p:clrMapOvr>
+    <a:masterClrMapping/>
+  </p:clrMapOvr>
+</p:sld>
+</file>
+
+<file path=ppt/slides/slide3.xml><?xml version="1.0" encoding="utf-8"?>
 <p:sld xmlns:a="http://schemas.openxmlformats.org/drawingml/2006/main" xmlns:r="http://schemas.openxmlformats.org/officeDocument/2006/relationships" xmlns:p="http://schemas.openxmlformats.org/presentationml/2006/main">
   <p:cSld>
     <p:spTree>
@@ -6564,7 +7170,7 @@
 </p:sld>
 </file>
 
-<file path=ppt/slides/slide3.xml><?xml version="1.0" encoding="utf-8"?>
+<file path=ppt/slides/slide4.xml><?xml version="1.0" encoding="utf-8"?>
 <p:sld xmlns:a="http://schemas.openxmlformats.org/drawingml/2006/main" xmlns:r="http://schemas.openxmlformats.org/officeDocument/2006/relationships" xmlns:p="http://schemas.openxmlformats.org/presentationml/2006/main">
   <p:cSld>
     <p:spTree>
@@ -6583,7 +7189,7 @@
       </p:grpSpPr>
       <p:sp>
         <p:nvSpPr>
-          <p:cNvPr id="14" name="Rectangle 13"/>
+          <p:cNvPr id="17" name="Rectangle 16"/>
           <p:cNvSpPr/>
           <p:nvPr/>
         </p:nvSpPr>
@@ -6766,7 +7372,7 @@
                   </a:schemeClr>
                 </a:solidFill>
               </a:rPr>
-              <a:t>########</a:t>
+              <a:t>###################################</a:t>
             </a:r>
             <a:r>
               <a:rPr lang="en-US" dirty="0">
@@ -6777,7 +7383,7 @@
                   </a:schemeClr>
                 </a:solidFill>
               </a:rPr>
-              <a:t>######################################################################</a:t>
+              <a:t>###########################################</a:t>
             </a:r>
             <a:endParaRPr lang="en-CA" dirty="0"/>
           </a:p>
@@ -6855,260 +7461,9 @@
           </a:p>
         </p:txBody>
       </p:sp>
-      <p:sp>
-        <p:nvSpPr>
-          <p:cNvPr id="24" name="Title 1"/>
-          <p:cNvSpPr txBox="1">
-            <a:spLocks/>
-          </p:cNvSpPr>
-          <p:nvPr/>
-        </p:nvSpPr>
-        <p:spPr>
-          <a:xfrm>
-            <a:off x="513117" y="346657"/>
-            <a:ext cx="3886200" cy="890558"/>
-          </a:xfrm>
-          <a:prstGeom prst="rect">
-            <a:avLst/>
-          </a:prstGeom>
-        </p:spPr>
-        <p:txBody>
-          <a:bodyPr anchor="ctr" anchorCtr="0">
-            <a:normAutofit/>
-          </a:bodyPr>
-          <a:lstStyle>
-            <a:lvl1pPr algn="ctr" defTabSz="914400" rtl="0" eaLnBrk="1" latinLnBrk="0" hangingPunct="1">
-              <a:spcBef>
-                <a:spcPct val="0"/>
-              </a:spcBef>
-              <a:buNone/>
-              <a:defRPr sz="4400" kern="1200">
-                <a:solidFill>
-                  <a:schemeClr val="tx1"/>
-                </a:solidFill>
-                <a:latin typeface="+mj-lt"/>
-                <a:ea typeface="+mj-ea"/>
-                <a:cs typeface="+mj-cs"/>
-              </a:defRPr>
-            </a:lvl1pPr>
-          </a:lstStyle>
-          <a:p>
-            <a:pPr algn="l"/>
-            <a:r>
-              <a:rPr lang="en-CA" sz="3200" dirty="0">
-                <a:solidFill>
-                  <a:schemeClr val="bg1"/>
-                </a:solidFill>
-                <a:latin typeface="Calibri Light" panose="020F0302020204030204" pitchFamily="34" charset="0"/>
-                <a:cs typeface="Calibri Light" panose="020F0302020204030204" pitchFamily="34" charset="0"/>
-              </a:rPr>
-              <a:t>Purpose and Scope</a:t>
-            </a:r>
-          </a:p>
-        </p:txBody>
-      </p:sp>
-      <p:sp>
-        <p:nvSpPr>
-          <p:cNvPr id="2" name="TextBox 1"/>
-          <p:cNvSpPr txBox="1"/>
-          <p:nvPr/>
-        </p:nvSpPr>
-        <p:spPr>
-          <a:xfrm>
-            <a:off x="457200" y="1301842"/>
-            <a:ext cx="1524000" cy="369332"/>
-          </a:xfrm>
-          <a:prstGeom prst="rect">
-            <a:avLst/>
-          </a:prstGeom>
-          <a:noFill/>
-        </p:spPr>
-        <p:txBody>
-          <a:bodyPr wrap="square" rtlCol="0">
-            <a:spAutoFit/>
-          </a:bodyPr>
-          <a:lstStyle/>
-          <a:p>
-            <a:pPr algn="r"/>
-            <a:r>
-              <a:rPr lang="en-US" dirty="0" smtClean="0">
-                <a:solidFill>
-                  <a:srgbClr val="28C22F"/>
-                </a:solidFill>
-              </a:rPr>
-              <a:t>Purpose</a:t>
-            </a:r>
-            <a:endParaRPr lang="en-US" dirty="0">
-              <a:solidFill>
-                <a:srgbClr val="28C22F"/>
-              </a:solidFill>
-            </a:endParaRPr>
-          </a:p>
-        </p:txBody>
-      </p:sp>
-      <p:sp>
-        <p:nvSpPr>
-          <p:cNvPr id="5" name="TextBox 4"/>
-          <p:cNvSpPr txBox="1"/>
-          <p:nvPr/>
-        </p:nvSpPr>
-        <p:spPr>
-          <a:xfrm>
-            <a:off x="2232550" y="1214540"/>
-            <a:ext cx="6606650" cy="2954655"/>
-          </a:xfrm>
-          <a:prstGeom prst="rect">
-            <a:avLst/>
-          </a:prstGeom>
-          <a:noFill/>
-        </p:spPr>
-        <p:txBody>
-          <a:bodyPr wrap="square" rtlCol="0">
-            <a:spAutoFit/>
-          </a:bodyPr>
-          <a:lstStyle/>
-          <a:p>
-            <a:pPr marL="285750" indent="-285750">
-              <a:lnSpc>
-                <a:spcPct val="150000"/>
-              </a:lnSpc>
-              <a:buClr>
-                <a:schemeClr val="bg1"/>
-              </a:buClr>
-              <a:buSzPct val="80000"/>
-              <a:buFont typeface="Calibri" panose="020F0502020204030204" pitchFamily="34" charset="0"/>
-              <a:buChar char="&gt;"/>
-            </a:pPr>
-            <a:r>
-              <a:rPr lang="en-US" dirty="0">
-                <a:solidFill>
-                  <a:schemeClr val="bg1"/>
-                </a:solidFill>
-              </a:rPr>
-              <a:t>Develop an enhanced version of the original Rogue (1980)</a:t>
-            </a:r>
-          </a:p>
-          <a:p>
-            <a:pPr marL="742950" lvl="1" indent="-285750">
-              <a:lnSpc>
-                <a:spcPct val="150000"/>
-              </a:lnSpc>
-              <a:buClr>
-                <a:schemeClr val="bg1"/>
-              </a:buClr>
-              <a:buSzPct val="80000"/>
-              <a:buFont typeface="Calibri" panose="020F0502020204030204" pitchFamily="34" charset="0"/>
-              <a:buChar char="&gt;"/>
-            </a:pPr>
-            <a:r>
-              <a:rPr lang="en-US" dirty="0">
-                <a:solidFill>
-                  <a:srgbClr val="00B0F0"/>
-                </a:solidFill>
-              </a:rPr>
-              <a:t>Client:</a:t>
-            </a:r>
-            <a:r>
-              <a:rPr lang="en-US" dirty="0">
-                <a:solidFill>
-                  <a:schemeClr val="bg1"/>
-                </a:solidFill>
-              </a:rPr>
-              <a:t> UI, Gameplay, and Performance</a:t>
-            </a:r>
-          </a:p>
-          <a:p>
-            <a:pPr marL="742950" lvl="1" indent="-285750">
-              <a:lnSpc>
-                <a:spcPct val="150000"/>
-              </a:lnSpc>
-              <a:buClr>
-                <a:schemeClr val="bg1"/>
-              </a:buClr>
-              <a:buSzPct val="80000"/>
-              <a:buFont typeface="Calibri" panose="020F0502020204030204" pitchFamily="34" charset="0"/>
-              <a:buChar char="&gt;"/>
-            </a:pPr>
-            <a:r>
-              <a:rPr lang="en-US" dirty="0">
-                <a:solidFill>
-                  <a:srgbClr val="00B0F0"/>
-                </a:solidFill>
-              </a:rPr>
-              <a:t>Development: </a:t>
-            </a:r>
-            <a:r>
-              <a:rPr lang="en-US" dirty="0">
-                <a:solidFill>
-                  <a:schemeClr val="bg1"/>
-                </a:solidFill>
-              </a:rPr>
-              <a:t>Design, Documentation, and Testing</a:t>
-            </a:r>
-          </a:p>
-          <a:p>
-            <a:pPr lvl="1">
-              <a:lnSpc>
-                <a:spcPct val="150000"/>
-              </a:lnSpc>
-              <a:buClr>
-                <a:schemeClr val="bg1"/>
-              </a:buClr>
-              <a:buSzPct val="80000"/>
-            </a:pPr>
-            <a:endParaRPr lang="en-US" sz="1600" dirty="0">
-              <a:solidFill>
-                <a:schemeClr val="bg1"/>
-              </a:solidFill>
-            </a:endParaRPr>
-          </a:p>
-          <a:p>
-            <a:pPr marL="285750" indent="-285750">
-              <a:lnSpc>
-                <a:spcPct val="150000"/>
-              </a:lnSpc>
-              <a:buClr>
-                <a:schemeClr val="bg1"/>
-              </a:buClr>
-              <a:buSzPct val="80000"/>
-              <a:buFont typeface="Calibri" panose="020F0502020204030204" pitchFamily="34" charset="0"/>
-              <a:buChar char="&gt;"/>
-            </a:pPr>
-            <a:r>
-              <a:rPr lang="en-US" dirty="0">
-                <a:solidFill>
-                  <a:schemeClr val="bg1"/>
-                </a:solidFill>
-              </a:rPr>
-              <a:t>Implement virtually all functionality present in the original version</a:t>
-            </a:r>
-          </a:p>
-          <a:p>
-            <a:pPr marL="285750" indent="-285750">
-              <a:lnSpc>
-                <a:spcPct val="150000"/>
-              </a:lnSpc>
-              <a:buClr>
-                <a:schemeClr val="bg1"/>
-              </a:buClr>
-              <a:buSzPct val="80000"/>
-              <a:buFont typeface="Calibri" panose="020F0502020204030204" pitchFamily="34" charset="0"/>
-              <a:buChar char="&gt;"/>
-            </a:pPr>
-            <a:r>
-              <a:rPr lang="en-US" dirty="0">
-                <a:solidFill>
-                  <a:schemeClr val="bg1"/>
-                </a:solidFill>
-              </a:rPr>
-              <a:t>Faithful improvements over non-functional qualities such as learnability and aesthetics</a:t>
-            </a:r>
-          </a:p>
-        </p:txBody>
-      </p:sp>
       <p:cxnSp>
         <p:nvCxnSpPr>
-          <p:cNvPr id="7" name="Straight Connector 6"/>
+          <p:cNvPr id="23" name="Straight Connector 22"/>
           <p:cNvCxnSpPr/>
           <p:nvPr/>
         </p:nvCxnSpPr>
@@ -7143,391 +7498,6 @@
       </p:cxnSp>
       <p:sp>
         <p:nvSpPr>
-          <p:cNvPr id="12" name="TextBox 11"/>
-          <p:cNvSpPr txBox="1"/>
-          <p:nvPr/>
-        </p:nvSpPr>
-        <p:spPr>
-          <a:xfrm>
-            <a:off x="457200" y="2888218"/>
-            <a:ext cx="1524000" cy="369332"/>
-          </a:xfrm>
-          <a:prstGeom prst="rect">
-            <a:avLst/>
-          </a:prstGeom>
-          <a:noFill/>
-        </p:spPr>
-        <p:txBody>
-          <a:bodyPr wrap="square" rtlCol="0">
-            <a:spAutoFit/>
-          </a:bodyPr>
-          <a:lstStyle/>
-          <a:p>
-            <a:pPr algn="r"/>
-            <a:r>
-              <a:rPr lang="en-US" dirty="0" smtClean="0">
-                <a:solidFill>
-                  <a:srgbClr val="28C22F"/>
-                </a:solidFill>
-              </a:rPr>
-              <a:t>Scope</a:t>
-            </a:r>
-            <a:endParaRPr lang="en-CA" dirty="0">
-              <a:solidFill>
-                <a:srgbClr val="28C22F"/>
-              </a:solidFill>
-            </a:endParaRPr>
-          </a:p>
-        </p:txBody>
-      </p:sp>
-    </p:spTree>
-    <p:extLst>
-      <p:ext uri="{BB962C8B-B14F-4D97-AF65-F5344CB8AC3E}">
-        <p14:creationId xmlns:p14="http://schemas.microsoft.com/office/powerpoint/2010/main" val="4012428372"/>
-      </p:ext>
-    </p:extLst>
-  </p:cSld>
-  <p:clrMapOvr>
-    <a:masterClrMapping/>
-  </p:clrMapOvr>
-  <p:timing>
-    <p:tnLst>
-      <p:par>
-        <p:cTn id="1" dur="indefinite" restart="never" nodeType="tmRoot"/>
-      </p:par>
-    </p:tnLst>
-  </p:timing>
-</p:sld>
-</file>
-
-<file path=ppt/slides/slide4.xml><?xml version="1.0" encoding="utf-8"?>
-<p:sld xmlns:a="http://schemas.openxmlformats.org/drawingml/2006/main" xmlns:r="http://schemas.openxmlformats.org/officeDocument/2006/relationships" xmlns:p="http://schemas.openxmlformats.org/presentationml/2006/main">
-  <p:cSld>
-    <p:spTree>
-      <p:nvGrpSpPr>
-        <p:cNvPr id="1" name=""/>
-        <p:cNvGrpSpPr/>
-        <p:nvPr/>
-      </p:nvGrpSpPr>
-      <p:grpSpPr>
-        <a:xfrm>
-          <a:off x="0" y="0"/>
-          <a:ext cx="0" cy="0"/>
-          <a:chOff x="0" y="0"/>
-          <a:chExt cx="0" cy="0"/>
-        </a:xfrm>
-      </p:grpSpPr>
-      <p:sp>
-        <p:nvSpPr>
-          <p:cNvPr id="17" name="Rectangle 16"/>
-          <p:cNvSpPr/>
-          <p:nvPr/>
-        </p:nvSpPr>
-        <p:spPr>
-          <a:xfrm>
-            <a:off x="0" y="0"/>
-            <a:ext cx="9144000" cy="5143500"/>
-          </a:xfrm>
-          <a:prstGeom prst="rect">
-            <a:avLst/>
-          </a:prstGeom>
-          <a:solidFill>
-            <a:srgbClr val="1F1F1F"/>
-          </a:solidFill>
-          <a:ln>
-            <a:solidFill>
-              <a:schemeClr val="tx1"/>
-            </a:solidFill>
-          </a:ln>
-        </p:spPr>
-        <p:style>
-          <a:lnRef idx="2">
-            <a:schemeClr val="accent1">
-              <a:shade val="50000"/>
-            </a:schemeClr>
-          </a:lnRef>
-          <a:fillRef idx="1">
-            <a:schemeClr val="accent1"/>
-          </a:fillRef>
-          <a:effectRef idx="0">
-            <a:schemeClr val="accent1"/>
-          </a:effectRef>
-          <a:fontRef idx="minor">
-            <a:schemeClr val="lt1"/>
-          </a:fontRef>
-        </p:style>
-        <p:txBody>
-          <a:bodyPr rtlCol="0" anchor="ctr"/>
-          <a:lstStyle/>
-          <a:p>
-            <a:pPr algn="ctr"/>
-            <a:endParaRPr lang="en-CA" dirty="0"/>
-          </a:p>
-        </p:txBody>
-      </p:sp>
-      <p:pic>
-        <p:nvPicPr>
-          <p:cNvPr id="18" name="Picture 16"/>
-          <p:cNvPicPr>
-            <a:picLocks noChangeAspect="1" noChangeArrowheads="1"/>
-          </p:cNvPicPr>
-          <p:nvPr/>
-        </p:nvPicPr>
-        <p:blipFill>
-          <a:blip r:embed="rId2" cstate="print">
-            <a:clrChange>
-              <a:clrFrom>
-                <a:srgbClr val="000000"/>
-              </a:clrFrom>
-              <a:clrTo>
-                <a:srgbClr val="000000">
-                  <a:alpha val="0"/>
-                </a:srgbClr>
-              </a:clrTo>
-            </a:clrChange>
-            <a:extLst>
-              <a:ext uri="{28A0092B-C50C-407E-A947-70E740481C1C}">
-                <a14:useLocalDpi xmlns:a14="http://schemas.microsoft.com/office/drawing/2010/main" val="0"/>
-              </a:ext>
-            </a:extLst>
-          </a:blip>
-          <a:srcRect/>
-          <a:stretch>
-            <a:fillRect/>
-          </a:stretch>
-        </p:blipFill>
-        <p:spPr bwMode="auto">
-          <a:xfrm>
-            <a:off x="8286750" y="252442"/>
-            <a:ext cx="685800" cy="685800"/>
-          </a:xfrm>
-          <a:prstGeom prst="rect">
-            <a:avLst/>
-          </a:prstGeom>
-          <a:noFill/>
-          <a:ln>
-            <a:noFill/>
-          </a:ln>
-          <a:extLst>
-            <a:ext uri="{909E8E84-426E-40DD-AFC4-6F175D3DCCD1}">
-              <a14:hiddenFill xmlns:a14="http://schemas.microsoft.com/office/drawing/2010/main">
-                <a:solidFill>
-                  <a:schemeClr val="accent1"/>
-                </a:solidFill>
-              </a14:hiddenFill>
-            </a:ext>
-            <a:ext uri="{91240B29-F687-4F45-9708-019B960494DF}">
-              <a14:hiddenLine xmlns:a14="http://schemas.microsoft.com/office/drawing/2010/main" w="9525">
-                <a:solidFill>
-                  <a:schemeClr val="tx1"/>
-                </a:solidFill>
-                <a:miter lim="800000"/>
-                <a:headEnd/>
-                <a:tailEnd/>
-              </a14:hiddenLine>
-            </a:ext>
-          </a:extLst>
-        </p:spPr>
-      </p:pic>
-      <p:sp>
-        <p:nvSpPr>
-          <p:cNvPr id="19" name="TextBox 18"/>
-          <p:cNvSpPr txBox="1"/>
-          <p:nvPr/>
-        </p:nvSpPr>
-        <p:spPr>
-          <a:xfrm>
-            <a:off x="28574" y="0"/>
-            <a:ext cx="9115425" cy="369332"/>
-          </a:xfrm>
-          <a:prstGeom prst="rect">
-            <a:avLst/>
-          </a:prstGeom>
-          <a:noFill/>
-        </p:spPr>
-        <p:txBody>
-          <a:bodyPr wrap="square" rtlCol="0">
-            <a:spAutoFit/>
-          </a:bodyPr>
-          <a:lstStyle/>
-          <a:p>
-            <a:r>
-              <a:rPr lang="en-US" dirty="0">
-                <a:solidFill>
-                  <a:schemeClr val="tx1">
-                    <a:lumMod val="75000"/>
-                    <a:lumOff val="25000"/>
-                  </a:schemeClr>
-                </a:solidFill>
-              </a:rPr>
-              <a:t>##############################################################################</a:t>
-            </a:r>
-            <a:endParaRPr lang="en-CA" dirty="0">
-              <a:solidFill>
-                <a:schemeClr val="tx1">
-                  <a:lumMod val="75000"/>
-                  <a:lumOff val="25000"/>
-                </a:schemeClr>
-              </a:solidFill>
-            </a:endParaRPr>
-          </a:p>
-        </p:txBody>
-      </p:sp>
-      <p:sp>
-        <p:nvSpPr>
-          <p:cNvPr id="20" name="Rectangle 19"/>
-          <p:cNvSpPr/>
-          <p:nvPr/>
-        </p:nvSpPr>
-        <p:spPr>
-          <a:xfrm>
-            <a:off x="28574" y="4724400"/>
-            <a:ext cx="9115426" cy="369332"/>
-          </a:xfrm>
-          <a:prstGeom prst="rect">
-            <a:avLst/>
-          </a:prstGeom>
-        </p:spPr>
-        <p:txBody>
-          <a:bodyPr wrap="square">
-            <a:spAutoFit/>
-          </a:bodyPr>
-          <a:lstStyle/>
-          <a:p>
-            <a:r>
-              <a:rPr lang="en-US" dirty="0">
-                <a:solidFill>
-                  <a:schemeClr val="accent3">
-                    <a:lumMod val="50000"/>
-                  </a:schemeClr>
-                </a:solidFill>
-              </a:rPr>
-              <a:t>###################################</a:t>
-            </a:r>
-            <a:r>
-              <a:rPr lang="en-US" dirty="0">
-                <a:solidFill>
-                  <a:schemeClr val="tx1">
-                    <a:lumMod val="75000"/>
-                    <a:lumOff val="25000"/>
-                  </a:schemeClr>
-                </a:solidFill>
-              </a:rPr>
-              <a:t>###########################################</a:t>
-            </a:r>
-            <a:endParaRPr lang="en-CA" dirty="0"/>
-          </a:p>
-        </p:txBody>
-      </p:sp>
-      <p:sp>
-        <p:nvSpPr>
-          <p:cNvPr id="21" name="Rectangle 20"/>
-          <p:cNvSpPr/>
-          <p:nvPr/>
-        </p:nvSpPr>
-        <p:spPr>
-          <a:xfrm>
-            <a:off x="38100" y="285750"/>
-            <a:ext cx="266700" cy="4524315"/>
-          </a:xfrm>
-          <a:prstGeom prst="rect">
-            <a:avLst/>
-          </a:prstGeom>
-        </p:spPr>
-        <p:txBody>
-          <a:bodyPr wrap="square">
-            <a:spAutoFit/>
-          </a:bodyPr>
-          <a:lstStyle/>
-          <a:p>
-            <a:r>
-              <a:rPr lang="en-US" dirty="0">
-                <a:solidFill>
-                  <a:schemeClr val="tx1">
-                    <a:lumMod val="75000"/>
-                    <a:lumOff val="25000"/>
-                  </a:schemeClr>
-                </a:solidFill>
-              </a:rPr>
-              <a:t>################</a:t>
-            </a:r>
-            <a:endParaRPr lang="en-CA" dirty="0"/>
-          </a:p>
-        </p:txBody>
-      </p:sp>
-      <p:sp>
-        <p:nvSpPr>
-          <p:cNvPr id="22" name="Rectangle 21"/>
-          <p:cNvSpPr/>
-          <p:nvPr/>
-        </p:nvSpPr>
-        <p:spPr>
-          <a:xfrm>
-            <a:off x="8839200" y="309592"/>
-            <a:ext cx="266700" cy="4524315"/>
-          </a:xfrm>
-          <a:prstGeom prst="rect">
-            <a:avLst/>
-          </a:prstGeom>
-        </p:spPr>
-        <p:txBody>
-          <a:bodyPr wrap="square">
-            <a:spAutoFit/>
-          </a:bodyPr>
-          <a:lstStyle/>
-          <a:p>
-            <a:r>
-              <a:rPr lang="en-US" dirty="0">
-                <a:solidFill>
-                  <a:schemeClr val="tx1">
-                    <a:lumMod val="75000"/>
-                    <a:lumOff val="25000"/>
-                  </a:schemeClr>
-                </a:solidFill>
-              </a:rPr>
-              <a:t>################</a:t>
-            </a:r>
-            <a:endParaRPr lang="en-CA" dirty="0"/>
-          </a:p>
-        </p:txBody>
-      </p:sp>
-      <p:cxnSp>
-        <p:nvCxnSpPr>
-          <p:cNvPr id="23" name="Straight Connector 22"/>
-          <p:cNvCxnSpPr/>
-          <p:nvPr/>
-        </p:nvCxnSpPr>
-        <p:spPr>
-          <a:xfrm>
-            <a:off x="609600" y="1047750"/>
-            <a:ext cx="3276600" cy="0"/>
-          </a:xfrm>
-          <a:prstGeom prst="line">
-            <a:avLst/>
-          </a:prstGeom>
-          <a:ln>
-            <a:solidFill>
-              <a:srgbClr val="28C22F"/>
-            </a:solidFill>
-          </a:ln>
-        </p:spPr>
-        <p:style>
-          <a:lnRef idx="1">
-            <a:schemeClr val="accent1"/>
-          </a:lnRef>
-          <a:fillRef idx="0">
-            <a:schemeClr val="accent1"/>
-          </a:fillRef>
-          <a:effectRef idx="0">
-            <a:schemeClr val="accent1"/>
-          </a:effectRef>
-          <a:fontRef idx="minor">
-            <a:schemeClr val="tx1"/>
-          </a:fontRef>
-        </p:style>
-      </p:cxnSp>
-      <p:sp>
-        <p:nvSpPr>
           <p:cNvPr id="24" name="Title 1"/>
           <p:cNvSpPr txBox="1">
             <a:spLocks/>
@@ -7795,13 +7765,6 @@
   <p:clrMapOvr>
     <a:masterClrMapping/>
   </p:clrMapOvr>
-  <p:timing>
-    <p:tnLst>
-      <p:par>
-        <p:cTn id="1" dur="indefinite" restart="never" nodeType="tmRoot"/>
-      </p:par>
-    </p:tnLst>
-  </p:timing>
 </p:sld>
 </file>
 
@@ -8226,7 +8189,7 @@
         <p:spPr>
           <a:xfrm>
             <a:off x="2232550" y="1214540"/>
-            <a:ext cx="6606650" cy="3000821"/>
+            <a:ext cx="6606650" cy="3277820"/>
           </a:xfrm>
           <a:prstGeom prst="rect">
             <a:avLst/>
@@ -8439,6 +8402,22 @@
                 </a:solidFill>
               </a:rPr>
               <a:t> (Memory Profiler)</a:t>
+            </a:r>
+          </a:p>
+          <a:p>
+            <a:pPr>
+              <a:buClr>
+                <a:schemeClr val="bg1"/>
+              </a:buClr>
+              <a:buSzPct val="80000"/>
+            </a:pPr>
+            <a:r>
+              <a:rPr lang="en-US" dirty="0">
+                <a:solidFill>
+                  <a:schemeClr val="bg1"/>
+                </a:solidFill>
+              </a:rPr>
+              <a:t>     g++ dependency detection</a:t>
             </a:r>
           </a:p>
         </p:txBody>
@@ -8548,13 +8527,6 @@
   <p:clrMapOvr>
     <a:masterClrMapping/>
   </p:clrMapOvr>
-  <p:timing>
-    <p:tnLst>
-      <p:par>
-        <p:cTn id="1" dur="indefinite" restart="never" nodeType="tmRoot"/>
-      </p:par>
-    </p:tnLst>
-  </p:timing>
 </p:sld>
 </file>
 
@@ -8977,13 +8949,6 @@
   <p:clrMapOvr>
     <a:masterClrMapping/>
   </p:clrMapOvr>
-  <p:timing>
-    <p:tnLst>
-      <p:par>
-        <p:cTn id="1" dur="indefinite" restart="never" nodeType="tmRoot"/>
-      </p:par>
-    </p:tnLst>
-  </p:timing>
 </p:sld>
 </file>
 
@@ -9620,13 +9585,6 @@
   <p:clrMapOvr>
     <a:masterClrMapping/>
   </p:clrMapOvr>
-  <p:timing>
-    <p:tnLst>
-      <p:par>
-        <p:cTn id="1" dur="indefinite" restart="never" nodeType="tmRoot"/>
-      </p:par>
-    </p:tnLst>
-  </p:timing>
 </p:sld>
 </file>
 
@@ -11296,13 +11254,6 @@
   <p:clrMapOvr>
     <a:masterClrMapping/>
   </p:clrMapOvr>
-  <p:timing>
-    <p:tnLst>
-      <p:par>
-        <p:cTn id="1" dur="indefinite" restart="never" nodeType="tmRoot"/>
-      </p:par>
-    </p:tnLst>
-  </p:timing>
 </p:sld>
 </file>
 
@@ -11751,10 +11702,18 @@
             <a:r>
               <a:rPr lang="en-US" dirty="0">
                 <a:solidFill>
+                  <a:schemeClr val="accent5"/>
+                </a:solidFill>
+              </a:rPr>
+              <a:t>800+</a:t>
+            </a:r>
+            <a:r>
+              <a:rPr lang="en-US" dirty="0">
+                <a:solidFill>
                   <a:srgbClr val="00B0F0"/>
                 </a:solidFill>
               </a:rPr>
-              <a:t>650+ </a:t>
+              <a:t> </a:t>
             </a:r>
             <a:r>
               <a:rPr lang="en-US" dirty="0">
@@ -11905,13 +11864,6 @@
   <p:clrMapOvr>
     <a:masterClrMapping/>
   </p:clrMapOvr>
-  <p:timing>
-    <p:tnLst>
-      <p:par>
-        <p:cTn id="1" dur="indefinite" restart="never" nodeType="tmRoot"/>
-      </p:par>
-    </p:tnLst>
-  </p:timing>
 </p:sld>
 </file>
 

</xml_diff>

<commit_message>
remove large white box
</commit_message>
<xml_diff>
--- a/Doc/FinalPresentation/RR.pptx
+++ b/Doc/FinalPresentation/RR.pptx
@@ -6733,7 +6733,7 @@
           <p:nvPr/>
         </p:nvPicPr>
         <p:blipFill>
-          <a:blip r:embed="rId4" cstate="print">
+          <a:blip r:embed="rId2" cstate="print">
             <a:clrChange>
               <a:clrFrom>
                 <a:srgbClr val="000000"/>
@@ -7037,46 +7037,6 @@
           </a:p>
         </p:txBody>
       </p:sp>
-      <p:pic>
-        <p:nvPicPr>
-          <p:cNvPr id="2" name="OG_Rogue">
-            <a:hlinkClick r:id="" action="ppaction://media"/>
-          </p:cNvPr>
-          <p:cNvPicPr>
-            <a:picLocks noChangeAspect="1"/>
-          </p:cNvPicPr>
-          <p:nvPr>
-            <a:videoFile r:link="rId2"/>
-            <p:extLst>
-              <p:ext uri="{DAA4B4D4-6D71-4841-9C94-3DE7FCFB9230}">
-                <p14:media xmlns:p14="http://schemas.microsoft.com/office/powerpoint/2010/main" r:embed="rId1"/>
-              </p:ext>
-            </p:extLst>
-          </p:nvPr>
-        </p:nvPicPr>
-        <p:blipFill>
-          <a:blip r:embed="rId5"/>
-          <a:stretch>
-            <a:fillRect/>
-          </a:stretch>
-        </p:blipFill>
-        <p:spPr>
-          <a:xfrm>
-            <a:off x="2547321" y="1482615"/>
-            <a:ext cx="4071938" cy="2996384"/>
-          </a:xfrm>
-          <a:prstGeom prst="rect">
-            <a:avLst/>
-          </a:prstGeom>
-          <a:effectLst>
-            <a:outerShdw blurRad="152400" dir="9600000" sx="102000" sy="102000" algn="tl" rotWithShape="0">
-              <a:prstClr val="black">
-                <a:alpha val="40000"/>
-              </a:prstClr>
-            </a:outerShdw>
-          </a:effectLst>
-        </p:spPr>
-      </p:pic>
     </p:spTree>
     <p:extLst>
       <p:ext uri="{BB962C8B-B14F-4D97-AF65-F5344CB8AC3E}">
@@ -7087,86 +7047,6 @@
   <p:clrMapOvr>
     <a:masterClrMapping/>
   </p:clrMapOvr>
-  <p:timing>
-    <p:tnLst>
-      <p:par>
-        <p:cTn id="1" dur="indefinite" restart="never" nodeType="tmRoot">
-          <p:childTnLst>
-            <p:seq concurrent="1" nextAc="seek">
-              <p:cTn id="2" restart="whenNotActive" fill="hold" evtFilter="cancelBubble" nodeType="interactiveSeq">
-                <p:stCondLst>
-                  <p:cond evt="onClick" delay="0">
-                    <p:tgtEl>
-                      <p:spTgt spid="2"/>
-                    </p:tgtEl>
-                  </p:cond>
-                </p:stCondLst>
-                <p:endSync evt="end" delay="0">
-                  <p:rtn val="all"/>
-                </p:endSync>
-                <p:childTnLst>
-                  <p:par>
-                    <p:cTn id="3" fill="hold">
-                      <p:stCondLst>
-                        <p:cond delay="0"/>
-                      </p:stCondLst>
-                      <p:childTnLst>
-                        <p:par>
-                          <p:cTn id="4" fill="hold">
-                            <p:stCondLst>
-                              <p:cond delay="0"/>
-                            </p:stCondLst>
-                            <p:childTnLst>
-                              <p:par>
-                                <p:cTn id="5" presetID="2" presetClass="mediacall" presetSubtype="0" fill="hold" nodeType="clickEffect">
-                                  <p:stCondLst>
-                                    <p:cond delay="0"/>
-                                  </p:stCondLst>
-                                  <p:childTnLst>
-                                    <p:cmd type="call" cmd="togglePause">
-                                      <p:cBhvr>
-                                        <p:cTn id="6" dur="1" fill="hold"/>
-                                        <p:tgtEl>
-                                          <p:spTgt spid="2"/>
-                                        </p:tgtEl>
-                                      </p:cBhvr>
-                                    </p:cmd>
-                                  </p:childTnLst>
-                                </p:cTn>
-                              </p:par>
-                            </p:childTnLst>
-                          </p:cTn>
-                        </p:par>
-                      </p:childTnLst>
-                    </p:cTn>
-                  </p:par>
-                </p:childTnLst>
-              </p:cTn>
-              <p:nextCondLst>
-                <p:cond evt="onClick" delay="0">
-                  <p:tgtEl>
-                    <p:spTgt spid="2"/>
-                  </p:tgtEl>
-                </p:cond>
-              </p:nextCondLst>
-            </p:seq>
-            <p:video>
-              <p:cMediaNode vol="80000">
-                <p:cTn id="7" fill="hold" display="0">
-                  <p:stCondLst>
-                    <p:cond delay="indefinite"/>
-                  </p:stCondLst>
-                </p:cTn>
-                <p:tgtEl>
-                  <p:spTgt spid="2"/>
-                </p:tgtEl>
-              </p:cMediaNode>
-            </p:video>
-          </p:childTnLst>
-        </p:cTn>
-      </p:par>
-    </p:tnLst>
-  </p:timing>
 </p:sld>
 </file>
 

</xml_diff>